<commit_message>
Added support for the Forgot your Password? functionality. Added Statistics to the Administration area. Updated the final report.
</commit_message>
<xml_diff>
--- a/doc/work_files/conceptual_web_site_diagram.pptx
+++ b/doc/work_files/conceptual_web_site_diagram.pptx
@@ -4020,7 +4020,6 @@
             <a:rPr lang="en-US" dirty="0" smtClean="0"/>
             <a:t>My account</a:t>
           </a:r>
-          <a:endParaRPr lang="en-US" dirty="0" smtClean="0"/>
         </a:p>
       </dgm:t>
     </dgm:pt>
@@ -4057,7 +4056,6 @@
             <a:rPr lang="en-US" dirty="0" smtClean="0"/>
             <a:t>Account details</a:t>
           </a:r>
-          <a:endParaRPr lang="en-US" dirty="0" smtClean="0"/>
         </a:p>
       </dgm:t>
     </dgm:pt>
@@ -4277,7 +4275,7 @@
         <a:p>
           <a:r>
             <a:rPr lang="en-US" dirty="0" smtClean="0"/>
-            <a:t>Forgot your password?</a:t>
+            <a:t>Password reset</a:t>
           </a:r>
           <a:endParaRPr lang="en-US" dirty="0"/>
         </a:p>
@@ -4316,7 +4314,6 @@
             <a:rPr lang="en-US" dirty="0" smtClean="0"/>
             <a:t>Change password</a:t>
           </a:r>
-          <a:endParaRPr lang="en-US" dirty="0" smtClean="0"/>
         </a:p>
       </dgm:t>
     </dgm:pt>
@@ -4353,7 +4350,6 @@
             <a:rPr lang="en-US" dirty="0" smtClean="0"/>
             <a:t>Address book</a:t>
           </a:r>
-          <a:endParaRPr lang="en-US" dirty="0" smtClean="0"/>
         </a:p>
       </dgm:t>
     </dgm:pt>
@@ -4390,7 +4386,6 @@
             <a:rPr lang="en-US" dirty="0" smtClean="0"/>
             <a:t>New address</a:t>
           </a:r>
-          <a:endParaRPr lang="en-US" dirty="0" smtClean="0"/>
         </a:p>
       </dgm:t>
     </dgm:pt>
@@ -4427,7 +4422,6 @@
             <a:rPr lang="en-US" dirty="0" smtClean="0"/>
             <a:t>Edit address</a:t>
           </a:r>
-          <a:endParaRPr lang="en-US" dirty="0" smtClean="0"/>
         </a:p>
       </dgm:t>
     </dgm:pt>
@@ -4464,7 +4458,6 @@
             <a:rPr lang="en-US" dirty="0" smtClean="0"/>
             <a:t>Delete address</a:t>
           </a:r>
-          <a:endParaRPr lang="en-US" dirty="0" smtClean="0"/>
         </a:p>
       </dgm:t>
     </dgm:pt>
@@ -4501,7 +4494,6 @@
             <a:rPr lang="en-US" dirty="0" smtClean="0"/>
             <a:t>Completed orders</a:t>
           </a:r>
-          <a:endParaRPr lang="en-US" dirty="0" smtClean="0"/>
         </a:p>
       </dgm:t>
     </dgm:pt>
@@ -4538,7 +4530,6 @@
             <a:rPr lang="en-US" dirty="0" smtClean="0"/>
             <a:t>Admin</a:t>
           </a:r>
-          <a:endParaRPr lang="en-US" dirty="0" smtClean="0"/>
         </a:p>
       </dgm:t>
     </dgm:pt>
@@ -4575,7 +4566,6 @@
             <a:rPr lang="en-US" dirty="0" smtClean="0"/>
             <a:t>Paid orders</a:t>
           </a:r>
-          <a:endParaRPr lang="en-US" dirty="0" smtClean="0"/>
         </a:p>
       </dgm:t>
     </dgm:pt>
@@ -4612,7 +4602,6 @@
             <a:rPr lang="en-US" dirty="0" smtClean="0"/>
             <a:t>Delivered orders</a:t>
           </a:r>
-          <a:endParaRPr lang="en-US" dirty="0" smtClean="0"/>
         </a:p>
       </dgm:t>
     </dgm:pt>
@@ -4649,7 +4638,6 @@
             <a:rPr lang="en-US" dirty="0" smtClean="0"/>
             <a:t>Statistics</a:t>
           </a:r>
-          <a:endParaRPr lang="en-US" dirty="0" smtClean="0"/>
         </a:p>
       </dgm:t>
     </dgm:pt>
@@ -4686,7 +4674,6 @@
             <a:rPr lang="en-US" dirty="0" smtClean="0"/>
             <a:t>About</a:t>
           </a:r>
-          <a:endParaRPr lang="en-US" dirty="0" smtClean="0"/>
         </a:p>
       </dgm:t>
     </dgm:pt>
@@ -4723,7 +4710,6 @@
             <a:rPr lang="en-US" dirty="0" smtClean="0"/>
             <a:t>Credits</a:t>
           </a:r>
-          <a:endParaRPr lang="en-US" dirty="0" smtClean="0"/>
         </a:p>
       </dgm:t>
     </dgm:pt>
@@ -4760,7 +4746,6 @@
             <a:rPr lang="en-US" dirty="0" smtClean="0"/>
             <a:t>Cart</a:t>
           </a:r>
-          <a:endParaRPr lang="en-US" dirty="0" smtClean="0"/>
         </a:p>
       </dgm:t>
     </dgm:pt>
@@ -4797,7 +4782,6 @@
             <a:rPr lang="en-US" dirty="0" smtClean="0"/>
             <a:t>Checkout</a:t>
           </a:r>
-          <a:endParaRPr lang="en-US" dirty="0" smtClean="0"/>
         </a:p>
       </dgm:t>
     </dgm:pt>
@@ -4813,6 +4797,154 @@
       </dgm:t>
     </dgm:pt>
     <dgm:pt modelId="{FC626B0E-4096-2449-9350-CEF7C8BC8D84}" type="sibTrans" cxnId="{5FB13606-FE12-3F4A-8841-52B2950EC4E9}">
+      <dgm:prSet/>
+      <dgm:spPr/>
+      <dgm:t>
+        <a:bodyPr/>
+        <a:lstStyle/>
+        <a:p>
+          <a:endParaRPr lang="en-US"/>
+        </a:p>
+      </dgm:t>
+    </dgm:pt>
+    <dgm:pt modelId="{2717B14F-8176-554A-97B9-E169C5F79749}">
+      <dgm:prSet phldrT="[Text]"/>
+      <dgm:spPr/>
+      <dgm:t>
+        <a:bodyPr/>
+        <a:lstStyle/>
+        <a:p>
+          <a:r>
+            <a:rPr lang="en-US" dirty="0" smtClean="0"/>
+            <a:t>Request new password</a:t>
+          </a:r>
+          <a:endParaRPr lang="en-US" dirty="0"/>
+        </a:p>
+      </dgm:t>
+    </dgm:pt>
+    <dgm:pt modelId="{FD077530-9C55-F147-A2D7-CF93F52203F1}" type="parTrans" cxnId="{BB694501-70D9-094D-8577-C6723E807448}">
+      <dgm:prSet/>
+      <dgm:spPr/>
+      <dgm:t>
+        <a:bodyPr/>
+        <a:lstStyle/>
+        <a:p>
+          <a:endParaRPr lang="en-US"/>
+        </a:p>
+      </dgm:t>
+    </dgm:pt>
+    <dgm:pt modelId="{242DE65B-52EE-8B43-8D97-F9A4C8FEAC8C}" type="sibTrans" cxnId="{BB694501-70D9-094D-8577-C6723E807448}">
+      <dgm:prSet/>
+      <dgm:spPr/>
+      <dgm:t>
+        <a:bodyPr/>
+        <a:lstStyle/>
+        <a:p>
+          <a:endParaRPr lang="en-US"/>
+        </a:p>
+      </dgm:t>
+    </dgm:pt>
+    <dgm:pt modelId="{19FDB6D1-5F54-F641-9F02-53D7CEC76D2D}">
+      <dgm:prSet phldrT="[Text]"/>
+      <dgm:spPr/>
+      <dgm:t>
+        <a:bodyPr/>
+        <a:lstStyle/>
+        <a:p>
+          <a:r>
+            <a:rPr lang="en-US" dirty="0" smtClean="0"/>
+            <a:t>New password requested</a:t>
+          </a:r>
+          <a:endParaRPr lang="en-US" dirty="0"/>
+        </a:p>
+      </dgm:t>
+    </dgm:pt>
+    <dgm:pt modelId="{34C074A2-BB88-1647-AB82-DF290D866137}" type="parTrans" cxnId="{8FD252AC-6AD3-C84F-9F70-8C5CC894D91F}">
+      <dgm:prSet/>
+      <dgm:spPr/>
+      <dgm:t>
+        <a:bodyPr/>
+        <a:lstStyle/>
+        <a:p>
+          <a:endParaRPr lang="en-US"/>
+        </a:p>
+      </dgm:t>
+    </dgm:pt>
+    <dgm:pt modelId="{397A75E5-469B-CC44-B6D0-18E8B87D2149}" type="sibTrans" cxnId="{8FD252AC-6AD3-C84F-9F70-8C5CC894D91F}">
+      <dgm:prSet/>
+      <dgm:spPr/>
+      <dgm:t>
+        <a:bodyPr/>
+        <a:lstStyle/>
+        <a:p>
+          <a:endParaRPr lang="en-US"/>
+        </a:p>
+      </dgm:t>
+    </dgm:pt>
+    <dgm:pt modelId="{A09B9644-7FA6-7143-8A5C-C9B622F4F633}">
+      <dgm:prSet phldrT="[Text]"/>
+      <dgm:spPr/>
+      <dgm:t>
+        <a:bodyPr/>
+        <a:lstStyle/>
+        <a:p>
+          <a:r>
+            <a:rPr lang="en-US" dirty="0" smtClean="0"/>
+            <a:t>New password</a:t>
+          </a:r>
+          <a:endParaRPr lang="en-US" dirty="0"/>
+        </a:p>
+      </dgm:t>
+    </dgm:pt>
+    <dgm:pt modelId="{C8884311-4A27-B54E-949A-2532E7E02161}" type="parTrans" cxnId="{7995DE0E-016C-FD49-A739-F2CCC5662572}">
+      <dgm:prSet/>
+      <dgm:spPr/>
+      <dgm:t>
+        <a:bodyPr/>
+        <a:lstStyle/>
+        <a:p>
+          <a:endParaRPr lang="en-US"/>
+        </a:p>
+      </dgm:t>
+    </dgm:pt>
+    <dgm:pt modelId="{955E7B5E-3951-3B4A-A671-050DB5FD3F36}" type="sibTrans" cxnId="{7995DE0E-016C-FD49-A739-F2CCC5662572}">
+      <dgm:prSet/>
+      <dgm:spPr/>
+      <dgm:t>
+        <a:bodyPr/>
+        <a:lstStyle/>
+        <a:p>
+          <a:endParaRPr lang="en-US"/>
+        </a:p>
+      </dgm:t>
+    </dgm:pt>
+    <dgm:pt modelId="{B99BCB02-8E6F-D646-B684-551AE4D43602}">
+      <dgm:prSet phldrT="[Text]"/>
+      <dgm:spPr/>
+      <dgm:t>
+        <a:bodyPr/>
+        <a:lstStyle/>
+        <a:p>
+          <a:r>
+            <a:rPr lang="en-US" dirty="0" smtClean="0"/>
+            <a:t>New password set</a:t>
+          </a:r>
+          <a:endParaRPr lang="en-US" dirty="0"/>
+        </a:p>
+      </dgm:t>
+    </dgm:pt>
+    <dgm:pt modelId="{8EE08340-D1E4-5343-B0A9-E615C7320568}" type="parTrans" cxnId="{C70BB2AA-5F8F-594F-9626-46C404EBD2CC}">
+      <dgm:prSet/>
+      <dgm:spPr/>
+      <dgm:t>
+        <a:bodyPr/>
+        <a:lstStyle/>
+        <a:p>
+          <a:endParaRPr lang="en-US"/>
+        </a:p>
+      </dgm:t>
+    </dgm:pt>
+    <dgm:pt modelId="{5A34F70F-2762-CA49-9F15-F48F66433ABA}" type="sibTrans" cxnId="{C70BB2AA-5F8F-594F-9626-46C404EBD2CC}">
       <dgm:prSet/>
       <dgm:spPr/>
       <dgm:t>
@@ -4880,7 +5012,7 @@
       <dgm:spPr/>
     </dgm:pt>
     <dgm:pt modelId="{0D82A4BC-6151-444A-AE4C-BAAE071D7942}" type="pres">
-      <dgm:prSet presAssocID="{B553BC4D-61CF-7644-A3F7-72D84096C05C}" presName="Name19" presStyleLbl="parChTrans1D2" presStyleIdx="0" presStyleCnt="9"/>
+      <dgm:prSet presAssocID="{B553BC4D-61CF-7644-A3F7-72D84096C05C}" presName="Name19" presStyleLbl="parChTrans1D2" presStyleIdx="0" presStyleCnt="10"/>
       <dgm:spPr/>
       <dgm:t>
         <a:bodyPr/>
@@ -4895,7 +5027,7 @@
       <dgm:spPr/>
     </dgm:pt>
     <dgm:pt modelId="{12C9B420-269F-B448-B3CF-A84B7F528FC4}" type="pres">
-      <dgm:prSet presAssocID="{11CEE5C9-55A8-824F-BA9B-B1A4975FA82D}" presName="level2Shape" presStyleLbl="node2" presStyleIdx="0" presStyleCnt="9"/>
+      <dgm:prSet presAssocID="{11CEE5C9-55A8-824F-BA9B-B1A4975FA82D}" presName="level2Shape" presStyleLbl="node2" presStyleIdx="0" presStyleCnt="10"/>
       <dgm:spPr/>
       <dgm:t>
         <a:bodyPr/>
@@ -4910,15 +5042,22 @@
       <dgm:spPr/>
     </dgm:pt>
     <dgm:pt modelId="{8316F2DF-DD2A-8E48-946E-48A76CDB1EFF}" type="pres">
-      <dgm:prSet presAssocID="{B389AACB-65A0-3C4C-8335-69872F34AAF1}" presName="Name19" presStyleLbl="parChTrans1D3" presStyleIdx="0" presStyleCnt="11"/>
-      <dgm:spPr/>
+      <dgm:prSet presAssocID="{B389AACB-65A0-3C4C-8335-69872F34AAF1}" presName="Name19" presStyleLbl="parChTrans1D3" presStyleIdx="0" presStyleCnt="14"/>
+      <dgm:spPr/>
+      <dgm:t>
+        <a:bodyPr/>
+        <a:lstStyle/>
+        <a:p>
+          <a:endParaRPr lang="en-US"/>
+        </a:p>
+      </dgm:t>
     </dgm:pt>
     <dgm:pt modelId="{001352FD-AF84-5549-8DCE-A4C2477CAD79}" type="pres">
       <dgm:prSet presAssocID="{C9A84787-0323-8A4E-90E9-89F75A92AAFB}" presName="Name21" presStyleCnt="0"/>
       <dgm:spPr/>
     </dgm:pt>
     <dgm:pt modelId="{53A888AF-5866-BE41-B4AC-8AF29619D1B4}" type="pres">
-      <dgm:prSet presAssocID="{C9A84787-0323-8A4E-90E9-89F75A92AAFB}" presName="level2Shape" presStyleLbl="node3" presStyleIdx="0" presStyleCnt="11"/>
+      <dgm:prSet presAssocID="{C9A84787-0323-8A4E-90E9-89F75A92AAFB}" presName="level2Shape" presStyleLbl="node3" presStyleIdx="0" presStyleCnt="14"/>
       <dgm:spPr/>
       <dgm:t>
         <a:bodyPr/>
@@ -4933,15 +5072,22 @@
       <dgm:spPr/>
     </dgm:pt>
     <dgm:pt modelId="{CD007CCC-3B62-6C49-ADE7-5083587358A7}" type="pres">
-      <dgm:prSet presAssocID="{565472C5-351A-6A47-B1DB-5960ECA48A59}" presName="Name19" presStyleLbl="parChTrans1D3" presStyleIdx="1" presStyleCnt="11"/>
-      <dgm:spPr/>
+      <dgm:prSet presAssocID="{565472C5-351A-6A47-B1DB-5960ECA48A59}" presName="Name19" presStyleLbl="parChTrans1D3" presStyleIdx="1" presStyleCnt="14"/>
+      <dgm:spPr/>
+      <dgm:t>
+        <a:bodyPr/>
+        <a:lstStyle/>
+        <a:p>
+          <a:endParaRPr lang="en-US"/>
+        </a:p>
+      </dgm:t>
     </dgm:pt>
     <dgm:pt modelId="{291E048E-622D-B549-9E50-CF339E9E9473}" type="pres">
       <dgm:prSet presAssocID="{AFF1DCCA-869E-BF48-AE70-D7CF6058A3D5}" presName="Name21" presStyleCnt="0"/>
       <dgm:spPr/>
     </dgm:pt>
     <dgm:pt modelId="{BC751D51-4F41-0C4C-BB56-9A90DE65521B}" type="pres">
-      <dgm:prSet presAssocID="{AFF1DCCA-869E-BF48-AE70-D7CF6058A3D5}" presName="level2Shape" presStyleLbl="node3" presStyleIdx="1" presStyleCnt="11"/>
+      <dgm:prSet presAssocID="{AFF1DCCA-869E-BF48-AE70-D7CF6058A3D5}" presName="level2Shape" presStyleLbl="node3" presStyleIdx="1" presStyleCnt="14"/>
       <dgm:spPr/>
       <dgm:t>
         <a:bodyPr/>
@@ -4956,15 +5102,22 @@
       <dgm:spPr/>
     </dgm:pt>
     <dgm:pt modelId="{D9DBFFB4-8C94-E940-A3D9-A7AA44617C3E}" type="pres">
-      <dgm:prSet presAssocID="{CF3DDBE3-3740-2A49-A874-6D55EA8D317D}" presName="Name19" presStyleLbl="parChTrans1D2" presStyleIdx="1" presStyleCnt="9"/>
-      <dgm:spPr/>
+      <dgm:prSet presAssocID="{CF3DDBE3-3740-2A49-A874-6D55EA8D317D}" presName="Name19" presStyleLbl="parChTrans1D2" presStyleIdx="1" presStyleCnt="10"/>
+      <dgm:spPr/>
+      <dgm:t>
+        <a:bodyPr/>
+        <a:lstStyle/>
+        <a:p>
+          <a:endParaRPr lang="en-US"/>
+        </a:p>
+      </dgm:t>
     </dgm:pt>
     <dgm:pt modelId="{1E05E306-4C52-9640-9B30-DCC1062329A4}" type="pres">
       <dgm:prSet presAssocID="{71398A0F-548E-1A44-AE3C-D0DB9FAF7317}" presName="Name21" presStyleCnt="0"/>
       <dgm:spPr/>
     </dgm:pt>
     <dgm:pt modelId="{269B7467-8696-5441-AEEE-597206F1FA7D}" type="pres">
-      <dgm:prSet presAssocID="{71398A0F-548E-1A44-AE3C-D0DB9FAF7317}" presName="level2Shape" presStyleLbl="node2" presStyleIdx="1" presStyleCnt="9"/>
+      <dgm:prSet presAssocID="{71398A0F-548E-1A44-AE3C-D0DB9FAF7317}" presName="level2Shape" presStyleLbl="node2" presStyleIdx="1" presStyleCnt="10"/>
       <dgm:spPr/>
       <dgm:t>
         <a:bodyPr/>
@@ -4979,15 +5132,22 @@
       <dgm:spPr/>
     </dgm:pt>
     <dgm:pt modelId="{9CC7233D-5EBE-434D-918B-6C3475B044D5}" type="pres">
-      <dgm:prSet presAssocID="{8B6A1C9F-193E-F140-8F56-EF24093EA1A3}" presName="Name19" presStyleLbl="parChTrans1D2" presStyleIdx="2" presStyleCnt="9"/>
-      <dgm:spPr/>
+      <dgm:prSet presAssocID="{8B6A1C9F-193E-F140-8F56-EF24093EA1A3}" presName="Name19" presStyleLbl="parChTrans1D2" presStyleIdx="2" presStyleCnt="10"/>
+      <dgm:spPr/>
+      <dgm:t>
+        <a:bodyPr/>
+        <a:lstStyle/>
+        <a:p>
+          <a:endParaRPr lang="en-US"/>
+        </a:p>
+      </dgm:t>
     </dgm:pt>
     <dgm:pt modelId="{F0610573-D317-B345-B1F9-6B1DF5B67805}" type="pres">
       <dgm:prSet presAssocID="{04B48503-EDAF-124A-A72B-687EDDA05988}" presName="Name21" presStyleCnt="0"/>
       <dgm:spPr/>
     </dgm:pt>
     <dgm:pt modelId="{2DDCA4E4-DC97-9B48-8E04-20AD3E254FEE}" type="pres">
-      <dgm:prSet presAssocID="{04B48503-EDAF-124A-A72B-687EDDA05988}" presName="level2Shape" presStyleLbl="node2" presStyleIdx="2" presStyleCnt="9"/>
+      <dgm:prSet presAssocID="{04B48503-EDAF-124A-A72B-687EDDA05988}" presName="level2Shape" presStyleLbl="node2" presStyleIdx="2" presStyleCnt="10"/>
       <dgm:spPr/>
       <dgm:t>
         <a:bodyPr/>
@@ -5002,15 +5162,22 @@
       <dgm:spPr/>
     </dgm:pt>
     <dgm:pt modelId="{0B36DFB8-E481-9846-9713-FD9BC35589F9}" type="pres">
-      <dgm:prSet presAssocID="{8D88936D-7A95-4542-A4C8-704063821867}" presName="Name19" presStyleLbl="parChTrans1D3" presStyleIdx="2" presStyleCnt="11"/>
-      <dgm:spPr/>
+      <dgm:prSet presAssocID="{8D88936D-7A95-4542-A4C8-704063821867}" presName="Name19" presStyleLbl="parChTrans1D2" presStyleIdx="3" presStyleCnt="10"/>
+      <dgm:spPr/>
+      <dgm:t>
+        <a:bodyPr/>
+        <a:lstStyle/>
+        <a:p>
+          <a:endParaRPr lang="en-US"/>
+        </a:p>
+      </dgm:t>
     </dgm:pt>
     <dgm:pt modelId="{2C11E41E-7436-194E-9EBF-729F1BBD1D14}" type="pres">
       <dgm:prSet presAssocID="{AF5EC167-24DD-F44E-AA98-41BF347B8425}" presName="Name21" presStyleCnt="0"/>
       <dgm:spPr/>
     </dgm:pt>
     <dgm:pt modelId="{FFB44854-B8FE-0946-878F-79A27639517F}" type="pres">
-      <dgm:prSet presAssocID="{AF5EC167-24DD-F44E-AA98-41BF347B8425}" presName="level2Shape" presStyleLbl="node3" presStyleIdx="2" presStyleCnt="11"/>
+      <dgm:prSet presAssocID="{AF5EC167-24DD-F44E-AA98-41BF347B8425}" presName="level2Shape" presStyleLbl="node2" presStyleIdx="3" presStyleCnt="10"/>
       <dgm:spPr/>
       <dgm:t>
         <a:bodyPr/>
@@ -5024,16 +5191,115 @@
       <dgm:prSet presAssocID="{AF5EC167-24DD-F44E-AA98-41BF347B8425}" presName="hierChild3" presStyleCnt="0"/>
       <dgm:spPr/>
     </dgm:pt>
+    <dgm:pt modelId="{0FBD2D58-EF12-A64D-87FA-CFDF18228DF6}" type="pres">
+      <dgm:prSet presAssocID="{FD077530-9C55-F147-A2D7-CF93F52203F1}" presName="Name19" presStyleLbl="parChTrans1D3" presStyleIdx="2" presStyleCnt="14"/>
+      <dgm:spPr/>
+    </dgm:pt>
+    <dgm:pt modelId="{24F6BC4D-BE8C-7D46-BA5B-96781C2E1354}" type="pres">
+      <dgm:prSet presAssocID="{2717B14F-8176-554A-97B9-E169C5F79749}" presName="Name21" presStyleCnt="0"/>
+      <dgm:spPr/>
+    </dgm:pt>
+    <dgm:pt modelId="{B61B0D98-773A-8A4F-9F5C-8FBDD5C64421}" type="pres">
+      <dgm:prSet presAssocID="{2717B14F-8176-554A-97B9-E169C5F79749}" presName="level2Shape" presStyleLbl="node3" presStyleIdx="2" presStyleCnt="14"/>
+      <dgm:spPr/>
+      <dgm:t>
+        <a:bodyPr/>
+        <a:lstStyle/>
+        <a:p>
+          <a:endParaRPr lang="en-US"/>
+        </a:p>
+      </dgm:t>
+    </dgm:pt>
+    <dgm:pt modelId="{E67B78C6-1670-5C4D-AEFA-B64BDE10CCA2}" type="pres">
+      <dgm:prSet presAssocID="{2717B14F-8176-554A-97B9-E169C5F79749}" presName="hierChild3" presStyleCnt="0"/>
+      <dgm:spPr/>
+    </dgm:pt>
+    <dgm:pt modelId="{03358BE9-0182-7E4E-A763-7930CEF1BE29}" type="pres">
+      <dgm:prSet presAssocID="{34C074A2-BB88-1647-AB82-DF290D866137}" presName="Name19" presStyleLbl="parChTrans1D3" presStyleIdx="3" presStyleCnt="14"/>
+      <dgm:spPr/>
+    </dgm:pt>
+    <dgm:pt modelId="{CCEBFB4C-AFB7-4A4F-AC97-F6D5111D7794}" type="pres">
+      <dgm:prSet presAssocID="{19FDB6D1-5F54-F641-9F02-53D7CEC76D2D}" presName="Name21" presStyleCnt="0"/>
+      <dgm:spPr/>
+    </dgm:pt>
+    <dgm:pt modelId="{73AE1126-45AE-7D4B-AEAB-0A1BD05E96C6}" type="pres">
+      <dgm:prSet presAssocID="{19FDB6D1-5F54-F641-9F02-53D7CEC76D2D}" presName="level2Shape" presStyleLbl="node3" presStyleIdx="3" presStyleCnt="14"/>
+      <dgm:spPr/>
+      <dgm:t>
+        <a:bodyPr/>
+        <a:lstStyle/>
+        <a:p>
+          <a:endParaRPr lang="en-US"/>
+        </a:p>
+      </dgm:t>
+    </dgm:pt>
+    <dgm:pt modelId="{0D8001B6-1F62-7347-80B0-53367C52DD0D}" type="pres">
+      <dgm:prSet presAssocID="{19FDB6D1-5F54-F641-9F02-53D7CEC76D2D}" presName="hierChild3" presStyleCnt="0"/>
+      <dgm:spPr/>
+    </dgm:pt>
+    <dgm:pt modelId="{D2DB1DBF-8571-DA41-83F6-BBA6615036F3}" type="pres">
+      <dgm:prSet presAssocID="{C8884311-4A27-B54E-949A-2532E7E02161}" presName="Name19" presStyleLbl="parChTrans1D3" presStyleIdx="4" presStyleCnt="14"/>
+      <dgm:spPr/>
+    </dgm:pt>
+    <dgm:pt modelId="{52723E65-DE6C-5641-8761-F4078E2E2E83}" type="pres">
+      <dgm:prSet presAssocID="{A09B9644-7FA6-7143-8A5C-C9B622F4F633}" presName="Name21" presStyleCnt="0"/>
+      <dgm:spPr/>
+    </dgm:pt>
+    <dgm:pt modelId="{EE67847A-DFFD-9745-98B7-329C5757B5C4}" type="pres">
+      <dgm:prSet presAssocID="{A09B9644-7FA6-7143-8A5C-C9B622F4F633}" presName="level2Shape" presStyleLbl="node3" presStyleIdx="4" presStyleCnt="14"/>
+      <dgm:spPr/>
+      <dgm:t>
+        <a:bodyPr/>
+        <a:lstStyle/>
+        <a:p>
+          <a:endParaRPr lang="en-US"/>
+        </a:p>
+      </dgm:t>
+    </dgm:pt>
+    <dgm:pt modelId="{2818BC2C-4E32-804F-A390-E27DA77AB807}" type="pres">
+      <dgm:prSet presAssocID="{A09B9644-7FA6-7143-8A5C-C9B622F4F633}" presName="hierChild3" presStyleCnt="0"/>
+      <dgm:spPr/>
+    </dgm:pt>
+    <dgm:pt modelId="{CD1DBAD6-C94F-5C43-8507-9B507D8DA318}" type="pres">
+      <dgm:prSet presAssocID="{8EE08340-D1E4-5343-B0A9-E615C7320568}" presName="Name19" presStyleLbl="parChTrans1D3" presStyleIdx="5" presStyleCnt="14"/>
+      <dgm:spPr/>
+    </dgm:pt>
+    <dgm:pt modelId="{A5C03BAB-7388-D441-8EB2-784521E2BABF}" type="pres">
+      <dgm:prSet presAssocID="{B99BCB02-8E6F-D646-B684-551AE4D43602}" presName="Name21" presStyleCnt="0"/>
+      <dgm:spPr/>
+    </dgm:pt>
+    <dgm:pt modelId="{AC7565D8-1DCE-B548-989A-B43E0C1DF906}" type="pres">
+      <dgm:prSet presAssocID="{B99BCB02-8E6F-D646-B684-551AE4D43602}" presName="level2Shape" presStyleLbl="node3" presStyleIdx="5" presStyleCnt="14"/>
+      <dgm:spPr/>
+      <dgm:t>
+        <a:bodyPr/>
+        <a:lstStyle/>
+        <a:p>
+          <a:endParaRPr lang="en-US"/>
+        </a:p>
+      </dgm:t>
+    </dgm:pt>
+    <dgm:pt modelId="{F1A3228D-580E-D245-82E7-69AC916AD68A}" type="pres">
+      <dgm:prSet presAssocID="{B99BCB02-8E6F-D646-B684-551AE4D43602}" presName="hierChild3" presStyleCnt="0"/>
+      <dgm:spPr/>
+    </dgm:pt>
     <dgm:pt modelId="{B3E752D9-0DAF-4643-8967-E6BACF17435F}" type="pres">
-      <dgm:prSet presAssocID="{7BB740C9-3C6B-E443-9D37-10BEEA9FF1F8}" presName="Name19" presStyleLbl="parChTrans1D2" presStyleIdx="3" presStyleCnt="9"/>
-      <dgm:spPr/>
+      <dgm:prSet presAssocID="{7BB740C9-3C6B-E443-9D37-10BEEA9FF1F8}" presName="Name19" presStyleLbl="parChTrans1D2" presStyleIdx="4" presStyleCnt="10"/>
+      <dgm:spPr/>
+      <dgm:t>
+        <a:bodyPr/>
+        <a:lstStyle/>
+        <a:p>
+          <a:endParaRPr lang="en-US"/>
+        </a:p>
+      </dgm:t>
     </dgm:pt>
     <dgm:pt modelId="{41CE3A08-1D56-5F41-A13F-90CE1E333198}" type="pres">
       <dgm:prSet presAssocID="{86E1B045-1E46-F64C-9527-DBC0BBCF8E48}" presName="Name21" presStyleCnt="0"/>
       <dgm:spPr/>
     </dgm:pt>
     <dgm:pt modelId="{B9972A86-A3F6-6A47-B03A-39E4AB3F09BA}" type="pres">
-      <dgm:prSet presAssocID="{86E1B045-1E46-F64C-9527-DBC0BBCF8E48}" presName="level2Shape" presStyleLbl="node2" presStyleIdx="3" presStyleCnt="9"/>
+      <dgm:prSet presAssocID="{86E1B045-1E46-F64C-9527-DBC0BBCF8E48}" presName="level2Shape" presStyleLbl="node2" presStyleIdx="4" presStyleCnt="10"/>
       <dgm:spPr/>
       <dgm:t>
         <a:bodyPr/>
@@ -5048,7 +5314,7 @@
       <dgm:spPr/>
     </dgm:pt>
     <dgm:pt modelId="{80B1EB63-517B-3F41-96A4-C449E7CE44F1}" type="pres">
-      <dgm:prSet presAssocID="{7F9CEABB-4961-654E-95FD-0D8597210B7D}" presName="Name19" presStyleLbl="parChTrans1D2" presStyleIdx="4" presStyleCnt="9"/>
+      <dgm:prSet presAssocID="{7F9CEABB-4961-654E-95FD-0D8597210B7D}" presName="Name19" presStyleLbl="parChTrans1D2" presStyleIdx="5" presStyleCnt="10"/>
       <dgm:spPr/>
       <dgm:t>
         <a:bodyPr/>
@@ -5063,7 +5329,7 @@
       <dgm:spPr/>
     </dgm:pt>
     <dgm:pt modelId="{20AF6D03-8BA3-6D4D-91D6-6BB621334EE0}" type="pres">
-      <dgm:prSet presAssocID="{47B2B18F-98B9-8148-B6DC-60798A233A44}" presName="level2Shape" presStyleLbl="node2" presStyleIdx="4" presStyleCnt="9"/>
+      <dgm:prSet presAssocID="{47B2B18F-98B9-8148-B6DC-60798A233A44}" presName="level2Shape" presStyleLbl="node2" presStyleIdx="5" presStyleCnt="10"/>
       <dgm:spPr/>
       <dgm:t>
         <a:bodyPr/>
@@ -5078,7 +5344,7 @@
       <dgm:spPr/>
     </dgm:pt>
     <dgm:pt modelId="{ADA2498B-E8FE-E24A-80A0-32101A6C19E4}" type="pres">
-      <dgm:prSet presAssocID="{AC8A1B67-7F4A-5949-8EE9-C24CD7CEFEF5}" presName="Name19" presStyleLbl="parChTrans1D3" presStyleIdx="3" presStyleCnt="11"/>
+      <dgm:prSet presAssocID="{AC8A1B67-7F4A-5949-8EE9-C24CD7CEFEF5}" presName="Name19" presStyleLbl="parChTrans1D3" presStyleIdx="6" presStyleCnt="14"/>
       <dgm:spPr/>
       <dgm:t>
         <a:bodyPr/>
@@ -5093,7 +5359,7 @@
       <dgm:spPr/>
     </dgm:pt>
     <dgm:pt modelId="{60EB5E65-BE5E-A245-8575-5652AC14C400}" type="pres">
-      <dgm:prSet presAssocID="{4D96A72B-37A5-1442-826F-A659684CD6CD}" presName="level2Shape" presStyleLbl="node3" presStyleIdx="3" presStyleCnt="11"/>
+      <dgm:prSet presAssocID="{4D96A72B-37A5-1442-826F-A659684CD6CD}" presName="level2Shape" presStyleLbl="node3" presStyleIdx="6" presStyleCnt="14"/>
       <dgm:spPr/>
       <dgm:t>
         <a:bodyPr/>
@@ -5108,15 +5374,22 @@
       <dgm:spPr/>
     </dgm:pt>
     <dgm:pt modelId="{DFC1035A-BB9E-D54B-9D3B-A59CC7894DEC}" type="pres">
-      <dgm:prSet presAssocID="{ABF4A1D2-B6C2-CD47-9705-3E8BBD120A32}" presName="Name19" presStyleLbl="parChTrans1D3" presStyleIdx="4" presStyleCnt="11"/>
-      <dgm:spPr/>
+      <dgm:prSet presAssocID="{ABF4A1D2-B6C2-CD47-9705-3E8BBD120A32}" presName="Name19" presStyleLbl="parChTrans1D3" presStyleIdx="7" presStyleCnt="14"/>
+      <dgm:spPr/>
+      <dgm:t>
+        <a:bodyPr/>
+        <a:lstStyle/>
+        <a:p>
+          <a:endParaRPr lang="en-US"/>
+        </a:p>
+      </dgm:t>
     </dgm:pt>
     <dgm:pt modelId="{591D3DFF-7032-6149-B0CD-D4B19C5BB4BE}" type="pres">
       <dgm:prSet presAssocID="{F60CC18C-83C4-F346-8211-E18E63B32600}" presName="Name21" presStyleCnt="0"/>
       <dgm:spPr/>
     </dgm:pt>
     <dgm:pt modelId="{791F7BEF-D996-8F40-947C-A8E13C456870}" type="pres">
-      <dgm:prSet presAssocID="{F60CC18C-83C4-F346-8211-E18E63B32600}" presName="level2Shape" presStyleLbl="node3" presStyleIdx="4" presStyleCnt="11"/>
+      <dgm:prSet presAssocID="{F60CC18C-83C4-F346-8211-E18E63B32600}" presName="level2Shape" presStyleLbl="node3" presStyleIdx="7" presStyleCnt="14"/>
       <dgm:spPr/>
       <dgm:t>
         <a:bodyPr/>
@@ -5131,15 +5404,22 @@
       <dgm:spPr/>
     </dgm:pt>
     <dgm:pt modelId="{BAAAE675-372E-C64C-9DFC-2334B74F5B6F}" type="pres">
-      <dgm:prSet presAssocID="{CCA98178-CECF-1F4E-9BB9-3BEC8B837EE3}" presName="Name19" presStyleLbl="parChTrans1D3" presStyleIdx="5" presStyleCnt="11"/>
-      <dgm:spPr/>
+      <dgm:prSet presAssocID="{CCA98178-CECF-1F4E-9BB9-3BEC8B837EE3}" presName="Name19" presStyleLbl="parChTrans1D3" presStyleIdx="8" presStyleCnt="14"/>
+      <dgm:spPr/>
+      <dgm:t>
+        <a:bodyPr/>
+        <a:lstStyle/>
+        <a:p>
+          <a:endParaRPr lang="en-US"/>
+        </a:p>
+      </dgm:t>
     </dgm:pt>
     <dgm:pt modelId="{16884831-6200-EB47-B8D0-9544F3BDE7AD}" type="pres">
       <dgm:prSet presAssocID="{A589F188-5BBE-F740-BFB4-D28F42C9054B}" presName="Name21" presStyleCnt="0"/>
       <dgm:spPr/>
     </dgm:pt>
     <dgm:pt modelId="{40CEBFD4-83C3-5846-8D33-3AB5A5D95710}" type="pres">
-      <dgm:prSet presAssocID="{A589F188-5BBE-F740-BFB4-D28F42C9054B}" presName="level2Shape" presStyleLbl="node3" presStyleIdx="5" presStyleCnt="11"/>
+      <dgm:prSet presAssocID="{A589F188-5BBE-F740-BFB4-D28F42C9054B}" presName="level2Shape" presStyleLbl="node3" presStyleIdx="8" presStyleCnt="14"/>
       <dgm:spPr/>
       <dgm:t>
         <a:bodyPr/>
@@ -5156,6 +5436,13 @@
     <dgm:pt modelId="{4ED9CBD7-1C8C-C54E-9E04-D4219E6BDA6C}" type="pres">
       <dgm:prSet presAssocID="{2EABAA00-FA88-F148-B820-9944C2D1315F}" presName="Name19" presStyleLbl="parChTrans1D4" presStyleIdx="0" presStyleCnt="3"/>
       <dgm:spPr/>
+      <dgm:t>
+        <a:bodyPr/>
+        <a:lstStyle/>
+        <a:p>
+          <a:endParaRPr lang="en-US"/>
+        </a:p>
+      </dgm:t>
     </dgm:pt>
     <dgm:pt modelId="{90247BF8-FC62-FA4F-AEAA-2288D383D8CF}" type="pres">
       <dgm:prSet presAssocID="{7E411DBC-2DFF-4C44-B6DD-823D0B55806D}" presName="Name21" presStyleCnt="0"/>
@@ -5179,6 +5466,13 @@
     <dgm:pt modelId="{A6050186-D63E-864F-A7FB-933DDE98E4D9}" type="pres">
       <dgm:prSet presAssocID="{4CF9A705-81A8-9E42-954E-6883CF32CF33}" presName="Name19" presStyleLbl="parChTrans1D4" presStyleIdx="1" presStyleCnt="3"/>
       <dgm:spPr/>
+      <dgm:t>
+        <a:bodyPr/>
+        <a:lstStyle/>
+        <a:p>
+          <a:endParaRPr lang="en-US"/>
+        </a:p>
+      </dgm:t>
     </dgm:pt>
     <dgm:pt modelId="{D9327323-72DE-6542-85A1-B063B921C4AC}" type="pres">
       <dgm:prSet presAssocID="{C6EF9F61-C6F2-2840-817E-27593EF1F892}" presName="Name21" presStyleCnt="0"/>
@@ -5202,6 +5496,13 @@
     <dgm:pt modelId="{54C8F112-08DD-E246-B5F5-9F8A7B221232}" type="pres">
       <dgm:prSet presAssocID="{F194F0AE-AB76-F348-A956-3ED3C3897464}" presName="Name19" presStyleLbl="parChTrans1D4" presStyleIdx="2" presStyleCnt="3"/>
       <dgm:spPr/>
+      <dgm:t>
+        <a:bodyPr/>
+        <a:lstStyle/>
+        <a:p>
+          <a:endParaRPr lang="en-US"/>
+        </a:p>
+      </dgm:t>
     </dgm:pt>
     <dgm:pt modelId="{75FE0E9C-D2E6-744F-BFA2-2C536B47FEDF}" type="pres">
       <dgm:prSet presAssocID="{7FC6DCAF-29CF-AD4D-99B2-D927A75175E4}" presName="Name21" presStyleCnt="0"/>
@@ -5223,15 +5524,22 @@
       <dgm:spPr/>
     </dgm:pt>
     <dgm:pt modelId="{034F9D08-26B7-464C-98E8-BCC74B452887}" type="pres">
-      <dgm:prSet presAssocID="{821B0846-6DAD-AC47-AC11-56F49A32E885}" presName="Name19" presStyleLbl="parChTrans1D3" presStyleIdx="6" presStyleCnt="11"/>
-      <dgm:spPr/>
+      <dgm:prSet presAssocID="{821B0846-6DAD-AC47-AC11-56F49A32E885}" presName="Name19" presStyleLbl="parChTrans1D3" presStyleIdx="9" presStyleCnt="14"/>
+      <dgm:spPr/>
+      <dgm:t>
+        <a:bodyPr/>
+        <a:lstStyle/>
+        <a:p>
+          <a:endParaRPr lang="en-US"/>
+        </a:p>
+      </dgm:t>
     </dgm:pt>
     <dgm:pt modelId="{C2447EB8-10DA-8040-9CDB-96BEA82F80AD}" type="pres">
       <dgm:prSet presAssocID="{5C51E9B1-B92E-C046-88B1-D25E745B1F88}" presName="Name21" presStyleCnt="0"/>
       <dgm:spPr/>
     </dgm:pt>
     <dgm:pt modelId="{2BCF6A44-CA3B-1D40-8C2A-66704108E553}" type="pres">
-      <dgm:prSet presAssocID="{5C51E9B1-B92E-C046-88B1-D25E745B1F88}" presName="level2Shape" presStyleLbl="node3" presStyleIdx="6" presStyleCnt="11"/>
+      <dgm:prSet presAssocID="{5C51E9B1-B92E-C046-88B1-D25E745B1F88}" presName="level2Shape" presStyleLbl="node3" presStyleIdx="9" presStyleCnt="14"/>
       <dgm:spPr/>
       <dgm:t>
         <a:bodyPr/>
@@ -5246,15 +5554,22 @@
       <dgm:spPr/>
     </dgm:pt>
     <dgm:pt modelId="{834ED12A-98BA-124A-83D0-5AF8577A70A7}" type="pres">
-      <dgm:prSet presAssocID="{A2E7E8AA-252B-964D-A76D-D1DBFC905610}" presName="Name19" presStyleLbl="parChTrans1D2" presStyleIdx="5" presStyleCnt="9"/>
-      <dgm:spPr/>
+      <dgm:prSet presAssocID="{A2E7E8AA-252B-964D-A76D-D1DBFC905610}" presName="Name19" presStyleLbl="parChTrans1D2" presStyleIdx="6" presStyleCnt="10"/>
+      <dgm:spPr/>
+      <dgm:t>
+        <a:bodyPr/>
+        <a:lstStyle/>
+        <a:p>
+          <a:endParaRPr lang="en-US"/>
+        </a:p>
+      </dgm:t>
     </dgm:pt>
     <dgm:pt modelId="{3E764FDF-70AF-744D-9113-F327B8103226}" type="pres">
       <dgm:prSet presAssocID="{FFE4763F-6D4A-C84C-AFD7-E49DFFC00531}" presName="Name21" presStyleCnt="0"/>
       <dgm:spPr/>
     </dgm:pt>
     <dgm:pt modelId="{51B4BBB9-653E-4141-A21A-A8C05AC8F6E9}" type="pres">
-      <dgm:prSet presAssocID="{FFE4763F-6D4A-C84C-AFD7-E49DFFC00531}" presName="level2Shape" presStyleLbl="node2" presStyleIdx="5" presStyleCnt="9"/>
+      <dgm:prSet presAssocID="{FFE4763F-6D4A-C84C-AFD7-E49DFFC00531}" presName="level2Shape" presStyleLbl="node2" presStyleIdx="6" presStyleCnt="10"/>
       <dgm:spPr/>
       <dgm:t>
         <a:bodyPr/>
@@ -5269,15 +5584,22 @@
       <dgm:spPr/>
     </dgm:pt>
     <dgm:pt modelId="{A40373D9-960F-7F4D-98E8-A9FB2DBB29E2}" type="pres">
-      <dgm:prSet presAssocID="{DBA8AE41-0903-444F-9B01-6312C83579CF}" presName="Name19" presStyleLbl="parChTrans1D3" presStyleIdx="7" presStyleCnt="11"/>
-      <dgm:spPr/>
+      <dgm:prSet presAssocID="{DBA8AE41-0903-444F-9B01-6312C83579CF}" presName="Name19" presStyleLbl="parChTrans1D3" presStyleIdx="10" presStyleCnt="14"/>
+      <dgm:spPr/>
+      <dgm:t>
+        <a:bodyPr/>
+        <a:lstStyle/>
+        <a:p>
+          <a:endParaRPr lang="en-US"/>
+        </a:p>
+      </dgm:t>
     </dgm:pt>
     <dgm:pt modelId="{57CDE762-82EA-6842-8CF9-08E516C49471}" type="pres">
       <dgm:prSet presAssocID="{4AED2AC5-539B-814B-BCC3-6C935DA3172A}" presName="Name21" presStyleCnt="0"/>
       <dgm:spPr/>
     </dgm:pt>
     <dgm:pt modelId="{0015D2B2-ADA6-6649-8987-33BF465BA00F}" type="pres">
-      <dgm:prSet presAssocID="{4AED2AC5-539B-814B-BCC3-6C935DA3172A}" presName="level2Shape" presStyleLbl="node3" presStyleIdx="7" presStyleCnt="11"/>
+      <dgm:prSet presAssocID="{4AED2AC5-539B-814B-BCC3-6C935DA3172A}" presName="level2Shape" presStyleLbl="node3" presStyleIdx="10" presStyleCnt="14"/>
       <dgm:spPr/>
       <dgm:t>
         <a:bodyPr/>
@@ -5292,15 +5614,22 @@
       <dgm:spPr/>
     </dgm:pt>
     <dgm:pt modelId="{9BC4EC78-B262-C048-A423-4D9CB8008025}" type="pres">
-      <dgm:prSet presAssocID="{4D14F183-C4D9-224B-9EE1-AA4BC4453985}" presName="Name19" presStyleLbl="parChTrans1D3" presStyleIdx="8" presStyleCnt="11"/>
-      <dgm:spPr/>
+      <dgm:prSet presAssocID="{4D14F183-C4D9-224B-9EE1-AA4BC4453985}" presName="Name19" presStyleLbl="parChTrans1D3" presStyleIdx="11" presStyleCnt="14"/>
+      <dgm:spPr/>
+      <dgm:t>
+        <a:bodyPr/>
+        <a:lstStyle/>
+        <a:p>
+          <a:endParaRPr lang="en-US"/>
+        </a:p>
+      </dgm:t>
     </dgm:pt>
     <dgm:pt modelId="{B8C2FE83-781E-854B-987A-AFDDF72FABFB}" type="pres">
       <dgm:prSet presAssocID="{2C521B09-C2A6-304A-ADB7-EE19CB526CFC}" presName="Name21" presStyleCnt="0"/>
       <dgm:spPr/>
     </dgm:pt>
     <dgm:pt modelId="{23F9216E-C7F3-D141-BA72-240F3E70368A}" type="pres">
-      <dgm:prSet presAssocID="{2C521B09-C2A6-304A-ADB7-EE19CB526CFC}" presName="level2Shape" presStyleLbl="node3" presStyleIdx="8" presStyleCnt="11"/>
+      <dgm:prSet presAssocID="{2C521B09-C2A6-304A-ADB7-EE19CB526CFC}" presName="level2Shape" presStyleLbl="node3" presStyleIdx="11" presStyleCnt="14"/>
       <dgm:spPr/>
       <dgm:t>
         <a:bodyPr/>
@@ -5315,15 +5644,22 @@
       <dgm:spPr/>
     </dgm:pt>
     <dgm:pt modelId="{0FCD18C0-4738-0C42-96A8-68D42D113DA2}" type="pres">
-      <dgm:prSet presAssocID="{08EA561E-9636-5841-927B-5ABC9CBCAD65}" presName="Name19" presStyleLbl="parChTrans1D3" presStyleIdx="9" presStyleCnt="11"/>
-      <dgm:spPr/>
+      <dgm:prSet presAssocID="{08EA561E-9636-5841-927B-5ABC9CBCAD65}" presName="Name19" presStyleLbl="parChTrans1D3" presStyleIdx="12" presStyleCnt="14"/>
+      <dgm:spPr/>
+      <dgm:t>
+        <a:bodyPr/>
+        <a:lstStyle/>
+        <a:p>
+          <a:endParaRPr lang="en-US"/>
+        </a:p>
+      </dgm:t>
     </dgm:pt>
     <dgm:pt modelId="{CF664FB0-3BC3-3E43-9959-BF106B1F656D}" type="pres">
       <dgm:prSet presAssocID="{83D1D0E0-4D8F-2B4C-BA91-E46EEBA26BAB}" presName="Name21" presStyleCnt="0"/>
       <dgm:spPr/>
     </dgm:pt>
     <dgm:pt modelId="{0B4D4399-C510-AB4D-85AB-C3558C55314B}" type="pres">
-      <dgm:prSet presAssocID="{83D1D0E0-4D8F-2B4C-BA91-E46EEBA26BAB}" presName="level2Shape" presStyleLbl="node3" presStyleIdx="9" presStyleCnt="11"/>
+      <dgm:prSet presAssocID="{83D1D0E0-4D8F-2B4C-BA91-E46EEBA26BAB}" presName="level2Shape" presStyleLbl="node3" presStyleIdx="12" presStyleCnt="14"/>
       <dgm:spPr/>
       <dgm:t>
         <a:bodyPr/>
@@ -5338,15 +5674,22 @@
       <dgm:spPr/>
     </dgm:pt>
     <dgm:pt modelId="{40A4DB64-0E72-994A-A165-537167CD4950}" type="pres">
-      <dgm:prSet presAssocID="{92629936-234C-284D-8BD7-3207CF9FD357}" presName="Name19" presStyleLbl="parChTrans1D2" presStyleIdx="6" presStyleCnt="9"/>
-      <dgm:spPr/>
+      <dgm:prSet presAssocID="{92629936-234C-284D-8BD7-3207CF9FD357}" presName="Name19" presStyleLbl="parChTrans1D2" presStyleIdx="7" presStyleCnt="10"/>
+      <dgm:spPr/>
+      <dgm:t>
+        <a:bodyPr/>
+        <a:lstStyle/>
+        <a:p>
+          <a:endParaRPr lang="en-US"/>
+        </a:p>
+      </dgm:t>
     </dgm:pt>
     <dgm:pt modelId="{0E2FD69C-09BA-6F48-906A-25CECF770348}" type="pres">
       <dgm:prSet presAssocID="{1CFA7DE7-ECE8-B049-92EA-9451E486BF73}" presName="Name21" presStyleCnt="0"/>
       <dgm:spPr/>
     </dgm:pt>
     <dgm:pt modelId="{DBBEE2C4-E54F-D942-993F-82E16E578EB8}" type="pres">
-      <dgm:prSet presAssocID="{1CFA7DE7-ECE8-B049-92EA-9451E486BF73}" presName="level2Shape" presStyleLbl="node2" presStyleIdx="6" presStyleCnt="9"/>
+      <dgm:prSet presAssocID="{1CFA7DE7-ECE8-B049-92EA-9451E486BF73}" presName="level2Shape" presStyleLbl="node2" presStyleIdx="7" presStyleCnt="10"/>
       <dgm:spPr/>
       <dgm:t>
         <a:bodyPr/>
@@ -5361,15 +5704,22 @@
       <dgm:spPr/>
     </dgm:pt>
     <dgm:pt modelId="{93270657-4C4A-F444-B4C6-F927919A2A3B}" type="pres">
-      <dgm:prSet presAssocID="{64EF63D8-4367-5744-8F30-A3FF5423DFFA}" presName="Name19" presStyleLbl="parChTrans1D3" presStyleIdx="10" presStyleCnt="11"/>
-      <dgm:spPr/>
+      <dgm:prSet presAssocID="{64EF63D8-4367-5744-8F30-A3FF5423DFFA}" presName="Name19" presStyleLbl="parChTrans1D3" presStyleIdx="13" presStyleCnt="14"/>
+      <dgm:spPr/>
+      <dgm:t>
+        <a:bodyPr/>
+        <a:lstStyle/>
+        <a:p>
+          <a:endParaRPr lang="en-US"/>
+        </a:p>
+      </dgm:t>
     </dgm:pt>
     <dgm:pt modelId="{8A184C93-63A6-A54A-BC2B-CAF9FD35F246}" type="pres">
       <dgm:prSet presAssocID="{F3DE1754-6921-5B48-8A1C-50026B1CB2D2}" presName="Name21" presStyleCnt="0"/>
       <dgm:spPr/>
     </dgm:pt>
     <dgm:pt modelId="{946F4C34-E67F-D64A-9C68-A5169F9C4CFB}" type="pres">
-      <dgm:prSet presAssocID="{F3DE1754-6921-5B48-8A1C-50026B1CB2D2}" presName="level2Shape" presStyleLbl="node3" presStyleIdx="10" presStyleCnt="11"/>
+      <dgm:prSet presAssocID="{F3DE1754-6921-5B48-8A1C-50026B1CB2D2}" presName="level2Shape" presStyleLbl="node3" presStyleIdx="13" presStyleCnt="14"/>
       <dgm:spPr/>
       <dgm:t>
         <a:bodyPr/>
@@ -5384,15 +5734,22 @@
       <dgm:spPr/>
     </dgm:pt>
     <dgm:pt modelId="{09F45D7F-D313-334F-B626-DFE5C47D187E}" type="pres">
-      <dgm:prSet presAssocID="{B00D1B25-635B-774A-8490-C07651A50BA8}" presName="Name19" presStyleLbl="parChTrans1D2" presStyleIdx="7" presStyleCnt="9"/>
-      <dgm:spPr/>
+      <dgm:prSet presAssocID="{B00D1B25-635B-774A-8490-C07651A50BA8}" presName="Name19" presStyleLbl="parChTrans1D2" presStyleIdx="8" presStyleCnt="10"/>
+      <dgm:spPr/>
+      <dgm:t>
+        <a:bodyPr/>
+        <a:lstStyle/>
+        <a:p>
+          <a:endParaRPr lang="en-US"/>
+        </a:p>
+      </dgm:t>
     </dgm:pt>
     <dgm:pt modelId="{85ECA35D-CDF4-0C48-B0E8-786677EEC6E0}" type="pres">
       <dgm:prSet presAssocID="{4A3CFD4F-A369-A748-81CE-5A3517A21A01}" presName="Name21" presStyleCnt="0"/>
       <dgm:spPr/>
     </dgm:pt>
     <dgm:pt modelId="{7DE98858-2169-3147-8802-4D119636C8CD}" type="pres">
-      <dgm:prSet presAssocID="{4A3CFD4F-A369-A748-81CE-5A3517A21A01}" presName="level2Shape" presStyleLbl="node2" presStyleIdx="7" presStyleCnt="9"/>
+      <dgm:prSet presAssocID="{4A3CFD4F-A369-A748-81CE-5A3517A21A01}" presName="level2Shape" presStyleLbl="node2" presStyleIdx="8" presStyleCnt="10"/>
       <dgm:spPr/>
       <dgm:t>
         <a:bodyPr/>
@@ -5407,15 +5764,22 @@
       <dgm:spPr/>
     </dgm:pt>
     <dgm:pt modelId="{47F226ED-03DC-DB42-8882-368010BF9656}" type="pres">
-      <dgm:prSet presAssocID="{007B3AA8-7417-0C4D-8CCE-D8B3C95DEA0C}" presName="Name19" presStyleLbl="parChTrans1D2" presStyleIdx="8" presStyleCnt="9"/>
-      <dgm:spPr/>
+      <dgm:prSet presAssocID="{007B3AA8-7417-0C4D-8CCE-D8B3C95DEA0C}" presName="Name19" presStyleLbl="parChTrans1D2" presStyleIdx="9" presStyleCnt="10"/>
+      <dgm:spPr/>
+      <dgm:t>
+        <a:bodyPr/>
+        <a:lstStyle/>
+        <a:p>
+          <a:endParaRPr lang="en-US"/>
+        </a:p>
+      </dgm:t>
     </dgm:pt>
     <dgm:pt modelId="{DD7919BE-F1FF-6743-889F-24578570E207}" type="pres">
       <dgm:prSet presAssocID="{CAD2C9E1-8ACF-BE4D-A341-E59F51BBCD09}" presName="Name21" presStyleCnt="0"/>
       <dgm:spPr/>
     </dgm:pt>
     <dgm:pt modelId="{48165126-8B80-4444-99A4-95E3621A03ED}" type="pres">
-      <dgm:prSet presAssocID="{CAD2C9E1-8ACF-BE4D-A341-E59F51BBCD09}" presName="level2Shape" presStyleLbl="node2" presStyleIdx="8" presStyleCnt="9"/>
+      <dgm:prSet presAssocID="{CAD2C9E1-8ACF-BE4D-A341-E59F51BBCD09}" presName="level2Shape" presStyleLbl="node2" presStyleIdx="9" presStyleCnt="10"/>
       <dgm:spPr/>
       <dgm:t>
         <a:bodyPr/>
@@ -5435,78 +5799,90 @@
     </dgm:pt>
   </dgm:ptLst>
   <dgm:cxnLst>
+    <dgm:cxn modelId="{DE1396E3-370B-7B47-9E23-B3C36779AFC3}" srcId="{A589F188-5BBE-F740-BFB4-D28F42C9054B}" destId="{7E411DBC-2DFF-4C44-B6DD-823D0B55806D}" srcOrd="0" destOrd="0" parTransId="{2EABAA00-FA88-F148-B820-9944C2D1315F}" sibTransId="{C38AB8CE-3676-C946-A3AD-9099B9CF4F62}"/>
+    <dgm:cxn modelId="{806AB147-9FD9-1C46-8B9E-BABD81A53368}" srcId="{FFE4763F-6D4A-C84C-AFD7-E49DFFC00531}" destId="{2C521B09-C2A6-304A-ADB7-EE19CB526CFC}" srcOrd="1" destOrd="0" parTransId="{4D14F183-C4D9-224B-9EE1-AA4BC4453985}" sibTransId="{A1A9641A-A371-D64B-88CA-41725DC7C729}"/>
+    <dgm:cxn modelId="{5042F99A-5F4D-B145-9B70-298504A0D909}" type="presOf" srcId="{FFE4763F-6D4A-C84C-AFD7-E49DFFC00531}" destId="{51B4BBB9-653E-4141-A21A-A8C05AC8F6E9}" srcOrd="0" destOrd="0" presId="urn:microsoft.com/office/officeart/2005/8/layout/hierarchy6"/>
+    <dgm:cxn modelId="{9F464C4E-B30A-E84C-B55B-BB0D6C717D73}" type="presOf" srcId="{ABF4A1D2-B6C2-CD47-9705-3E8BBD120A32}" destId="{DFC1035A-BB9E-D54B-9D3B-A59CC7894DEC}" srcOrd="0" destOrd="0" presId="urn:microsoft.com/office/officeart/2005/8/layout/hierarchy6"/>
+    <dgm:cxn modelId="{D3E77A13-FE66-7B4A-AD8B-E4A172DB7275}" srcId="{C08EF094-AE84-924E-85E4-A3D904B2F369}" destId="{11CEE5C9-55A8-824F-BA9B-B1A4975FA82D}" srcOrd="0" destOrd="0" parTransId="{B553BC4D-61CF-7644-A3F7-72D84096C05C}" sibTransId="{7AD6458B-C590-9344-B40C-E67A714B55E7}"/>
+    <dgm:cxn modelId="{5B638FE4-932A-144D-8811-625C3C1E3E77}" type="presOf" srcId="{64EF63D8-4367-5744-8F30-A3FF5423DFFA}" destId="{93270657-4C4A-F444-B4C6-F927919A2A3B}" srcOrd="0" destOrd="0" presId="urn:microsoft.com/office/officeart/2005/8/layout/hierarchy6"/>
+    <dgm:cxn modelId="{B1304A37-5698-8A44-8FC7-525E5487D771}" type="presOf" srcId="{92629936-234C-284D-8BD7-3207CF9FD357}" destId="{40A4DB64-0E72-994A-A165-537167CD4950}" srcOrd="0" destOrd="0" presId="urn:microsoft.com/office/officeart/2005/8/layout/hierarchy6"/>
+    <dgm:cxn modelId="{BED65560-DC78-5F4B-AF0E-409522CF00F6}" type="presOf" srcId="{821B0846-6DAD-AC47-AC11-56F49A32E885}" destId="{034F9D08-26B7-464C-98E8-BCC74B452887}" srcOrd="0" destOrd="0" presId="urn:microsoft.com/office/officeart/2005/8/layout/hierarchy6"/>
+    <dgm:cxn modelId="{AB67D5D6-EF18-2C45-AB8D-B7E71ED59960}" srcId="{11CEE5C9-55A8-824F-BA9B-B1A4975FA82D}" destId="{C9A84787-0323-8A4E-90E9-89F75A92AAFB}" srcOrd="0" destOrd="0" parTransId="{B389AACB-65A0-3C4C-8335-69872F34AAF1}" sibTransId="{6CE91D18-A756-A64C-B339-DB3DDB3C18E7}"/>
+    <dgm:cxn modelId="{9AA640D3-AE2E-024E-9EBC-EFCBCE79F8FE}" srcId="{C08EF094-AE84-924E-85E4-A3D904B2F369}" destId="{1CFA7DE7-ECE8-B049-92EA-9451E486BF73}" srcOrd="7" destOrd="0" parTransId="{92629936-234C-284D-8BD7-3207CF9FD357}" sibTransId="{EEA2EA79-B8CA-2F4A-8A43-E461B4096F52}"/>
+    <dgm:cxn modelId="{65F92067-7B47-3046-A57B-402B29736CF1}" type="presOf" srcId="{CF3DDBE3-3740-2A49-A874-6D55EA8D317D}" destId="{D9DBFFB4-8C94-E940-A3D9-A7AA44617C3E}" srcOrd="0" destOrd="0" presId="urn:microsoft.com/office/officeart/2005/8/layout/hierarchy6"/>
+    <dgm:cxn modelId="{5FB13606-FE12-3F4A-8841-52B2950EC4E9}" srcId="{1CFA7DE7-ECE8-B049-92EA-9451E486BF73}" destId="{F3DE1754-6921-5B48-8A1C-50026B1CB2D2}" srcOrd="0" destOrd="0" parTransId="{64EF63D8-4367-5744-8F30-A3FF5423DFFA}" sibTransId="{FC626B0E-4096-2449-9350-CEF7C8BC8D84}"/>
+    <dgm:cxn modelId="{CA31D7AF-A3FC-5846-84D8-98E58B7F3826}" type="presOf" srcId="{F3DE1754-6921-5B48-8A1C-50026B1CB2D2}" destId="{946F4C34-E67F-D64A-9C68-A5169F9C4CFB}" srcOrd="0" destOrd="0" presId="urn:microsoft.com/office/officeart/2005/8/layout/hierarchy6"/>
+    <dgm:cxn modelId="{C7F4444C-829F-6E4B-B44E-A683E5819168}" srcId="{11CEE5C9-55A8-824F-BA9B-B1A4975FA82D}" destId="{AFF1DCCA-869E-BF48-AE70-D7CF6058A3D5}" srcOrd="1" destOrd="0" parTransId="{565472C5-351A-6A47-B1DB-5960ECA48A59}" sibTransId="{DDFCE617-53AA-784C-9889-DDF0A4095F8A}"/>
+    <dgm:cxn modelId="{3FBB8FD4-F86B-1A44-9D11-CC5AE102F869}" srcId="{A589F188-5BBE-F740-BFB4-D28F42C9054B}" destId="{7FC6DCAF-29CF-AD4D-99B2-D927A75175E4}" srcOrd="2" destOrd="0" parTransId="{F194F0AE-AB76-F348-A956-3ED3C3897464}" sibTransId="{46119FFE-5FEC-B64F-9A44-6A4E183AC6C7}"/>
+    <dgm:cxn modelId="{252BD816-3754-864C-9F5B-FA2600BF032C}" type="presOf" srcId="{2717B14F-8176-554A-97B9-E169C5F79749}" destId="{B61B0D98-773A-8A4F-9F5C-8FBDD5C64421}" srcOrd="0" destOrd="0" presId="urn:microsoft.com/office/officeart/2005/8/layout/hierarchy6"/>
+    <dgm:cxn modelId="{BEE4E55D-9860-D847-8F98-C9434422352D}" type="presOf" srcId="{1CFA7DE7-ECE8-B049-92EA-9451E486BF73}" destId="{DBBEE2C4-E54F-D942-993F-82E16E578EB8}" srcOrd="0" destOrd="0" presId="urn:microsoft.com/office/officeart/2005/8/layout/hierarchy6"/>
+    <dgm:cxn modelId="{85644B5C-018B-6048-B8A8-A0E8E3FE5C49}" type="presOf" srcId="{8B6A1C9F-193E-F140-8F56-EF24093EA1A3}" destId="{9CC7233D-5EBE-434D-918B-6C3475B044D5}" srcOrd="0" destOrd="0" presId="urn:microsoft.com/office/officeart/2005/8/layout/hierarchy6"/>
+    <dgm:cxn modelId="{3C8EAEC3-BA11-B04B-8065-A3FB78100CA0}" type="presOf" srcId="{4CF9A705-81A8-9E42-954E-6883CF32CF33}" destId="{A6050186-D63E-864F-A7FB-933DDE98E4D9}" srcOrd="0" destOrd="0" presId="urn:microsoft.com/office/officeart/2005/8/layout/hierarchy6"/>
+    <dgm:cxn modelId="{C6268211-9C35-0B44-96D8-6799F546D696}" srcId="{FFE4763F-6D4A-C84C-AFD7-E49DFFC00531}" destId="{83D1D0E0-4D8F-2B4C-BA91-E46EEBA26BAB}" srcOrd="2" destOrd="0" parTransId="{08EA561E-9636-5841-927B-5ABC9CBCAD65}" sibTransId="{251C8B05-C621-274A-BE99-B3AF2211821C}"/>
+    <dgm:cxn modelId="{D2803E51-9C67-7343-976B-A955E4C26DA5}" type="presOf" srcId="{86E1B045-1E46-F64C-9527-DBC0BBCF8E48}" destId="{B9972A86-A3F6-6A47-B03A-39E4AB3F09BA}" srcOrd="0" destOrd="0" presId="urn:microsoft.com/office/officeart/2005/8/layout/hierarchy6"/>
+    <dgm:cxn modelId="{736C6B7A-9728-F24A-B6A6-D99A959F28B3}" type="presOf" srcId="{B389AACB-65A0-3C4C-8335-69872F34AAF1}" destId="{8316F2DF-DD2A-8E48-946E-48A76CDB1EFF}" srcOrd="0" destOrd="0" presId="urn:microsoft.com/office/officeart/2005/8/layout/hierarchy6"/>
+    <dgm:cxn modelId="{D7685F49-252B-8E46-B4CD-FCBD58922240}" type="presOf" srcId="{A589F188-5BBE-F740-BFB4-D28F42C9054B}" destId="{40CEBFD4-83C3-5846-8D33-3AB5A5D95710}" srcOrd="0" destOrd="0" presId="urn:microsoft.com/office/officeart/2005/8/layout/hierarchy6"/>
+    <dgm:cxn modelId="{90875345-DDEC-AE41-B169-9B87E2DE6D6B}" type="presOf" srcId="{AF5EC167-24DD-F44E-AA98-41BF347B8425}" destId="{FFB44854-B8FE-0946-878F-79A27639517F}" srcOrd="0" destOrd="0" presId="urn:microsoft.com/office/officeart/2005/8/layout/hierarchy6"/>
+    <dgm:cxn modelId="{E5E10ADA-30E3-2240-A76E-D6790B3473AB}" type="presOf" srcId="{5C51E9B1-B92E-C046-88B1-D25E745B1F88}" destId="{2BCF6A44-CA3B-1D40-8C2A-66704108E553}" srcOrd="0" destOrd="0" presId="urn:microsoft.com/office/officeart/2005/8/layout/hierarchy6"/>
+    <dgm:cxn modelId="{36D869A2-0E30-7346-A41A-78AAA0FE610C}" type="presOf" srcId="{007B3AA8-7417-0C4D-8CCE-D8B3C95DEA0C}" destId="{47F226ED-03DC-DB42-8882-368010BF9656}" srcOrd="0" destOrd="0" presId="urn:microsoft.com/office/officeart/2005/8/layout/hierarchy6"/>
+    <dgm:cxn modelId="{91D47608-F309-C944-BF72-3A8BA61494CD}" type="presOf" srcId="{08EA561E-9636-5841-927B-5ABC9CBCAD65}" destId="{0FCD18C0-4738-0C42-96A8-68D42D113DA2}" srcOrd="0" destOrd="0" presId="urn:microsoft.com/office/officeart/2005/8/layout/hierarchy6"/>
+    <dgm:cxn modelId="{26FF1F30-86AF-7A45-AD37-0BF9F254CAF8}" type="presOf" srcId="{04B48503-EDAF-124A-A72B-687EDDA05988}" destId="{2DDCA4E4-DC97-9B48-8E04-20AD3E254FEE}" srcOrd="0" destOrd="0" presId="urn:microsoft.com/office/officeart/2005/8/layout/hierarchy6"/>
+    <dgm:cxn modelId="{B80C28E8-A6F1-0D40-B2C8-12608D2AAC24}" srcId="{C08EF094-AE84-924E-85E4-A3D904B2F369}" destId="{FFE4763F-6D4A-C84C-AFD7-E49DFFC00531}" srcOrd="6" destOrd="0" parTransId="{A2E7E8AA-252B-964D-A76D-D1DBFC905610}" sibTransId="{1201A228-14BC-6E41-8BA2-69B4F417B830}"/>
+    <dgm:cxn modelId="{FA5CCA31-BCD4-5845-97C5-61B307105784}" srcId="{C08EF094-AE84-924E-85E4-A3D904B2F369}" destId="{CAD2C9E1-8ACF-BE4D-A341-E59F51BBCD09}" srcOrd="9" destOrd="0" parTransId="{007B3AA8-7417-0C4D-8CCE-D8B3C95DEA0C}" sibTransId="{0B19EAC7-0DE2-AC49-ABA5-E59D0E9BE179}"/>
+    <dgm:cxn modelId="{4BDAD7B0-1477-BC44-B797-BC263CEA1A43}" type="presOf" srcId="{83D1D0E0-4D8F-2B4C-BA91-E46EEBA26BAB}" destId="{0B4D4399-C510-AB4D-85AB-C3558C55314B}" srcOrd="0" destOrd="0" presId="urn:microsoft.com/office/officeart/2005/8/layout/hierarchy6"/>
+    <dgm:cxn modelId="{831080FA-33C7-6B4D-99FC-BC41B85E94BC}" type="presOf" srcId="{19FDB6D1-5F54-F641-9F02-53D7CEC76D2D}" destId="{73AE1126-45AE-7D4B-AEAB-0A1BD05E96C6}" srcOrd="0" destOrd="0" presId="urn:microsoft.com/office/officeart/2005/8/layout/hierarchy6"/>
+    <dgm:cxn modelId="{F75335DA-D189-124C-9F19-3EDD7C2A8B3B}" type="presOf" srcId="{4D96A72B-37A5-1442-826F-A659684CD6CD}" destId="{60EB5E65-BE5E-A245-8575-5652AC14C400}" srcOrd="0" destOrd="0" presId="urn:microsoft.com/office/officeart/2005/8/layout/hierarchy6"/>
+    <dgm:cxn modelId="{7381F8E6-6849-634F-9893-AAAA96D5B937}" type="presOf" srcId="{8EE08340-D1E4-5343-B0A9-E615C7320568}" destId="{CD1DBAD6-C94F-5C43-8507-9B507D8DA318}" srcOrd="0" destOrd="0" presId="urn:microsoft.com/office/officeart/2005/8/layout/hierarchy6"/>
+    <dgm:cxn modelId="{4FAB956F-978F-1248-98C7-D4D595822371}" srcId="{C08EF094-AE84-924E-85E4-A3D904B2F369}" destId="{4A3CFD4F-A369-A748-81CE-5A3517A21A01}" srcOrd="8" destOrd="0" parTransId="{B00D1B25-635B-774A-8490-C07651A50BA8}" sibTransId="{36C62675-439A-874E-9BE2-76C0DFE6671D}"/>
+    <dgm:cxn modelId="{10E845EA-8F49-9B4D-9A49-15527719BC77}" srcId="{47B2B18F-98B9-8148-B6DC-60798A233A44}" destId="{4D96A72B-37A5-1442-826F-A659684CD6CD}" srcOrd="0" destOrd="0" parTransId="{AC8A1B67-7F4A-5949-8EE9-C24CD7CEFEF5}" sibTransId="{68943B30-4E50-D04A-9789-2B44BBB90AED}"/>
+    <dgm:cxn modelId="{8F1FCADD-A273-5544-A3BB-0C4C0BCA7ABA}" srcId="{C08EF094-AE84-924E-85E4-A3D904B2F369}" destId="{47B2B18F-98B9-8148-B6DC-60798A233A44}" srcOrd="5" destOrd="0" parTransId="{7F9CEABB-4961-654E-95FD-0D8597210B7D}" sibTransId="{E2D0ED87-1DC6-BE44-9BAE-A14A1A73BA14}"/>
+    <dgm:cxn modelId="{DFC8BF9C-A43F-A14F-BB97-FDD05A39A89E}" srcId="{C08EF094-AE84-924E-85E4-A3D904B2F369}" destId="{04B48503-EDAF-124A-A72B-687EDDA05988}" srcOrd="2" destOrd="0" parTransId="{8B6A1C9F-193E-F140-8F56-EF24093EA1A3}" sibTransId="{2A195EF6-7EAB-AD44-878B-CEA77377F893}"/>
+    <dgm:cxn modelId="{874A721F-07E1-AE4B-8B94-EE084787D84F}" type="presOf" srcId="{4A3CFD4F-A369-A748-81CE-5A3517A21A01}" destId="{7DE98858-2169-3147-8802-4D119636C8CD}" srcOrd="0" destOrd="0" presId="urn:microsoft.com/office/officeart/2005/8/layout/hierarchy6"/>
+    <dgm:cxn modelId="{902C6287-2F0D-4644-844F-BA1C9443050B}" type="presOf" srcId="{F60CC18C-83C4-F346-8211-E18E63B32600}" destId="{791F7BEF-D996-8F40-947C-A8E13C456870}" srcOrd="0" destOrd="0" presId="urn:microsoft.com/office/officeart/2005/8/layout/hierarchy6"/>
+    <dgm:cxn modelId="{8FD252AC-6AD3-C84F-9F70-8C5CC894D91F}" srcId="{AF5EC167-24DD-F44E-AA98-41BF347B8425}" destId="{19FDB6D1-5F54-F641-9F02-53D7CEC76D2D}" srcOrd="1" destOrd="0" parTransId="{34C074A2-BB88-1647-AB82-DF290D866137}" sibTransId="{397A75E5-469B-CC44-B6D0-18E8B87D2149}"/>
+    <dgm:cxn modelId="{0526A5FC-9695-5F42-A792-7FCB127B7D58}" type="presOf" srcId="{4D14F183-C4D9-224B-9EE1-AA4BC4453985}" destId="{9BC4EC78-B262-C048-A423-4D9CB8008025}" srcOrd="0" destOrd="0" presId="urn:microsoft.com/office/officeart/2005/8/layout/hierarchy6"/>
+    <dgm:cxn modelId="{C029879A-2C08-844F-8503-6ED89362193C}" type="presOf" srcId="{7E411DBC-2DFF-4C44-B6DD-823D0B55806D}" destId="{1D2E00EC-E833-6047-B478-2DBE7E168AFF}" srcOrd="0" destOrd="0" presId="urn:microsoft.com/office/officeart/2005/8/layout/hierarchy6"/>
+    <dgm:cxn modelId="{B5785C4A-D8DF-EE40-B8BC-68E6BB24561F}" type="presOf" srcId="{C6EF9F61-C6F2-2840-817E-27593EF1F892}" destId="{08861A9B-CF27-C342-8B8F-36348C18EC0B}" srcOrd="0" destOrd="0" presId="urn:microsoft.com/office/officeart/2005/8/layout/hierarchy6"/>
+    <dgm:cxn modelId="{481177F3-F546-8E47-9308-5B2BC8F5EBE0}" type="presOf" srcId="{47B2B18F-98B9-8148-B6DC-60798A233A44}" destId="{20AF6D03-8BA3-6D4D-91D6-6BB621334EE0}" srcOrd="0" destOrd="0" presId="urn:microsoft.com/office/officeart/2005/8/layout/hierarchy6"/>
+    <dgm:cxn modelId="{06DE16D3-8EB8-2646-A286-6E687A89FA27}" srcId="{9A122E2C-DEE7-8D42-81CF-F4CF4D3FCAF1}" destId="{C08EF094-AE84-924E-85E4-A3D904B2F369}" srcOrd="0" destOrd="0" parTransId="{5E224946-2898-D04A-86EA-9EDDED7B3D51}" sibTransId="{A3E9DE71-CA06-B042-B92D-91A772E5B897}"/>
+    <dgm:cxn modelId="{BB694501-70D9-094D-8577-C6723E807448}" srcId="{AF5EC167-24DD-F44E-AA98-41BF347B8425}" destId="{2717B14F-8176-554A-97B9-E169C5F79749}" srcOrd="0" destOrd="0" parTransId="{FD077530-9C55-F147-A2D7-CF93F52203F1}" sibTransId="{242DE65B-52EE-8B43-8D97-F9A4C8FEAC8C}"/>
+    <dgm:cxn modelId="{F7A4DB69-7A3C-3D45-914B-DCBF30556CAD}" type="presOf" srcId="{C8884311-4A27-B54E-949A-2532E7E02161}" destId="{D2DB1DBF-8571-DA41-83F6-BBA6615036F3}" srcOrd="0" destOrd="0" presId="urn:microsoft.com/office/officeart/2005/8/layout/hierarchy6"/>
+    <dgm:cxn modelId="{249F4DA6-657C-2448-93DA-ABB785F54C60}" type="presOf" srcId="{FD077530-9C55-F147-A2D7-CF93F52203F1}" destId="{0FBD2D58-EF12-A64D-87FA-CFDF18228DF6}" srcOrd="0" destOrd="0" presId="urn:microsoft.com/office/officeart/2005/8/layout/hierarchy6"/>
+    <dgm:cxn modelId="{5A159180-2246-1546-B034-6CB1FC600C68}" type="presOf" srcId="{A2E7E8AA-252B-964D-A76D-D1DBFC905610}" destId="{834ED12A-98BA-124A-83D0-5AF8577A70A7}" srcOrd="0" destOrd="0" presId="urn:microsoft.com/office/officeart/2005/8/layout/hierarchy6"/>
+    <dgm:cxn modelId="{B9C2B32B-73D3-654F-A505-AA3A1B144A88}" srcId="{C08EF094-AE84-924E-85E4-A3D904B2F369}" destId="{86E1B045-1E46-F64C-9527-DBC0BBCF8E48}" srcOrd="4" destOrd="0" parTransId="{7BB740C9-3C6B-E443-9D37-10BEEA9FF1F8}" sibTransId="{F4F2180F-746B-6B4C-A01E-81D9EC7C8B3B}"/>
+    <dgm:cxn modelId="{F6754560-BBC9-EC4F-B7D8-4058C835DAFF}" srcId="{47B2B18F-98B9-8148-B6DC-60798A233A44}" destId="{F60CC18C-83C4-F346-8211-E18E63B32600}" srcOrd="1" destOrd="0" parTransId="{ABF4A1D2-B6C2-CD47-9705-3E8BBD120A32}" sibTransId="{0A0071BE-587C-5D49-BD26-2F8D9A86E633}"/>
+    <dgm:cxn modelId="{4AC3AD98-A75A-0747-A387-884AFF3979B3}" type="presOf" srcId="{7F9CEABB-4961-654E-95FD-0D8597210B7D}" destId="{80B1EB63-517B-3F41-96A4-C449E7CE44F1}" srcOrd="0" destOrd="0" presId="urn:microsoft.com/office/officeart/2005/8/layout/hierarchy6"/>
+    <dgm:cxn modelId="{F2C2EDF6-0B4A-E448-AC83-561905CC1564}" type="presOf" srcId="{34C074A2-BB88-1647-AB82-DF290D866137}" destId="{03358BE9-0182-7E4E-A763-7930CEF1BE29}" srcOrd="0" destOrd="0" presId="urn:microsoft.com/office/officeart/2005/8/layout/hierarchy6"/>
+    <dgm:cxn modelId="{0984871C-8A10-C849-8E63-2F7A8522B1DC}" type="presOf" srcId="{565472C5-351A-6A47-B1DB-5960ECA48A59}" destId="{CD007CCC-3B62-6C49-ADE7-5083587358A7}" srcOrd="0" destOrd="0" presId="urn:microsoft.com/office/officeart/2005/8/layout/hierarchy6"/>
+    <dgm:cxn modelId="{CC2B6226-9F73-EB4E-904C-C813A91F7C91}" type="presOf" srcId="{4AED2AC5-539B-814B-BCC3-6C935DA3172A}" destId="{0015D2B2-ADA6-6649-8987-33BF465BA00F}" srcOrd="0" destOrd="0" presId="urn:microsoft.com/office/officeart/2005/8/layout/hierarchy6"/>
+    <dgm:cxn modelId="{DF6AAD01-62CF-A443-8B6D-BFC5C6268C7E}" type="presOf" srcId="{C9A84787-0323-8A4E-90E9-89F75A92AAFB}" destId="{53A888AF-5866-BE41-B4AC-8AF29619D1B4}" srcOrd="0" destOrd="0" presId="urn:microsoft.com/office/officeart/2005/8/layout/hierarchy6"/>
+    <dgm:cxn modelId="{799B9AA1-A902-E648-80BF-9E0486D03E2C}" srcId="{A589F188-5BBE-F740-BFB4-D28F42C9054B}" destId="{C6EF9F61-C6F2-2840-817E-27593EF1F892}" srcOrd="1" destOrd="0" parTransId="{4CF9A705-81A8-9E42-954E-6883CF32CF33}" sibTransId="{1084BD89-325A-5C4F-9A98-935F615D30FD}"/>
+    <dgm:cxn modelId="{3D7F507C-720E-CF42-8916-5C6EEF04280F}" type="presOf" srcId="{11CEE5C9-55A8-824F-BA9B-B1A4975FA82D}" destId="{12C9B420-269F-B448-B3CF-A84B7F528FC4}" srcOrd="0" destOrd="0" presId="urn:microsoft.com/office/officeart/2005/8/layout/hierarchy6"/>
+    <dgm:cxn modelId="{78BBCCB7-1DF8-054D-B92F-4A2EE230CF2E}" type="presOf" srcId="{CAD2C9E1-8ACF-BE4D-A341-E59F51BBCD09}" destId="{48165126-8B80-4444-99A4-95E3621A03ED}" srcOrd="0" destOrd="0" presId="urn:microsoft.com/office/officeart/2005/8/layout/hierarchy6"/>
+    <dgm:cxn modelId="{5E0EB3FB-C51F-E948-A272-0B3ABA9DB489}" type="presOf" srcId="{F194F0AE-AB76-F348-A956-3ED3C3897464}" destId="{54C8F112-08DD-E246-B5F5-9F8A7B221232}" srcOrd="0" destOrd="0" presId="urn:microsoft.com/office/officeart/2005/8/layout/hierarchy6"/>
+    <dgm:cxn modelId="{4307D80D-2835-EB4E-B595-B4B6163DA910}" type="presOf" srcId="{AC8A1B67-7F4A-5949-8EE9-C24CD7CEFEF5}" destId="{ADA2498B-E8FE-E24A-80A0-32101A6C19E4}" srcOrd="0" destOrd="0" presId="urn:microsoft.com/office/officeart/2005/8/layout/hierarchy6"/>
+    <dgm:cxn modelId="{544D3877-77BA-5245-BED6-010D7F6C349C}" type="presOf" srcId="{B553BC4D-61CF-7644-A3F7-72D84096C05C}" destId="{0D82A4BC-6151-444A-AE4C-BAAE071D7942}" srcOrd="0" destOrd="0" presId="urn:microsoft.com/office/officeart/2005/8/layout/hierarchy6"/>
+    <dgm:cxn modelId="{29BAD149-9397-9045-92C2-6140E630D2E1}" type="presOf" srcId="{7BB740C9-3C6B-E443-9D37-10BEEA9FF1F8}" destId="{B3E752D9-0DAF-4643-8967-E6BACF17435F}" srcOrd="0" destOrd="0" presId="urn:microsoft.com/office/officeart/2005/8/layout/hierarchy6"/>
+    <dgm:cxn modelId="{2E6AF29A-1E7B-784E-8B36-DC1960799E0B}" type="presOf" srcId="{CCA98178-CECF-1F4E-9BB9-3BEC8B837EE3}" destId="{BAAAE675-372E-C64C-9DFC-2334B74F5B6F}" srcOrd="0" destOrd="0" presId="urn:microsoft.com/office/officeart/2005/8/layout/hierarchy6"/>
+    <dgm:cxn modelId="{7760F484-3930-444D-B3A0-89576C563145}" type="presOf" srcId="{2C521B09-C2A6-304A-ADB7-EE19CB526CFC}" destId="{23F9216E-C7F3-D141-BA72-240F3E70368A}" srcOrd="0" destOrd="0" presId="urn:microsoft.com/office/officeart/2005/8/layout/hierarchy6"/>
+    <dgm:cxn modelId="{1D9543FF-1893-0543-BABD-ABC584541FA3}" type="presOf" srcId="{9A122E2C-DEE7-8D42-81CF-F4CF4D3FCAF1}" destId="{2A965C83-2AD7-904C-B62F-6ADE3507654A}" srcOrd="0" destOrd="0" presId="urn:microsoft.com/office/officeart/2005/8/layout/hierarchy6"/>
+    <dgm:cxn modelId="{D8251EC5-1CEE-9B48-AC72-0E89DCEA2D5E}" type="presOf" srcId="{DBA8AE41-0903-444F-9B01-6312C83579CF}" destId="{A40373D9-960F-7F4D-98E8-A9FB2DBB29E2}" srcOrd="0" destOrd="0" presId="urn:microsoft.com/office/officeart/2005/8/layout/hierarchy6"/>
+    <dgm:cxn modelId="{89D7BD84-FC8C-BD4C-8F4E-E9F59AEE7E5C}" srcId="{C08EF094-AE84-924E-85E4-A3D904B2F369}" destId="{71398A0F-548E-1A44-AE3C-D0DB9FAF7317}" srcOrd="1" destOrd="0" parTransId="{CF3DDBE3-3740-2A49-A874-6D55EA8D317D}" sibTransId="{9A70D5A8-BE70-D741-993C-A1337A2D0159}"/>
+    <dgm:cxn modelId="{C5C831F1-D84D-6944-877A-9783574115F8}" type="presOf" srcId="{71398A0F-548E-1A44-AE3C-D0DB9FAF7317}" destId="{269B7467-8696-5441-AEEE-597206F1FA7D}" srcOrd="0" destOrd="0" presId="urn:microsoft.com/office/officeart/2005/8/layout/hierarchy6"/>
+    <dgm:cxn modelId="{06A52A14-0083-5740-932A-B0D8E0E20C19}" type="presOf" srcId="{A09B9644-7FA6-7143-8A5C-C9B622F4F633}" destId="{EE67847A-DFFD-9745-98B7-329C5757B5C4}" srcOrd="0" destOrd="0" presId="urn:microsoft.com/office/officeart/2005/8/layout/hierarchy6"/>
+    <dgm:cxn modelId="{D4AEC859-B5E3-5049-B983-5A5B2F65CE17}" srcId="{C08EF094-AE84-924E-85E4-A3D904B2F369}" destId="{AF5EC167-24DD-F44E-AA98-41BF347B8425}" srcOrd="3" destOrd="0" parTransId="{8D88936D-7A95-4542-A4C8-704063821867}" sibTransId="{A39F8A09-45EF-464F-BACD-C1E6CB41EE5C}"/>
+    <dgm:cxn modelId="{3D4E4BE6-6DE0-7048-AADB-D1F9656A706E}" type="presOf" srcId="{B00D1B25-635B-774A-8490-C07651A50BA8}" destId="{09F45D7F-D313-334F-B626-DFE5C47D187E}" srcOrd="0" destOrd="0" presId="urn:microsoft.com/office/officeart/2005/8/layout/hierarchy6"/>
+    <dgm:cxn modelId="{D76EBBA9-E510-A440-841D-09364998FC9A}" srcId="{FFE4763F-6D4A-C84C-AFD7-E49DFFC00531}" destId="{4AED2AC5-539B-814B-BCC3-6C935DA3172A}" srcOrd="0" destOrd="0" parTransId="{DBA8AE41-0903-444F-9B01-6312C83579CF}" sibTransId="{88D39F9C-9E76-B646-AE40-A77C89FA0F12}"/>
+    <dgm:cxn modelId="{17BAE909-D3BF-C042-B9CF-40725D3F2402}" type="presOf" srcId="{2EABAA00-FA88-F148-B820-9944C2D1315F}" destId="{4ED9CBD7-1C8C-C54E-9E04-D4219E6BDA6C}" srcOrd="0" destOrd="0" presId="urn:microsoft.com/office/officeart/2005/8/layout/hierarchy6"/>
+    <dgm:cxn modelId="{C70BB2AA-5F8F-594F-9626-46C404EBD2CC}" srcId="{AF5EC167-24DD-F44E-AA98-41BF347B8425}" destId="{B99BCB02-8E6F-D646-B684-551AE4D43602}" srcOrd="3" destOrd="0" parTransId="{8EE08340-D1E4-5343-B0A9-E615C7320568}" sibTransId="{5A34F70F-2762-CA49-9F15-F48F66433ABA}"/>
+    <dgm:cxn modelId="{AF5F15E2-C9E6-8841-8522-EF11AE1E0BDE}" type="presOf" srcId="{C08EF094-AE84-924E-85E4-A3D904B2F369}" destId="{BFE0B1C6-1844-0046-86D8-4DEE78FD86A3}" srcOrd="0" destOrd="0" presId="urn:microsoft.com/office/officeart/2005/8/layout/hierarchy6"/>
     <dgm:cxn modelId="{76537DA2-F4D1-A949-BD0C-CCFC00845579}" type="presOf" srcId="{7FC6DCAF-29CF-AD4D-99B2-D927A75175E4}" destId="{3F0EF743-C356-8C44-B74D-4A91D1D46D71}" srcOrd="0" destOrd="0" presId="urn:microsoft.com/office/officeart/2005/8/layout/hierarchy6"/>
-    <dgm:cxn modelId="{DFC8BF9C-A43F-A14F-BB97-FDD05A39A89E}" srcId="{C08EF094-AE84-924E-85E4-A3D904B2F369}" destId="{04B48503-EDAF-124A-A72B-687EDDA05988}" srcOrd="2" destOrd="0" parTransId="{8B6A1C9F-193E-F140-8F56-EF24093EA1A3}" sibTransId="{2A195EF6-7EAB-AD44-878B-CEA77377F893}"/>
-    <dgm:cxn modelId="{CA31D7AF-A3FC-5846-84D8-98E58B7F3826}" type="presOf" srcId="{F3DE1754-6921-5B48-8A1C-50026B1CB2D2}" destId="{946F4C34-E67F-D64A-9C68-A5169F9C4CFB}" srcOrd="0" destOrd="0" presId="urn:microsoft.com/office/officeart/2005/8/layout/hierarchy6"/>
-    <dgm:cxn modelId="{D3E77A13-FE66-7B4A-AD8B-E4A172DB7275}" srcId="{C08EF094-AE84-924E-85E4-A3D904B2F369}" destId="{11CEE5C9-55A8-824F-BA9B-B1A4975FA82D}" srcOrd="0" destOrd="0" parTransId="{B553BC4D-61CF-7644-A3F7-72D84096C05C}" sibTransId="{7AD6458B-C590-9344-B40C-E67A714B55E7}"/>
-    <dgm:cxn modelId="{B5785C4A-D8DF-EE40-B8BC-68E6BB24561F}" type="presOf" srcId="{C6EF9F61-C6F2-2840-817E-27593EF1F892}" destId="{08861A9B-CF27-C342-8B8F-36348C18EC0B}" srcOrd="0" destOrd="0" presId="urn:microsoft.com/office/officeart/2005/8/layout/hierarchy6"/>
-    <dgm:cxn modelId="{3D4E4BE6-6DE0-7048-AADB-D1F9656A706E}" type="presOf" srcId="{B00D1B25-635B-774A-8490-C07651A50BA8}" destId="{09F45D7F-D313-334F-B626-DFE5C47D187E}" srcOrd="0" destOrd="0" presId="urn:microsoft.com/office/officeart/2005/8/layout/hierarchy6"/>
-    <dgm:cxn modelId="{3D7F507C-720E-CF42-8916-5C6EEF04280F}" type="presOf" srcId="{11CEE5C9-55A8-824F-BA9B-B1A4975FA82D}" destId="{12C9B420-269F-B448-B3CF-A84B7F528FC4}" srcOrd="0" destOrd="0" presId="urn:microsoft.com/office/officeart/2005/8/layout/hierarchy6"/>
-    <dgm:cxn modelId="{DE1396E3-370B-7B47-9E23-B3C36779AFC3}" srcId="{A589F188-5BBE-F740-BFB4-D28F42C9054B}" destId="{7E411DBC-2DFF-4C44-B6DD-823D0B55806D}" srcOrd="0" destOrd="0" parTransId="{2EABAA00-FA88-F148-B820-9944C2D1315F}" sibTransId="{C38AB8CE-3676-C946-A3AD-9099B9CF4F62}"/>
-    <dgm:cxn modelId="{91D47608-F309-C944-BF72-3A8BA61494CD}" type="presOf" srcId="{08EA561E-9636-5841-927B-5ABC9CBCAD65}" destId="{0FCD18C0-4738-0C42-96A8-68D42D113DA2}" srcOrd="0" destOrd="0" presId="urn:microsoft.com/office/officeart/2005/8/layout/hierarchy6"/>
-    <dgm:cxn modelId="{C5C831F1-D84D-6944-877A-9783574115F8}" type="presOf" srcId="{71398A0F-548E-1A44-AE3C-D0DB9FAF7317}" destId="{269B7467-8696-5441-AEEE-597206F1FA7D}" srcOrd="0" destOrd="0" presId="urn:microsoft.com/office/officeart/2005/8/layout/hierarchy6"/>
-    <dgm:cxn modelId="{BED65560-DC78-5F4B-AF0E-409522CF00F6}" type="presOf" srcId="{821B0846-6DAD-AC47-AC11-56F49A32E885}" destId="{034F9D08-26B7-464C-98E8-BCC74B452887}" srcOrd="0" destOrd="0" presId="urn:microsoft.com/office/officeart/2005/8/layout/hierarchy6"/>
-    <dgm:cxn modelId="{65F92067-7B47-3046-A57B-402B29736CF1}" type="presOf" srcId="{CF3DDBE3-3740-2A49-A874-6D55EA8D317D}" destId="{D9DBFFB4-8C94-E940-A3D9-A7AA44617C3E}" srcOrd="0" destOrd="0" presId="urn:microsoft.com/office/officeart/2005/8/layout/hierarchy6"/>
-    <dgm:cxn modelId="{902C6287-2F0D-4644-844F-BA1C9443050B}" type="presOf" srcId="{F60CC18C-83C4-F346-8211-E18E63B32600}" destId="{791F7BEF-D996-8F40-947C-A8E13C456870}" srcOrd="0" destOrd="0" presId="urn:microsoft.com/office/officeart/2005/8/layout/hierarchy6"/>
-    <dgm:cxn modelId="{F75335DA-D189-124C-9F19-3EDD7C2A8B3B}" type="presOf" srcId="{4D96A72B-37A5-1442-826F-A659684CD6CD}" destId="{60EB5E65-BE5E-A245-8575-5652AC14C400}" srcOrd="0" destOrd="0" presId="urn:microsoft.com/office/officeart/2005/8/layout/hierarchy6"/>
-    <dgm:cxn modelId="{D4AEC859-B5E3-5049-B983-5A5B2F65CE17}" srcId="{04B48503-EDAF-124A-A72B-687EDDA05988}" destId="{AF5EC167-24DD-F44E-AA98-41BF347B8425}" srcOrd="0" destOrd="0" parTransId="{8D88936D-7A95-4542-A4C8-704063821867}" sibTransId="{A39F8A09-45EF-464F-BACD-C1E6CB41EE5C}"/>
-    <dgm:cxn modelId="{26FF1F30-86AF-7A45-AD37-0BF9F254CAF8}" type="presOf" srcId="{04B48503-EDAF-124A-A72B-687EDDA05988}" destId="{2DDCA4E4-DC97-9B48-8E04-20AD3E254FEE}" srcOrd="0" destOrd="0" presId="urn:microsoft.com/office/officeart/2005/8/layout/hierarchy6"/>
-    <dgm:cxn modelId="{5FB13606-FE12-3F4A-8841-52B2950EC4E9}" srcId="{1CFA7DE7-ECE8-B049-92EA-9451E486BF73}" destId="{F3DE1754-6921-5B48-8A1C-50026B1CB2D2}" srcOrd="0" destOrd="0" parTransId="{64EF63D8-4367-5744-8F30-A3FF5423DFFA}" sibTransId="{FC626B0E-4096-2449-9350-CEF7C8BC8D84}"/>
-    <dgm:cxn modelId="{736C6B7A-9728-F24A-B6A6-D99A959F28B3}" type="presOf" srcId="{B389AACB-65A0-3C4C-8335-69872F34AAF1}" destId="{8316F2DF-DD2A-8E48-946E-48A76CDB1EFF}" srcOrd="0" destOrd="0" presId="urn:microsoft.com/office/officeart/2005/8/layout/hierarchy6"/>
-    <dgm:cxn modelId="{D76EBBA9-E510-A440-841D-09364998FC9A}" srcId="{FFE4763F-6D4A-C84C-AFD7-E49DFFC00531}" destId="{4AED2AC5-539B-814B-BCC3-6C935DA3172A}" srcOrd="0" destOrd="0" parTransId="{DBA8AE41-0903-444F-9B01-6312C83579CF}" sibTransId="{88D39F9C-9E76-B646-AE40-A77C89FA0F12}"/>
-    <dgm:cxn modelId="{2D365A12-FADE-304C-9BE3-1115C44EAF0A}" type="presOf" srcId="{8D88936D-7A95-4542-A4C8-704063821867}" destId="{0B36DFB8-E481-9846-9713-FD9BC35589F9}" srcOrd="0" destOrd="0" presId="urn:microsoft.com/office/officeart/2005/8/layout/hierarchy6"/>
-    <dgm:cxn modelId="{89D7BD84-FC8C-BD4C-8F4E-E9F59AEE7E5C}" srcId="{C08EF094-AE84-924E-85E4-A3D904B2F369}" destId="{71398A0F-548E-1A44-AE3C-D0DB9FAF7317}" srcOrd="1" destOrd="0" parTransId="{CF3DDBE3-3740-2A49-A874-6D55EA8D317D}" sibTransId="{9A70D5A8-BE70-D741-993C-A1337A2D0159}"/>
-    <dgm:cxn modelId="{3FBB8FD4-F86B-1A44-9D11-CC5AE102F869}" srcId="{A589F188-5BBE-F740-BFB4-D28F42C9054B}" destId="{7FC6DCAF-29CF-AD4D-99B2-D927A75175E4}" srcOrd="2" destOrd="0" parTransId="{F194F0AE-AB76-F348-A956-3ED3C3897464}" sibTransId="{46119FFE-5FEC-B64F-9A44-6A4E183AC6C7}"/>
-    <dgm:cxn modelId="{4AC3AD98-A75A-0747-A387-884AFF3979B3}" type="presOf" srcId="{7F9CEABB-4961-654E-95FD-0D8597210B7D}" destId="{80B1EB63-517B-3F41-96A4-C449E7CE44F1}" srcOrd="0" destOrd="0" presId="urn:microsoft.com/office/officeart/2005/8/layout/hierarchy6"/>
-    <dgm:cxn modelId="{DF6AAD01-62CF-A443-8B6D-BFC5C6268C7E}" type="presOf" srcId="{C9A84787-0323-8A4E-90E9-89F75A92AAFB}" destId="{53A888AF-5866-BE41-B4AC-8AF29619D1B4}" srcOrd="0" destOrd="0" presId="urn:microsoft.com/office/officeart/2005/8/layout/hierarchy6"/>
-    <dgm:cxn modelId="{D8251EC5-1CEE-9B48-AC72-0E89DCEA2D5E}" type="presOf" srcId="{DBA8AE41-0903-444F-9B01-6312C83579CF}" destId="{A40373D9-960F-7F4D-98E8-A9FB2DBB29E2}" srcOrd="0" destOrd="0" presId="urn:microsoft.com/office/officeart/2005/8/layout/hierarchy6"/>
-    <dgm:cxn modelId="{0984871C-8A10-C849-8E63-2F7A8522B1DC}" type="presOf" srcId="{565472C5-351A-6A47-B1DB-5960ECA48A59}" destId="{CD007CCC-3B62-6C49-ADE7-5083587358A7}" srcOrd="0" destOrd="0" presId="urn:microsoft.com/office/officeart/2005/8/layout/hierarchy6"/>
-    <dgm:cxn modelId="{799B9AA1-A902-E648-80BF-9E0486D03E2C}" srcId="{A589F188-5BBE-F740-BFB4-D28F42C9054B}" destId="{C6EF9F61-C6F2-2840-817E-27593EF1F892}" srcOrd="1" destOrd="0" parTransId="{4CF9A705-81A8-9E42-954E-6883CF32CF33}" sibTransId="{1084BD89-325A-5C4F-9A98-935F615D30FD}"/>
-    <dgm:cxn modelId="{17BAE909-D3BF-C042-B9CF-40725D3F2402}" type="presOf" srcId="{2EABAA00-FA88-F148-B820-9944C2D1315F}" destId="{4ED9CBD7-1C8C-C54E-9E04-D4219E6BDA6C}" srcOrd="0" destOrd="0" presId="urn:microsoft.com/office/officeart/2005/8/layout/hierarchy6"/>
-    <dgm:cxn modelId="{544D3877-77BA-5245-BED6-010D7F6C349C}" type="presOf" srcId="{B553BC4D-61CF-7644-A3F7-72D84096C05C}" destId="{0D82A4BC-6151-444A-AE4C-BAAE071D7942}" srcOrd="0" destOrd="0" presId="urn:microsoft.com/office/officeart/2005/8/layout/hierarchy6"/>
-    <dgm:cxn modelId="{0526A5FC-9695-5F42-A792-7FCB127B7D58}" type="presOf" srcId="{4D14F183-C4D9-224B-9EE1-AA4BC4453985}" destId="{9BC4EC78-B262-C048-A423-4D9CB8008025}" srcOrd="0" destOrd="0" presId="urn:microsoft.com/office/officeart/2005/8/layout/hierarchy6"/>
+    <dgm:cxn modelId="{7995DE0E-016C-FD49-A739-F2CCC5662572}" srcId="{AF5EC167-24DD-F44E-AA98-41BF347B8425}" destId="{A09B9644-7FA6-7143-8A5C-C9B622F4F633}" srcOrd="2" destOrd="0" parTransId="{C8884311-4A27-B54E-949A-2532E7E02161}" sibTransId="{955E7B5E-3951-3B4A-A671-050DB5FD3F36}"/>
     <dgm:cxn modelId="{298656AC-71E9-3B46-BC09-522585720E46}" srcId="{47B2B18F-98B9-8148-B6DC-60798A233A44}" destId="{A589F188-5BBE-F740-BFB4-D28F42C9054B}" srcOrd="2" destOrd="0" parTransId="{CCA98178-CECF-1F4E-9BB9-3BEC8B837EE3}" sibTransId="{2BDC568B-016D-DB42-BE64-E7A83855124F}"/>
-    <dgm:cxn modelId="{CC2B6226-9F73-EB4E-904C-C813A91F7C91}" type="presOf" srcId="{4AED2AC5-539B-814B-BCC3-6C935DA3172A}" destId="{0015D2B2-ADA6-6649-8987-33BF465BA00F}" srcOrd="0" destOrd="0" presId="urn:microsoft.com/office/officeart/2005/8/layout/hierarchy6"/>
-    <dgm:cxn modelId="{36D869A2-0E30-7346-A41A-78AAA0FE610C}" type="presOf" srcId="{007B3AA8-7417-0C4D-8CCE-D8B3C95DEA0C}" destId="{47F226ED-03DC-DB42-8882-368010BF9656}" srcOrd="0" destOrd="0" presId="urn:microsoft.com/office/officeart/2005/8/layout/hierarchy6"/>
-    <dgm:cxn modelId="{FA5CCA31-BCD4-5845-97C5-61B307105784}" srcId="{C08EF094-AE84-924E-85E4-A3D904B2F369}" destId="{CAD2C9E1-8ACF-BE4D-A341-E59F51BBCD09}" srcOrd="8" destOrd="0" parTransId="{007B3AA8-7417-0C4D-8CCE-D8B3C95DEA0C}" sibTransId="{0B19EAC7-0DE2-AC49-ABA5-E59D0E9BE179}"/>
-    <dgm:cxn modelId="{85644B5C-018B-6048-B8A8-A0E8E3FE5C49}" type="presOf" srcId="{8B6A1C9F-193E-F140-8F56-EF24093EA1A3}" destId="{9CC7233D-5EBE-434D-918B-6C3475B044D5}" srcOrd="0" destOrd="0" presId="urn:microsoft.com/office/officeart/2005/8/layout/hierarchy6"/>
-    <dgm:cxn modelId="{4FAB956F-978F-1248-98C7-D4D595822371}" srcId="{C08EF094-AE84-924E-85E4-A3D904B2F369}" destId="{4A3CFD4F-A369-A748-81CE-5A3517A21A01}" srcOrd="7" destOrd="0" parTransId="{B00D1B25-635B-774A-8490-C07651A50BA8}" sibTransId="{36C62675-439A-874E-9BE2-76C0DFE6671D}"/>
-    <dgm:cxn modelId="{29BAD149-9397-9045-92C2-6140E630D2E1}" type="presOf" srcId="{7BB740C9-3C6B-E443-9D37-10BEEA9FF1F8}" destId="{B3E752D9-0DAF-4643-8967-E6BACF17435F}" srcOrd="0" destOrd="0" presId="urn:microsoft.com/office/officeart/2005/8/layout/hierarchy6"/>
-    <dgm:cxn modelId="{9F464C4E-B30A-E84C-B55B-BB0D6C717D73}" type="presOf" srcId="{ABF4A1D2-B6C2-CD47-9705-3E8BBD120A32}" destId="{DFC1035A-BB9E-D54B-9D3B-A59CC7894DEC}" srcOrd="0" destOrd="0" presId="urn:microsoft.com/office/officeart/2005/8/layout/hierarchy6"/>
+    <dgm:cxn modelId="{DBB005A6-A32D-2442-ABB1-150F4CA74EAC}" type="presOf" srcId="{AFF1DCCA-869E-BF48-AE70-D7CF6058A3D5}" destId="{BC751D51-4F41-0C4C-BB56-9A90DE65521B}" srcOrd="0" destOrd="0" presId="urn:microsoft.com/office/officeart/2005/8/layout/hierarchy6"/>
+    <dgm:cxn modelId="{82229DA9-C84B-5E48-87B7-FFD224349CBB}" type="presOf" srcId="{B99BCB02-8E6F-D646-B684-551AE4D43602}" destId="{AC7565D8-1DCE-B548-989A-B43E0C1DF906}" srcOrd="0" destOrd="0" presId="urn:microsoft.com/office/officeart/2005/8/layout/hierarchy6"/>
     <dgm:cxn modelId="{89416D5B-DD36-D946-AEB7-1E8B19A122BA}" srcId="{47B2B18F-98B9-8148-B6DC-60798A233A44}" destId="{5C51E9B1-B92E-C046-88B1-D25E745B1F88}" srcOrd="3" destOrd="0" parTransId="{821B0846-6DAD-AC47-AC11-56F49A32E885}" sibTransId="{E61E91FC-82E4-E442-80F5-864982155BB8}"/>
-    <dgm:cxn modelId="{1D9543FF-1893-0543-BABD-ABC584541FA3}" type="presOf" srcId="{9A122E2C-DEE7-8D42-81CF-F4CF4D3FCAF1}" destId="{2A965C83-2AD7-904C-B62F-6ADE3507654A}" srcOrd="0" destOrd="0" presId="urn:microsoft.com/office/officeart/2005/8/layout/hierarchy6"/>
-    <dgm:cxn modelId="{481177F3-F546-8E47-9308-5B2BC8F5EBE0}" type="presOf" srcId="{47B2B18F-98B9-8148-B6DC-60798A233A44}" destId="{20AF6D03-8BA3-6D4D-91D6-6BB621334EE0}" srcOrd="0" destOrd="0" presId="urn:microsoft.com/office/officeart/2005/8/layout/hierarchy6"/>
-    <dgm:cxn modelId="{AF5F15E2-C9E6-8841-8522-EF11AE1E0BDE}" type="presOf" srcId="{C08EF094-AE84-924E-85E4-A3D904B2F369}" destId="{BFE0B1C6-1844-0046-86D8-4DEE78FD86A3}" srcOrd="0" destOrd="0" presId="urn:microsoft.com/office/officeart/2005/8/layout/hierarchy6"/>
-    <dgm:cxn modelId="{806AB147-9FD9-1C46-8B9E-BABD81A53368}" srcId="{FFE4763F-6D4A-C84C-AFD7-E49DFFC00531}" destId="{2C521B09-C2A6-304A-ADB7-EE19CB526CFC}" srcOrd="1" destOrd="0" parTransId="{4D14F183-C4D9-224B-9EE1-AA4BC4453985}" sibTransId="{A1A9641A-A371-D64B-88CA-41725DC7C729}"/>
-    <dgm:cxn modelId="{4BDAD7B0-1477-BC44-B797-BC263CEA1A43}" type="presOf" srcId="{83D1D0E0-4D8F-2B4C-BA91-E46EEBA26BAB}" destId="{0B4D4399-C510-AB4D-85AB-C3558C55314B}" srcOrd="0" destOrd="0" presId="urn:microsoft.com/office/officeart/2005/8/layout/hierarchy6"/>
-    <dgm:cxn modelId="{C7F4444C-829F-6E4B-B44E-A683E5819168}" srcId="{11CEE5C9-55A8-824F-BA9B-B1A4975FA82D}" destId="{AFF1DCCA-869E-BF48-AE70-D7CF6058A3D5}" srcOrd="1" destOrd="0" parTransId="{565472C5-351A-6A47-B1DB-5960ECA48A59}" sibTransId="{DDFCE617-53AA-784C-9889-DDF0A4095F8A}"/>
-    <dgm:cxn modelId="{DBB005A6-A32D-2442-ABB1-150F4CA74EAC}" type="presOf" srcId="{AFF1DCCA-869E-BF48-AE70-D7CF6058A3D5}" destId="{BC751D51-4F41-0C4C-BB56-9A90DE65521B}" srcOrd="0" destOrd="0" presId="urn:microsoft.com/office/officeart/2005/8/layout/hierarchy6"/>
-    <dgm:cxn modelId="{78BBCCB7-1DF8-054D-B92F-4A2EE230CF2E}" type="presOf" srcId="{CAD2C9E1-8ACF-BE4D-A341-E59F51BBCD09}" destId="{48165126-8B80-4444-99A4-95E3621A03ED}" srcOrd="0" destOrd="0" presId="urn:microsoft.com/office/officeart/2005/8/layout/hierarchy6"/>
-    <dgm:cxn modelId="{5042F99A-5F4D-B145-9B70-298504A0D909}" type="presOf" srcId="{FFE4763F-6D4A-C84C-AFD7-E49DFFC00531}" destId="{51B4BBB9-653E-4141-A21A-A8C05AC8F6E9}" srcOrd="0" destOrd="0" presId="urn:microsoft.com/office/officeart/2005/8/layout/hierarchy6"/>
-    <dgm:cxn modelId="{D7685F49-252B-8E46-B4CD-FCBD58922240}" type="presOf" srcId="{A589F188-5BBE-F740-BFB4-D28F42C9054B}" destId="{40CEBFD4-83C3-5846-8D33-3AB5A5D95710}" srcOrd="0" destOrd="0" presId="urn:microsoft.com/office/officeart/2005/8/layout/hierarchy6"/>
-    <dgm:cxn modelId="{BEE4E55D-9860-D847-8F98-C9434422352D}" type="presOf" srcId="{1CFA7DE7-ECE8-B049-92EA-9451E486BF73}" destId="{DBBEE2C4-E54F-D942-993F-82E16E578EB8}" srcOrd="0" destOrd="0" presId="urn:microsoft.com/office/officeart/2005/8/layout/hierarchy6"/>
-    <dgm:cxn modelId="{AB67D5D6-EF18-2C45-AB8D-B7E71ED59960}" srcId="{11CEE5C9-55A8-824F-BA9B-B1A4975FA82D}" destId="{C9A84787-0323-8A4E-90E9-89F75A92AAFB}" srcOrd="0" destOrd="0" parTransId="{B389AACB-65A0-3C4C-8335-69872F34AAF1}" sibTransId="{6CE91D18-A756-A64C-B339-DB3DDB3C18E7}"/>
-    <dgm:cxn modelId="{C029879A-2C08-844F-8503-6ED89362193C}" type="presOf" srcId="{7E411DBC-2DFF-4C44-B6DD-823D0B55806D}" destId="{1D2E00EC-E833-6047-B478-2DBE7E168AFF}" srcOrd="0" destOrd="0" presId="urn:microsoft.com/office/officeart/2005/8/layout/hierarchy6"/>
-    <dgm:cxn modelId="{B1304A37-5698-8A44-8FC7-525E5487D771}" type="presOf" srcId="{92629936-234C-284D-8BD7-3207CF9FD357}" destId="{40A4DB64-0E72-994A-A165-537167CD4950}" srcOrd="0" destOrd="0" presId="urn:microsoft.com/office/officeart/2005/8/layout/hierarchy6"/>
-    <dgm:cxn modelId="{06DE16D3-8EB8-2646-A286-6E687A89FA27}" srcId="{9A122E2C-DEE7-8D42-81CF-F4CF4D3FCAF1}" destId="{C08EF094-AE84-924E-85E4-A3D904B2F369}" srcOrd="0" destOrd="0" parTransId="{5E224946-2898-D04A-86EA-9EDDED7B3D51}" sibTransId="{A3E9DE71-CA06-B042-B92D-91A772E5B897}"/>
-    <dgm:cxn modelId="{5B638FE4-932A-144D-8811-625C3C1E3E77}" type="presOf" srcId="{64EF63D8-4367-5744-8F30-A3FF5423DFFA}" destId="{93270657-4C4A-F444-B4C6-F927919A2A3B}" srcOrd="0" destOrd="0" presId="urn:microsoft.com/office/officeart/2005/8/layout/hierarchy6"/>
-    <dgm:cxn modelId="{7760F484-3930-444D-B3A0-89576C563145}" type="presOf" srcId="{2C521B09-C2A6-304A-ADB7-EE19CB526CFC}" destId="{23F9216E-C7F3-D141-BA72-240F3E70368A}" srcOrd="0" destOrd="0" presId="urn:microsoft.com/office/officeart/2005/8/layout/hierarchy6"/>
-    <dgm:cxn modelId="{9AA640D3-AE2E-024E-9EBC-EFCBCE79F8FE}" srcId="{C08EF094-AE84-924E-85E4-A3D904B2F369}" destId="{1CFA7DE7-ECE8-B049-92EA-9451E486BF73}" srcOrd="6" destOrd="0" parTransId="{92629936-234C-284D-8BD7-3207CF9FD357}" sibTransId="{EEA2EA79-B8CA-2F4A-8A43-E461B4096F52}"/>
-    <dgm:cxn modelId="{5E0EB3FB-C51F-E948-A272-0B3ABA9DB489}" type="presOf" srcId="{F194F0AE-AB76-F348-A956-3ED3C3897464}" destId="{54C8F112-08DD-E246-B5F5-9F8A7B221232}" srcOrd="0" destOrd="0" presId="urn:microsoft.com/office/officeart/2005/8/layout/hierarchy6"/>
-    <dgm:cxn modelId="{874A721F-07E1-AE4B-8B94-EE084787D84F}" type="presOf" srcId="{4A3CFD4F-A369-A748-81CE-5A3517A21A01}" destId="{7DE98858-2169-3147-8802-4D119636C8CD}" srcOrd="0" destOrd="0" presId="urn:microsoft.com/office/officeart/2005/8/layout/hierarchy6"/>
-    <dgm:cxn modelId="{B80C28E8-A6F1-0D40-B2C8-12608D2AAC24}" srcId="{C08EF094-AE84-924E-85E4-A3D904B2F369}" destId="{FFE4763F-6D4A-C84C-AFD7-E49DFFC00531}" srcOrd="5" destOrd="0" parTransId="{A2E7E8AA-252B-964D-A76D-D1DBFC905610}" sibTransId="{1201A228-14BC-6E41-8BA2-69B4F417B830}"/>
-    <dgm:cxn modelId="{3C8EAEC3-BA11-B04B-8065-A3FB78100CA0}" type="presOf" srcId="{4CF9A705-81A8-9E42-954E-6883CF32CF33}" destId="{A6050186-D63E-864F-A7FB-933DDE98E4D9}" srcOrd="0" destOrd="0" presId="urn:microsoft.com/office/officeart/2005/8/layout/hierarchy6"/>
-    <dgm:cxn modelId="{8F1FCADD-A273-5544-A3BB-0C4C0BCA7ABA}" srcId="{C08EF094-AE84-924E-85E4-A3D904B2F369}" destId="{47B2B18F-98B9-8148-B6DC-60798A233A44}" srcOrd="4" destOrd="0" parTransId="{7F9CEABB-4961-654E-95FD-0D8597210B7D}" sibTransId="{E2D0ED87-1DC6-BE44-9BAE-A14A1A73BA14}"/>
-    <dgm:cxn modelId="{C6268211-9C35-0B44-96D8-6799F546D696}" srcId="{FFE4763F-6D4A-C84C-AFD7-E49DFFC00531}" destId="{83D1D0E0-4D8F-2B4C-BA91-E46EEBA26BAB}" srcOrd="2" destOrd="0" parTransId="{08EA561E-9636-5841-927B-5ABC9CBCAD65}" sibTransId="{251C8B05-C621-274A-BE99-B3AF2211821C}"/>
-    <dgm:cxn modelId="{2E6AF29A-1E7B-784E-8B36-DC1960799E0B}" type="presOf" srcId="{CCA98178-CECF-1F4E-9BB9-3BEC8B837EE3}" destId="{BAAAE675-372E-C64C-9DFC-2334B74F5B6F}" srcOrd="0" destOrd="0" presId="urn:microsoft.com/office/officeart/2005/8/layout/hierarchy6"/>
-    <dgm:cxn modelId="{E5E10ADA-30E3-2240-A76E-D6790B3473AB}" type="presOf" srcId="{5C51E9B1-B92E-C046-88B1-D25E745B1F88}" destId="{2BCF6A44-CA3B-1D40-8C2A-66704108E553}" srcOrd="0" destOrd="0" presId="urn:microsoft.com/office/officeart/2005/8/layout/hierarchy6"/>
-    <dgm:cxn modelId="{B9C2B32B-73D3-654F-A505-AA3A1B144A88}" srcId="{C08EF094-AE84-924E-85E4-A3D904B2F369}" destId="{86E1B045-1E46-F64C-9527-DBC0BBCF8E48}" srcOrd="3" destOrd="0" parTransId="{7BB740C9-3C6B-E443-9D37-10BEEA9FF1F8}" sibTransId="{F4F2180F-746B-6B4C-A01E-81D9EC7C8B3B}"/>
-    <dgm:cxn modelId="{10E845EA-8F49-9B4D-9A49-15527719BC77}" srcId="{47B2B18F-98B9-8148-B6DC-60798A233A44}" destId="{4D96A72B-37A5-1442-826F-A659684CD6CD}" srcOrd="0" destOrd="0" parTransId="{AC8A1B67-7F4A-5949-8EE9-C24CD7CEFEF5}" sibTransId="{68943B30-4E50-D04A-9789-2B44BBB90AED}"/>
-    <dgm:cxn modelId="{4307D80D-2835-EB4E-B595-B4B6163DA910}" type="presOf" srcId="{AC8A1B67-7F4A-5949-8EE9-C24CD7CEFEF5}" destId="{ADA2498B-E8FE-E24A-80A0-32101A6C19E4}" srcOrd="0" destOrd="0" presId="urn:microsoft.com/office/officeart/2005/8/layout/hierarchy6"/>
-    <dgm:cxn modelId="{F6754560-BBC9-EC4F-B7D8-4058C835DAFF}" srcId="{47B2B18F-98B9-8148-B6DC-60798A233A44}" destId="{F60CC18C-83C4-F346-8211-E18E63B32600}" srcOrd="1" destOrd="0" parTransId="{ABF4A1D2-B6C2-CD47-9705-3E8BBD120A32}" sibTransId="{0A0071BE-587C-5D49-BD26-2F8D9A86E633}"/>
-    <dgm:cxn modelId="{D2803E51-9C67-7343-976B-A955E4C26DA5}" type="presOf" srcId="{86E1B045-1E46-F64C-9527-DBC0BBCF8E48}" destId="{B9972A86-A3F6-6A47-B03A-39E4AB3F09BA}" srcOrd="0" destOrd="0" presId="urn:microsoft.com/office/officeart/2005/8/layout/hierarchy6"/>
-    <dgm:cxn modelId="{5A159180-2246-1546-B034-6CB1FC600C68}" type="presOf" srcId="{A2E7E8AA-252B-964D-A76D-D1DBFC905610}" destId="{834ED12A-98BA-124A-83D0-5AF8577A70A7}" srcOrd="0" destOrd="0" presId="urn:microsoft.com/office/officeart/2005/8/layout/hierarchy6"/>
-    <dgm:cxn modelId="{BAB01431-D731-1B4D-BFF6-5B46BA440788}" type="presOf" srcId="{AF5EC167-24DD-F44E-AA98-41BF347B8425}" destId="{FFB44854-B8FE-0946-878F-79A27639517F}" srcOrd="0" destOrd="0" presId="urn:microsoft.com/office/officeart/2005/8/layout/hierarchy6"/>
+    <dgm:cxn modelId="{F9C6F54A-4B50-A743-8A98-F97735C20ACD}" type="presOf" srcId="{8D88936D-7A95-4542-A4C8-704063821867}" destId="{0B36DFB8-E481-9846-9713-FD9BC35589F9}" srcOrd="0" destOrd="0" presId="urn:microsoft.com/office/officeart/2005/8/layout/hierarchy6"/>
     <dgm:cxn modelId="{E2113B05-3F39-024F-B5DC-B9FDEC0E893D}" type="presParOf" srcId="{2A965C83-2AD7-904C-B62F-6ADE3507654A}" destId="{C6421A64-AA7C-1E48-9F15-AA7FFC6D1C44}" srcOrd="0" destOrd="0" presId="urn:microsoft.com/office/officeart/2005/8/layout/hierarchy6"/>
     <dgm:cxn modelId="{CB82DF4B-C3B7-EB45-BA23-9F6031EC4C28}" type="presParOf" srcId="{C6421A64-AA7C-1E48-9F15-AA7FFC6D1C44}" destId="{C3CCB6E3-FFA1-CE4A-8AE3-C053AFA1ABA8}" srcOrd="0" destOrd="0" presId="urn:microsoft.com/office/officeart/2005/8/layout/hierarchy6"/>
     <dgm:cxn modelId="{78E863EA-2304-574A-ABA8-CDDF19D7EBD9}" type="presParOf" srcId="{C3CCB6E3-FFA1-CE4A-8AE3-C053AFA1ABA8}" destId="{9F1E73B1-8ADF-3946-A97F-3C273ADF2EE6}" srcOrd="0" destOrd="0" presId="urn:microsoft.com/office/officeart/2005/8/layout/hierarchy6"/>
@@ -5532,16 +5908,32 @@
     <dgm:cxn modelId="{F7434FEE-CF38-A04D-AE6E-1C4B71333B91}" type="presParOf" srcId="{496B1887-49F3-0642-A8A4-7DA9247E8109}" destId="{F0610573-D317-B345-B1F9-6B1DF5B67805}" srcOrd="5" destOrd="0" presId="urn:microsoft.com/office/officeart/2005/8/layout/hierarchy6"/>
     <dgm:cxn modelId="{0C04EC50-1678-884C-85AB-53C7C2AB6400}" type="presParOf" srcId="{F0610573-D317-B345-B1F9-6B1DF5B67805}" destId="{2DDCA4E4-DC97-9B48-8E04-20AD3E254FEE}" srcOrd="0" destOrd="0" presId="urn:microsoft.com/office/officeart/2005/8/layout/hierarchy6"/>
     <dgm:cxn modelId="{FC98E50A-D7BB-974D-A11E-A781C1ED1446}" type="presParOf" srcId="{F0610573-D317-B345-B1F9-6B1DF5B67805}" destId="{43F8BC23-1C3C-A947-9932-8105D8E332B7}" srcOrd="1" destOrd="0" presId="urn:microsoft.com/office/officeart/2005/8/layout/hierarchy6"/>
-    <dgm:cxn modelId="{ED54C0E3-A42E-5D46-8F87-F0058D8B73E2}" type="presParOf" srcId="{43F8BC23-1C3C-A947-9932-8105D8E332B7}" destId="{0B36DFB8-E481-9846-9713-FD9BC35589F9}" srcOrd="0" destOrd="0" presId="urn:microsoft.com/office/officeart/2005/8/layout/hierarchy6"/>
-    <dgm:cxn modelId="{E0EEDEE1-98D9-B042-9889-0330FB8C8459}" type="presParOf" srcId="{43F8BC23-1C3C-A947-9932-8105D8E332B7}" destId="{2C11E41E-7436-194E-9EBF-729F1BBD1D14}" srcOrd="1" destOrd="0" presId="urn:microsoft.com/office/officeart/2005/8/layout/hierarchy6"/>
-    <dgm:cxn modelId="{8AAB0EA5-12A8-684C-AEEB-56EA18F5B208}" type="presParOf" srcId="{2C11E41E-7436-194E-9EBF-729F1BBD1D14}" destId="{FFB44854-B8FE-0946-878F-79A27639517F}" srcOrd="0" destOrd="0" presId="urn:microsoft.com/office/officeart/2005/8/layout/hierarchy6"/>
-    <dgm:cxn modelId="{65EBD09F-A919-7148-844F-02332E13DFE7}" type="presParOf" srcId="{2C11E41E-7436-194E-9EBF-729F1BBD1D14}" destId="{439A65AE-4462-DA4F-8E93-F6B84BAEC32E}" srcOrd="1" destOrd="0" presId="urn:microsoft.com/office/officeart/2005/8/layout/hierarchy6"/>
-    <dgm:cxn modelId="{67A9FF5F-0746-C449-A2C9-5D50B1B0950F}" type="presParOf" srcId="{496B1887-49F3-0642-A8A4-7DA9247E8109}" destId="{B3E752D9-0DAF-4643-8967-E6BACF17435F}" srcOrd="6" destOrd="0" presId="urn:microsoft.com/office/officeart/2005/8/layout/hierarchy6"/>
-    <dgm:cxn modelId="{8CDE9931-AD8C-F841-AE83-8C5F4DD2D58B}" type="presParOf" srcId="{496B1887-49F3-0642-A8A4-7DA9247E8109}" destId="{41CE3A08-1D56-5F41-A13F-90CE1E333198}" srcOrd="7" destOrd="0" presId="urn:microsoft.com/office/officeart/2005/8/layout/hierarchy6"/>
+    <dgm:cxn modelId="{FD3F7FD4-714E-E24A-A8E0-ACE9ED75156C}" type="presParOf" srcId="{496B1887-49F3-0642-A8A4-7DA9247E8109}" destId="{0B36DFB8-E481-9846-9713-FD9BC35589F9}" srcOrd="6" destOrd="0" presId="urn:microsoft.com/office/officeart/2005/8/layout/hierarchy6"/>
+    <dgm:cxn modelId="{5E2D0A48-FB40-D14E-AE37-64F8A6C04F97}" type="presParOf" srcId="{496B1887-49F3-0642-A8A4-7DA9247E8109}" destId="{2C11E41E-7436-194E-9EBF-729F1BBD1D14}" srcOrd="7" destOrd="0" presId="urn:microsoft.com/office/officeart/2005/8/layout/hierarchy6"/>
+    <dgm:cxn modelId="{DB52E99C-C42D-F74C-87B0-401E53E9DE27}" type="presParOf" srcId="{2C11E41E-7436-194E-9EBF-729F1BBD1D14}" destId="{FFB44854-B8FE-0946-878F-79A27639517F}" srcOrd="0" destOrd="0" presId="urn:microsoft.com/office/officeart/2005/8/layout/hierarchy6"/>
+    <dgm:cxn modelId="{E3F32D95-D8AE-9A45-917D-74E9BDEEE00B}" type="presParOf" srcId="{2C11E41E-7436-194E-9EBF-729F1BBD1D14}" destId="{439A65AE-4462-DA4F-8E93-F6B84BAEC32E}" srcOrd="1" destOrd="0" presId="urn:microsoft.com/office/officeart/2005/8/layout/hierarchy6"/>
+    <dgm:cxn modelId="{06161867-3BE3-8246-9915-B3531862B88A}" type="presParOf" srcId="{439A65AE-4462-DA4F-8E93-F6B84BAEC32E}" destId="{0FBD2D58-EF12-A64D-87FA-CFDF18228DF6}" srcOrd="0" destOrd="0" presId="urn:microsoft.com/office/officeart/2005/8/layout/hierarchy6"/>
+    <dgm:cxn modelId="{4D6F1CC8-942F-5F49-B3F1-B001E86A5410}" type="presParOf" srcId="{439A65AE-4462-DA4F-8E93-F6B84BAEC32E}" destId="{24F6BC4D-BE8C-7D46-BA5B-96781C2E1354}" srcOrd="1" destOrd="0" presId="urn:microsoft.com/office/officeart/2005/8/layout/hierarchy6"/>
+    <dgm:cxn modelId="{5CE10040-8A68-094A-BA25-B3C090214DCE}" type="presParOf" srcId="{24F6BC4D-BE8C-7D46-BA5B-96781C2E1354}" destId="{B61B0D98-773A-8A4F-9F5C-8FBDD5C64421}" srcOrd="0" destOrd="0" presId="urn:microsoft.com/office/officeart/2005/8/layout/hierarchy6"/>
+    <dgm:cxn modelId="{B06A3F4A-4351-DA42-A52D-01A9833BA2D2}" type="presParOf" srcId="{24F6BC4D-BE8C-7D46-BA5B-96781C2E1354}" destId="{E67B78C6-1670-5C4D-AEFA-B64BDE10CCA2}" srcOrd="1" destOrd="0" presId="urn:microsoft.com/office/officeart/2005/8/layout/hierarchy6"/>
+    <dgm:cxn modelId="{626886A6-081B-3A45-A3CD-611F39C89E21}" type="presParOf" srcId="{439A65AE-4462-DA4F-8E93-F6B84BAEC32E}" destId="{03358BE9-0182-7E4E-A763-7930CEF1BE29}" srcOrd="2" destOrd="0" presId="urn:microsoft.com/office/officeart/2005/8/layout/hierarchy6"/>
+    <dgm:cxn modelId="{ABD854B1-34DE-904B-9425-ADCE8D199DA1}" type="presParOf" srcId="{439A65AE-4462-DA4F-8E93-F6B84BAEC32E}" destId="{CCEBFB4C-AFB7-4A4F-AC97-F6D5111D7794}" srcOrd="3" destOrd="0" presId="urn:microsoft.com/office/officeart/2005/8/layout/hierarchy6"/>
+    <dgm:cxn modelId="{2032661C-0F6E-0D4E-B93D-4AF56A39D54D}" type="presParOf" srcId="{CCEBFB4C-AFB7-4A4F-AC97-F6D5111D7794}" destId="{73AE1126-45AE-7D4B-AEAB-0A1BD05E96C6}" srcOrd="0" destOrd="0" presId="urn:microsoft.com/office/officeart/2005/8/layout/hierarchy6"/>
+    <dgm:cxn modelId="{32832F5D-09C7-A04F-9957-75972CC0E855}" type="presParOf" srcId="{CCEBFB4C-AFB7-4A4F-AC97-F6D5111D7794}" destId="{0D8001B6-1F62-7347-80B0-53367C52DD0D}" srcOrd="1" destOrd="0" presId="urn:microsoft.com/office/officeart/2005/8/layout/hierarchy6"/>
+    <dgm:cxn modelId="{878562B5-6DCC-C645-BD52-2E8D299541DF}" type="presParOf" srcId="{439A65AE-4462-DA4F-8E93-F6B84BAEC32E}" destId="{D2DB1DBF-8571-DA41-83F6-BBA6615036F3}" srcOrd="4" destOrd="0" presId="urn:microsoft.com/office/officeart/2005/8/layout/hierarchy6"/>
+    <dgm:cxn modelId="{82BFD9FC-2636-0F4A-8457-2A473905E5F9}" type="presParOf" srcId="{439A65AE-4462-DA4F-8E93-F6B84BAEC32E}" destId="{52723E65-DE6C-5641-8761-F4078E2E2E83}" srcOrd="5" destOrd="0" presId="urn:microsoft.com/office/officeart/2005/8/layout/hierarchy6"/>
+    <dgm:cxn modelId="{774E8A8D-6A97-7048-AFE8-F690B3DD6DA9}" type="presParOf" srcId="{52723E65-DE6C-5641-8761-F4078E2E2E83}" destId="{EE67847A-DFFD-9745-98B7-329C5757B5C4}" srcOrd="0" destOrd="0" presId="urn:microsoft.com/office/officeart/2005/8/layout/hierarchy6"/>
+    <dgm:cxn modelId="{652CAA04-5BAD-5A44-AD7E-623B9D5C8A32}" type="presParOf" srcId="{52723E65-DE6C-5641-8761-F4078E2E2E83}" destId="{2818BC2C-4E32-804F-A390-E27DA77AB807}" srcOrd="1" destOrd="0" presId="urn:microsoft.com/office/officeart/2005/8/layout/hierarchy6"/>
+    <dgm:cxn modelId="{CDC07E19-D7E8-D348-9B85-8DE071A6AE5B}" type="presParOf" srcId="{439A65AE-4462-DA4F-8E93-F6B84BAEC32E}" destId="{CD1DBAD6-C94F-5C43-8507-9B507D8DA318}" srcOrd="6" destOrd="0" presId="urn:microsoft.com/office/officeart/2005/8/layout/hierarchy6"/>
+    <dgm:cxn modelId="{C4797EB2-E6C7-2949-91FD-D95306A4C6E5}" type="presParOf" srcId="{439A65AE-4462-DA4F-8E93-F6B84BAEC32E}" destId="{A5C03BAB-7388-D441-8EB2-784521E2BABF}" srcOrd="7" destOrd="0" presId="urn:microsoft.com/office/officeart/2005/8/layout/hierarchy6"/>
+    <dgm:cxn modelId="{7658D671-1040-2542-BB9E-577FE2F7986A}" type="presParOf" srcId="{A5C03BAB-7388-D441-8EB2-784521E2BABF}" destId="{AC7565D8-1DCE-B548-989A-B43E0C1DF906}" srcOrd="0" destOrd="0" presId="urn:microsoft.com/office/officeart/2005/8/layout/hierarchy6"/>
+    <dgm:cxn modelId="{85A4F05F-8EF6-B243-80FF-67E1C7B0B86F}" type="presParOf" srcId="{A5C03BAB-7388-D441-8EB2-784521E2BABF}" destId="{F1A3228D-580E-D245-82E7-69AC916AD68A}" srcOrd="1" destOrd="0" presId="urn:microsoft.com/office/officeart/2005/8/layout/hierarchy6"/>
+    <dgm:cxn modelId="{67A9FF5F-0746-C449-A2C9-5D50B1B0950F}" type="presParOf" srcId="{496B1887-49F3-0642-A8A4-7DA9247E8109}" destId="{B3E752D9-0DAF-4643-8967-E6BACF17435F}" srcOrd="8" destOrd="0" presId="urn:microsoft.com/office/officeart/2005/8/layout/hierarchy6"/>
+    <dgm:cxn modelId="{8CDE9931-AD8C-F841-AE83-8C5F4DD2D58B}" type="presParOf" srcId="{496B1887-49F3-0642-A8A4-7DA9247E8109}" destId="{41CE3A08-1D56-5F41-A13F-90CE1E333198}" srcOrd="9" destOrd="0" presId="urn:microsoft.com/office/officeart/2005/8/layout/hierarchy6"/>
     <dgm:cxn modelId="{4EC7451F-E3D7-4D43-BE4F-796793FC7CA1}" type="presParOf" srcId="{41CE3A08-1D56-5F41-A13F-90CE1E333198}" destId="{B9972A86-A3F6-6A47-B03A-39E4AB3F09BA}" srcOrd="0" destOrd="0" presId="urn:microsoft.com/office/officeart/2005/8/layout/hierarchy6"/>
     <dgm:cxn modelId="{95A99EA1-3EF6-854A-A3F1-F345A9A4F4B6}" type="presParOf" srcId="{41CE3A08-1D56-5F41-A13F-90CE1E333198}" destId="{59062BDB-22E3-B34B-857A-F66FB1DFB46D}" srcOrd="1" destOrd="0" presId="urn:microsoft.com/office/officeart/2005/8/layout/hierarchy6"/>
-    <dgm:cxn modelId="{4E514F7D-F642-7C4C-A289-D53DD17E3F25}" type="presParOf" srcId="{496B1887-49F3-0642-A8A4-7DA9247E8109}" destId="{80B1EB63-517B-3F41-96A4-C449E7CE44F1}" srcOrd="8" destOrd="0" presId="urn:microsoft.com/office/officeart/2005/8/layout/hierarchy6"/>
-    <dgm:cxn modelId="{D7E560D0-8A52-C345-918D-C2E4C64E2E23}" type="presParOf" srcId="{496B1887-49F3-0642-A8A4-7DA9247E8109}" destId="{0F2B2D67-BD2C-464D-9BA6-87F816986F89}" srcOrd="9" destOrd="0" presId="urn:microsoft.com/office/officeart/2005/8/layout/hierarchy6"/>
+    <dgm:cxn modelId="{4E514F7D-F642-7C4C-A289-D53DD17E3F25}" type="presParOf" srcId="{496B1887-49F3-0642-A8A4-7DA9247E8109}" destId="{80B1EB63-517B-3F41-96A4-C449E7CE44F1}" srcOrd="10" destOrd="0" presId="urn:microsoft.com/office/officeart/2005/8/layout/hierarchy6"/>
+    <dgm:cxn modelId="{D7E560D0-8A52-C345-918D-C2E4C64E2E23}" type="presParOf" srcId="{496B1887-49F3-0642-A8A4-7DA9247E8109}" destId="{0F2B2D67-BD2C-464D-9BA6-87F816986F89}" srcOrd="11" destOrd="0" presId="urn:microsoft.com/office/officeart/2005/8/layout/hierarchy6"/>
     <dgm:cxn modelId="{45A12C7A-CCE1-7A40-8CBA-6B1A2F5DE0ED}" type="presParOf" srcId="{0F2B2D67-BD2C-464D-9BA6-87F816986F89}" destId="{20AF6D03-8BA3-6D4D-91D6-6BB621334EE0}" srcOrd="0" destOrd="0" presId="urn:microsoft.com/office/officeart/2005/8/layout/hierarchy6"/>
     <dgm:cxn modelId="{4A809A84-A98A-1F4B-8E74-649084B1BFA8}" type="presParOf" srcId="{0F2B2D67-BD2C-464D-9BA6-87F816986F89}" destId="{270D6E81-0C34-AF49-9D53-44DD25E3327A}" srcOrd="1" destOrd="0" presId="urn:microsoft.com/office/officeart/2005/8/layout/hierarchy6"/>
     <dgm:cxn modelId="{69C3AC95-4013-B34D-B22E-2DE1CA8CE6CF}" type="presParOf" srcId="{270D6E81-0C34-AF49-9D53-44DD25E3327A}" destId="{ADA2498B-E8FE-E24A-80A0-32101A6C19E4}" srcOrd="0" destOrd="0" presId="urn:microsoft.com/office/officeart/2005/8/layout/hierarchy6"/>
@@ -5572,8 +5964,8 @@
     <dgm:cxn modelId="{017E1E5B-05D2-4D4D-8BDA-F2789930F690}" type="presParOf" srcId="{270D6E81-0C34-AF49-9D53-44DD25E3327A}" destId="{C2447EB8-10DA-8040-9CDB-96BEA82F80AD}" srcOrd="7" destOrd="0" presId="urn:microsoft.com/office/officeart/2005/8/layout/hierarchy6"/>
     <dgm:cxn modelId="{8AE43711-559A-5448-B0B0-EFEF1E238116}" type="presParOf" srcId="{C2447EB8-10DA-8040-9CDB-96BEA82F80AD}" destId="{2BCF6A44-CA3B-1D40-8C2A-66704108E553}" srcOrd="0" destOrd="0" presId="urn:microsoft.com/office/officeart/2005/8/layout/hierarchy6"/>
     <dgm:cxn modelId="{5478EA38-05F6-9B4B-B06D-691D1AC21D13}" type="presParOf" srcId="{C2447EB8-10DA-8040-9CDB-96BEA82F80AD}" destId="{927342F0-6630-4B44-B0CF-DFC171978230}" srcOrd="1" destOrd="0" presId="urn:microsoft.com/office/officeart/2005/8/layout/hierarchy6"/>
-    <dgm:cxn modelId="{9184B0C4-7547-3F41-B943-3867819FD308}" type="presParOf" srcId="{496B1887-49F3-0642-A8A4-7DA9247E8109}" destId="{834ED12A-98BA-124A-83D0-5AF8577A70A7}" srcOrd="10" destOrd="0" presId="urn:microsoft.com/office/officeart/2005/8/layout/hierarchy6"/>
-    <dgm:cxn modelId="{EF76DC25-E9D1-CA46-B56C-B7E9BD794EE7}" type="presParOf" srcId="{496B1887-49F3-0642-A8A4-7DA9247E8109}" destId="{3E764FDF-70AF-744D-9113-F327B8103226}" srcOrd="11" destOrd="0" presId="urn:microsoft.com/office/officeart/2005/8/layout/hierarchy6"/>
+    <dgm:cxn modelId="{9184B0C4-7547-3F41-B943-3867819FD308}" type="presParOf" srcId="{496B1887-49F3-0642-A8A4-7DA9247E8109}" destId="{834ED12A-98BA-124A-83D0-5AF8577A70A7}" srcOrd="12" destOrd="0" presId="urn:microsoft.com/office/officeart/2005/8/layout/hierarchy6"/>
+    <dgm:cxn modelId="{EF76DC25-E9D1-CA46-B56C-B7E9BD794EE7}" type="presParOf" srcId="{496B1887-49F3-0642-A8A4-7DA9247E8109}" destId="{3E764FDF-70AF-744D-9113-F327B8103226}" srcOrd="13" destOrd="0" presId="urn:microsoft.com/office/officeart/2005/8/layout/hierarchy6"/>
     <dgm:cxn modelId="{62FA674D-C03E-EA4F-9CD0-131C8563909B}" type="presParOf" srcId="{3E764FDF-70AF-744D-9113-F327B8103226}" destId="{51B4BBB9-653E-4141-A21A-A8C05AC8F6E9}" srcOrd="0" destOrd="0" presId="urn:microsoft.com/office/officeart/2005/8/layout/hierarchy6"/>
     <dgm:cxn modelId="{FF82ACDB-26AA-FA40-9A00-B11062A63C46}" type="presParOf" srcId="{3E764FDF-70AF-744D-9113-F327B8103226}" destId="{1D321EE1-ADE3-294A-B38C-776C76B74D18}" srcOrd="1" destOrd="0" presId="urn:microsoft.com/office/officeart/2005/8/layout/hierarchy6"/>
     <dgm:cxn modelId="{115A1FCF-97F5-5D4E-8AD4-1BE098E02C50}" type="presParOf" srcId="{1D321EE1-ADE3-294A-B38C-776C76B74D18}" destId="{A40373D9-960F-7F4D-98E8-A9FB2DBB29E2}" srcOrd="0" destOrd="0" presId="urn:microsoft.com/office/officeart/2005/8/layout/hierarchy6"/>
@@ -5588,20 +5980,20 @@
     <dgm:cxn modelId="{B51F991C-B98B-3440-909A-BF37B84784F1}" type="presParOf" srcId="{1D321EE1-ADE3-294A-B38C-776C76B74D18}" destId="{CF664FB0-3BC3-3E43-9959-BF106B1F656D}" srcOrd="5" destOrd="0" presId="urn:microsoft.com/office/officeart/2005/8/layout/hierarchy6"/>
     <dgm:cxn modelId="{A13BF54D-0B59-0D40-8F65-EC78D93FBD6F}" type="presParOf" srcId="{CF664FB0-3BC3-3E43-9959-BF106B1F656D}" destId="{0B4D4399-C510-AB4D-85AB-C3558C55314B}" srcOrd="0" destOrd="0" presId="urn:microsoft.com/office/officeart/2005/8/layout/hierarchy6"/>
     <dgm:cxn modelId="{47912689-5F04-B74C-B997-CFD25C8393FC}" type="presParOf" srcId="{CF664FB0-3BC3-3E43-9959-BF106B1F656D}" destId="{97959964-3604-9942-87BF-78A851B8664B}" srcOrd="1" destOrd="0" presId="urn:microsoft.com/office/officeart/2005/8/layout/hierarchy6"/>
-    <dgm:cxn modelId="{685F4C1C-3BD6-CB45-9EB3-6319DD5CBB5C}" type="presParOf" srcId="{496B1887-49F3-0642-A8A4-7DA9247E8109}" destId="{40A4DB64-0E72-994A-A165-537167CD4950}" srcOrd="12" destOrd="0" presId="urn:microsoft.com/office/officeart/2005/8/layout/hierarchy6"/>
-    <dgm:cxn modelId="{168160C2-EEA7-2B47-AD28-48C47B4F9E1F}" type="presParOf" srcId="{496B1887-49F3-0642-A8A4-7DA9247E8109}" destId="{0E2FD69C-09BA-6F48-906A-25CECF770348}" srcOrd="13" destOrd="0" presId="urn:microsoft.com/office/officeart/2005/8/layout/hierarchy6"/>
+    <dgm:cxn modelId="{685F4C1C-3BD6-CB45-9EB3-6319DD5CBB5C}" type="presParOf" srcId="{496B1887-49F3-0642-A8A4-7DA9247E8109}" destId="{40A4DB64-0E72-994A-A165-537167CD4950}" srcOrd="14" destOrd="0" presId="urn:microsoft.com/office/officeart/2005/8/layout/hierarchy6"/>
+    <dgm:cxn modelId="{168160C2-EEA7-2B47-AD28-48C47B4F9E1F}" type="presParOf" srcId="{496B1887-49F3-0642-A8A4-7DA9247E8109}" destId="{0E2FD69C-09BA-6F48-906A-25CECF770348}" srcOrd="15" destOrd="0" presId="urn:microsoft.com/office/officeart/2005/8/layout/hierarchy6"/>
     <dgm:cxn modelId="{026EF55B-9452-1C41-AE0F-E176C8ECBDB2}" type="presParOf" srcId="{0E2FD69C-09BA-6F48-906A-25CECF770348}" destId="{DBBEE2C4-E54F-D942-993F-82E16E578EB8}" srcOrd="0" destOrd="0" presId="urn:microsoft.com/office/officeart/2005/8/layout/hierarchy6"/>
     <dgm:cxn modelId="{E6F82454-ECF2-9B41-9560-794B6A75CAE3}" type="presParOf" srcId="{0E2FD69C-09BA-6F48-906A-25CECF770348}" destId="{5C330A84-585C-094F-8FB9-4E5F793735D4}" srcOrd="1" destOrd="0" presId="urn:microsoft.com/office/officeart/2005/8/layout/hierarchy6"/>
     <dgm:cxn modelId="{A83B70AC-928A-944B-AA55-94AB493CDFF2}" type="presParOf" srcId="{5C330A84-585C-094F-8FB9-4E5F793735D4}" destId="{93270657-4C4A-F444-B4C6-F927919A2A3B}" srcOrd="0" destOrd="0" presId="urn:microsoft.com/office/officeart/2005/8/layout/hierarchy6"/>
     <dgm:cxn modelId="{606233BC-83D1-C640-B1BA-BCAAE911D87E}" type="presParOf" srcId="{5C330A84-585C-094F-8FB9-4E5F793735D4}" destId="{8A184C93-63A6-A54A-BC2B-CAF9FD35F246}" srcOrd="1" destOrd="0" presId="urn:microsoft.com/office/officeart/2005/8/layout/hierarchy6"/>
     <dgm:cxn modelId="{728D6088-BA3F-D14D-B606-28CA24387A4B}" type="presParOf" srcId="{8A184C93-63A6-A54A-BC2B-CAF9FD35F246}" destId="{946F4C34-E67F-D64A-9C68-A5169F9C4CFB}" srcOrd="0" destOrd="0" presId="urn:microsoft.com/office/officeart/2005/8/layout/hierarchy6"/>
     <dgm:cxn modelId="{FF7F8599-6D57-6F47-AF57-E4BB6B331BFE}" type="presParOf" srcId="{8A184C93-63A6-A54A-BC2B-CAF9FD35F246}" destId="{3570A2D4-C5A4-D44C-95E0-98F55AEC6D64}" srcOrd="1" destOrd="0" presId="urn:microsoft.com/office/officeart/2005/8/layout/hierarchy6"/>
-    <dgm:cxn modelId="{CDB442C4-A701-0B4E-A06D-65E592F15D61}" type="presParOf" srcId="{496B1887-49F3-0642-A8A4-7DA9247E8109}" destId="{09F45D7F-D313-334F-B626-DFE5C47D187E}" srcOrd="14" destOrd="0" presId="urn:microsoft.com/office/officeart/2005/8/layout/hierarchy6"/>
-    <dgm:cxn modelId="{15BC8C6C-EBF1-4743-BEF0-8A3A0F6C8EEC}" type="presParOf" srcId="{496B1887-49F3-0642-A8A4-7DA9247E8109}" destId="{85ECA35D-CDF4-0C48-B0E8-786677EEC6E0}" srcOrd="15" destOrd="0" presId="urn:microsoft.com/office/officeart/2005/8/layout/hierarchy6"/>
+    <dgm:cxn modelId="{CDB442C4-A701-0B4E-A06D-65E592F15D61}" type="presParOf" srcId="{496B1887-49F3-0642-A8A4-7DA9247E8109}" destId="{09F45D7F-D313-334F-B626-DFE5C47D187E}" srcOrd="16" destOrd="0" presId="urn:microsoft.com/office/officeart/2005/8/layout/hierarchy6"/>
+    <dgm:cxn modelId="{15BC8C6C-EBF1-4743-BEF0-8A3A0F6C8EEC}" type="presParOf" srcId="{496B1887-49F3-0642-A8A4-7DA9247E8109}" destId="{85ECA35D-CDF4-0C48-B0E8-786677EEC6E0}" srcOrd="17" destOrd="0" presId="urn:microsoft.com/office/officeart/2005/8/layout/hierarchy6"/>
     <dgm:cxn modelId="{91D21F0A-365F-A944-B28D-79817B89DAF5}" type="presParOf" srcId="{85ECA35D-CDF4-0C48-B0E8-786677EEC6E0}" destId="{7DE98858-2169-3147-8802-4D119636C8CD}" srcOrd="0" destOrd="0" presId="urn:microsoft.com/office/officeart/2005/8/layout/hierarchy6"/>
     <dgm:cxn modelId="{D90A9B0D-FD80-E24D-881D-3BA2BEA137EE}" type="presParOf" srcId="{85ECA35D-CDF4-0C48-B0E8-786677EEC6E0}" destId="{68FE66DC-1448-2A4F-A260-41F4E8523C0D}" srcOrd="1" destOrd="0" presId="urn:microsoft.com/office/officeart/2005/8/layout/hierarchy6"/>
-    <dgm:cxn modelId="{BECB1BEA-E0A4-0140-9072-9464B9D238FB}" type="presParOf" srcId="{496B1887-49F3-0642-A8A4-7DA9247E8109}" destId="{47F226ED-03DC-DB42-8882-368010BF9656}" srcOrd="16" destOrd="0" presId="urn:microsoft.com/office/officeart/2005/8/layout/hierarchy6"/>
-    <dgm:cxn modelId="{EB09655D-0290-7F4E-A480-52BD1DE37285}" type="presParOf" srcId="{496B1887-49F3-0642-A8A4-7DA9247E8109}" destId="{DD7919BE-F1FF-6743-889F-24578570E207}" srcOrd="17" destOrd="0" presId="urn:microsoft.com/office/officeart/2005/8/layout/hierarchy6"/>
+    <dgm:cxn modelId="{BECB1BEA-E0A4-0140-9072-9464B9D238FB}" type="presParOf" srcId="{496B1887-49F3-0642-A8A4-7DA9247E8109}" destId="{47F226ED-03DC-DB42-8882-368010BF9656}" srcOrd="18" destOrd="0" presId="urn:microsoft.com/office/officeart/2005/8/layout/hierarchy6"/>
+    <dgm:cxn modelId="{EB09655D-0290-7F4E-A480-52BD1DE37285}" type="presParOf" srcId="{496B1887-49F3-0642-A8A4-7DA9247E8109}" destId="{DD7919BE-F1FF-6743-889F-24578570E207}" srcOrd="19" destOrd="0" presId="urn:microsoft.com/office/officeart/2005/8/layout/hierarchy6"/>
     <dgm:cxn modelId="{D7C4249C-21A2-F348-8A0D-D5C2F37A2A96}" type="presParOf" srcId="{DD7919BE-F1FF-6743-889F-24578570E207}" destId="{48165126-8B80-4444-99A4-95E3621A03ED}" srcOrd="0" destOrd="0" presId="urn:microsoft.com/office/officeart/2005/8/layout/hierarchy6"/>
     <dgm:cxn modelId="{16B58F8F-8C56-7A4B-BD57-C1E7D6FE3DCE}" type="presParOf" srcId="{DD7919BE-F1FF-6743-889F-24578570E207}" destId="{CB3A31D9-629C-B741-A935-602E61F3A6E6}" srcOrd="1" destOrd="0" presId="urn:microsoft.com/office/officeart/2005/8/layout/hierarchy6"/>
     <dgm:cxn modelId="{B8A26232-A7DF-7F47-9029-D332DE470F7E}" type="presParOf" srcId="{2A965C83-2AD7-904C-B62F-6ADE3507654A}" destId="{5B8AFF63-802F-1B48-B6DB-A94DB037B633}" srcOrd="1" destOrd="0" presId="urn:microsoft.com/office/officeart/2005/8/layout/hierarchy6"/>
@@ -6098,6 +6490,13 @@
     <dgm:pt modelId="{4455E6D1-B414-4143-B9A6-DD5DF3145AA6}" type="pres">
       <dgm:prSet presAssocID="{A5BB2657-7824-4546-BA05-311C751A89AF}" presName="Name19" presStyleLbl="parChTrans1D2" presStyleIdx="0" presStyleCnt="10"/>
       <dgm:spPr/>
+      <dgm:t>
+        <a:bodyPr/>
+        <a:lstStyle/>
+        <a:p>
+          <a:endParaRPr lang="en-US"/>
+        </a:p>
+      </dgm:t>
     </dgm:pt>
     <dgm:pt modelId="{110C0788-C96F-B64D-8F4B-56CB025EF252}" type="pres">
       <dgm:prSet presAssocID="{85B58282-2047-D64A-8D3C-0177FBA629E7}" presName="Name21" presStyleCnt="0"/>
@@ -6151,6 +6550,13 @@
     <dgm:pt modelId="{28C0BCEF-8C4D-C441-A18D-A2A90C5E62B8}" type="pres">
       <dgm:prSet presAssocID="{A6E642B9-0206-C44B-92B6-60B19469A555}" presName="Name19" presStyleLbl="parChTrans1D2" presStyleIdx="2" presStyleCnt="10"/>
       <dgm:spPr/>
+      <dgm:t>
+        <a:bodyPr/>
+        <a:lstStyle/>
+        <a:p>
+          <a:endParaRPr lang="en-US"/>
+        </a:p>
+      </dgm:t>
     </dgm:pt>
     <dgm:pt modelId="{1DBC6128-B377-024F-BF78-F0766C4895A3}" type="pres">
       <dgm:prSet presAssocID="{40298C9A-74E0-9F45-B8D1-115E9EDD36E5}" presName="Name21" presStyleCnt="0"/>
@@ -6174,6 +6580,13 @@
     <dgm:pt modelId="{24A7635E-69A5-7345-A6DD-15E5157702C7}" type="pres">
       <dgm:prSet presAssocID="{5C5AA12C-6A7D-4A46-B053-8DEAC9D0149B}" presName="Name19" presStyleLbl="parChTrans1D2" presStyleIdx="3" presStyleCnt="10"/>
       <dgm:spPr/>
+      <dgm:t>
+        <a:bodyPr/>
+        <a:lstStyle/>
+        <a:p>
+          <a:endParaRPr lang="en-US"/>
+        </a:p>
+      </dgm:t>
     </dgm:pt>
     <dgm:pt modelId="{8B802869-60BC-4F48-81D8-A81197BB62A4}" type="pres">
       <dgm:prSet presAssocID="{F752432E-492A-0740-889F-4C814B52E122}" presName="Name21" presStyleCnt="0"/>
@@ -6197,6 +6610,13 @@
     <dgm:pt modelId="{1060C6C1-CD37-D443-B532-B4D014571D74}" type="pres">
       <dgm:prSet presAssocID="{33AA6D7F-2BF8-894A-9A3D-77138066D9F8}" presName="Name19" presStyleLbl="parChTrans1D2" presStyleIdx="4" presStyleCnt="10"/>
       <dgm:spPr/>
+      <dgm:t>
+        <a:bodyPr/>
+        <a:lstStyle/>
+        <a:p>
+          <a:endParaRPr lang="en-US"/>
+        </a:p>
+      </dgm:t>
     </dgm:pt>
     <dgm:pt modelId="{9BFE90F2-2E72-1243-9412-0374182A12A7}" type="pres">
       <dgm:prSet presAssocID="{A0E23631-C0F1-274F-8AE2-0EA793EECB43}" presName="Name21" presStyleCnt="0"/>
@@ -6220,6 +6640,13 @@
     <dgm:pt modelId="{F8BD218F-7B25-5A4A-8BE9-01A4214DF5D2}" type="pres">
       <dgm:prSet presAssocID="{E2C4CC94-1A78-094E-9F38-E79497B9C646}" presName="Name19" presStyleLbl="parChTrans1D2" presStyleIdx="5" presStyleCnt="10"/>
       <dgm:spPr/>
+      <dgm:t>
+        <a:bodyPr/>
+        <a:lstStyle/>
+        <a:p>
+          <a:endParaRPr lang="en-US"/>
+        </a:p>
+      </dgm:t>
     </dgm:pt>
     <dgm:pt modelId="{A7B57F67-697F-2642-8842-F441884A1DF7}" type="pres">
       <dgm:prSet presAssocID="{A14E8B4C-9500-224C-B944-E661244D68BB}" presName="Name21" presStyleCnt="0"/>
@@ -6243,6 +6670,13 @@
     <dgm:pt modelId="{8FA38270-4537-A24D-9448-8DD2DAB0DA15}" type="pres">
       <dgm:prSet presAssocID="{C2BA346E-6762-A942-9FFE-39CE7703BB95}" presName="Name19" presStyleLbl="parChTrans1D2" presStyleIdx="6" presStyleCnt="10"/>
       <dgm:spPr/>
+      <dgm:t>
+        <a:bodyPr/>
+        <a:lstStyle/>
+        <a:p>
+          <a:endParaRPr lang="en-US"/>
+        </a:p>
+      </dgm:t>
     </dgm:pt>
     <dgm:pt modelId="{B65AEFB5-5DF6-3846-A834-654C85862902}" type="pres">
       <dgm:prSet presAssocID="{45AC7D76-E1EA-BA44-838E-559A646B213C}" presName="Name21" presStyleCnt="0"/>
@@ -6266,6 +6700,13 @@
     <dgm:pt modelId="{21981FF8-CF02-144F-B5D8-A249778E1653}" type="pres">
       <dgm:prSet presAssocID="{23A62137-4B50-0C40-9BBB-A4AF43AA9A7E}" presName="Name19" presStyleLbl="parChTrans1D2" presStyleIdx="7" presStyleCnt="10"/>
       <dgm:spPr/>
+      <dgm:t>
+        <a:bodyPr/>
+        <a:lstStyle/>
+        <a:p>
+          <a:endParaRPr lang="en-US"/>
+        </a:p>
+      </dgm:t>
     </dgm:pt>
     <dgm:pt modelId="{BCD7973C-3535-7F4F-A67A-4D0678E8FF05}" type="pres">
       <dgm:prSet presAssocID="{C9C00478-EB68-5740-9CCF-DD9618F29045}" presName="Name21" presStyleCnt="0"/>
@@ -6289,6 +6730,13 @@
     <dgm:pt modelId="{61D1B974-503F-EF47-847D-DEEDC62D4803}" type="pres">
       <dgm:prSet presAssocID="{C8A98717-E912-9E4A-A68B-5E87CE6E589D}" presName="Name19" presStyleLbl="parChTrans1D2" presStyleIdx="8" presStyleCnt="10"/>
       <dgm:spPr/>
+      <dgm:t>
+        <a:bodyPr/>
+        <a:lstStyle/>
+        <a:p>
+          <a:endParaRPr lang="en-US"/>
+        </a:p>
+      </dgm:t>
     </dgm:pt>
     <dgm:pt modelId="{BD0E43DF-D661-4E41-A48C-2317868C1CF2}" type="pres">
       <dgm:prSet presAssocID="{B7C12D67-B9BA-1047-972D-6F61CC863E9E}" presName="Name21" presStyleCnt="0"/>
@@ -6312,6 +6760,13 @@
     <dgm:pt modelId="{8F177FDB-2440-9246-B0A1-E538F6E95B6D}" type="pres">
       <dgm:prSet presAssocID="{1791B55A-09B5-3C4F-BC61-E69E17D2AC26}" presName="Name19" presStyleLbl="parChTrans1D2" presStyleIdx="9" presStyleCnt="10"/>
       <dgm:spPr/>
+      <dgm:t>
+        <a:bodyPr/>
+        <a:lstStyle/>
+        <a:p>
+          <a:endParaRPr lang="en-US"/>
+        </a:p>
+      </dgm:t>
     </dgm:pt>
     <dgm:pt modelId="{C6F1B751-57FF-774A-B91A-89F4CD3AF5BC}" type="pres">
       <dgm:prSet presAssocID="{632E20CD-D1D0-D347-B6A5-FD571A9F64C7}" presName="Name21" presStyleCnt="0"/>
@@ -9460,8 +9915,8 @@
       </dsp:nvSpPr>
       <dsp:spPr>
         <a:xfrm>
-          <a:off x="3426881" y="779319"/>
-          <a:ext cx="405200" cy="270133"/>
+          <a:off x="3438089" y="0"/>
+          <a:ext cx="341154" cy="227436"/>
         </a:xfrm>
         <a:prstGeom prst="roundRect">
           <a:avLst>
@@ -9560,8 +10015,8 @@
         </a:p>
       </dsp:txBody>
       <dsp:txXfrm>
-        <a:off x="3426881" y="779319"/>
-        <a:ext cx="405200" cy="270133"/>
+        <a:off x="3438089" y="0"/>
+        <a:ext cx="341154" cy="227436"/>
       </dsp:txXfrm>
     </dsp:sp>
     <dsp:sp modelId="{0D82A4BC-6151-444A-AE4C-BAAE071D7942}">
@@ -9571,8 +10026,8 @@
       </dsp:nvSpPr>
       <dsp:spPr>
         <a:xfrm>
-          <a:off x="468916" y="1049452"/>
-          <a:ext cx="3160565" cy="108053"/>
+          <a:off x="393288" y="181716"/>
+          <a:ext cx="3215378" cy="91440"/>
         </a:xfrm>
         <a:custGeom>
           <a:avLst/>
@@ -9583,16 +10038,16 @@
           <a:pathLst>
             <a:path>
               <a:moveTo>
-                <a:pt x="3160565" y="0"/>
+                <a:pt x="3215378" y="45720"/>
               </a:moveTo>
               <a:lnTo>
-                <a:pt x="3160565" y="54026"/>
+                <a:pt x="3215378" y="91207"/>
               </a:lnTo>
               <a:lnTo>
-                <a:pt x="0" y="54026"/>
+                <a:pt x="0" y="91207"/>
               </a:lnTo>
               <a:lnTo>
-                <a:pt x="0" y="108053"/>
+                <a:pt x="0" y="136694"/>
               </a:lnTo>
             </a:path>
           </a:pathLst>
@@ -9632,8 +10087,8 @@
       </dsp:nvSpPr>
       <dsp:spPr>
         <a:xfrm>
-          <a:off x="266315" y="1157506"/>
-          <a:ext cx="405200" cy="270133"/>
+          <a:off x="222710" y="318410"/>
+          <a:ext cx="341154" cy="227436"/>
         </a:xfrm>
         <a:prstGeom prst="roundRect">
           <a:avLst>
@@ -9732,8 +10187,8 @@
         </a:p>
       </dsp:txBody>
       <dsp:txXfrm>
-        <a:off x="266315" y="1157506"/>
-        <a:ext cx="405200" cy="270133"/>
+        <a:off x="222710" y="318410"/>
+        <a:ext cx="341154" cy="227436"/>
       </dsp:txXfrm>
     </dsp:sp>
     <dsp:sp modelId="{8316F2DF-DD2A-8E48-946E-48A76CDB1EFF}">
@@ -9743,8 +10198,8 @@
       </dsp:nvSpPr>
       <dsp:spPr>
         <a:xfrm>
-          <a:off x="205535" y="1427640"/>
-          <a:ext cx="263380" cy="108053"/>
+          <a:off x="171537" y="500126"/>
+          <a:ext cx="221750" cy="91440"/>
         </a:xfrm>
         <a:custGeom>
           <a:avLst/>
@@ -9755,16 +10210,16 @@
           <a:pathLst>
             <a:path>
               <a:moveTo>
-                <a:pt x="263380" y="0"/>
+                <a:pt x="221750" y="45720"/>
               </a:moveTo>
               <a:lnTo>
-                <a:pt x="263380" y="54026"/>
+                <a:pt x="221750" y="91207"/>
               </a:lnTo>
               <a:lnTo>
-                <a:pt x="0" y="54026"/>
+                <a:pt x="0" y="91207"/>
               </a:lnTo>
               <a:lnTo>
-                <a:pt x="0" y="108053"/>
+                <a:pt x="0" y="136694"/>
               </a:lnTo>
             </a:path>
           </a:pathLst>
@@ -9804,8 +10259,8 @@
       </dsp:nvSpPr>
       <dsp:spPr>
         <a:xfrm>
-          <a:off x="2935" y="1535693"/>
-          <a:ext cx="405200" cy="270133"/>
+          <a:off x="960" y="636821"/>
+          <a:ext cx="341154" cy="227436"/>
         </a:xfrm>
         <a:prstGeom prst="roundRect">
           <a:avLst>
@@ -9904,8 +10359,8 @@
         </a:p>
       </dsp:txBody>
       <dsp:txXfrm>
-        <a:off x="2935" y="1535693"/>
-        <a:ext cx="405200" cy="270133"/>
+        <a:off x="960" y="636821"/>
+        <a:ext cx="341154" cy="227436"/>
       </dsp:txXfrm>
     </dsp:sp>
     <dsp:sp modelId="{CD007CCC-3B62-6C49-ADE7-5083587358A7}">
@@ -9915,8 +10370,8 @@
       </dsp:nvSpPr>
       <dsp:spPr>
         <a:xfrm>
-          <a:off x="468916" y="1427640"/>
-          <a:ext cx="263380" cy="108053"/>
+          <a:off x="393288" y="500126"/>
+          <a:ext cx="221750" cy="91440"/>
         </a:xfrm>
         <a:custGeom>
           <a:avLst/>
@@ -9927,16 +10382,16 @@
           <a:pathLst>
             <a:path>
               <a:moveTo>
-                <a:pt x="0" y="0"/>
+                <a:pt x="0" y="45720"/>
               </a:moveTo>
               <a:lnTo>
-                <a:pt x="0" y="54026"/>
+                <a:pt x="0" y="91207"/>
               </a:lnTo>
               <a:lnTo>
-                <a:pt x="263380" y="54026"/>
+                <a:pt x="221750" y="91207"/>
               </a:lnTo>
               <a:lnTo>
-                <a:pt x="263380" y="108053"/>
+                <a:pt x="221750" y="136694"/>
               </a:lnTo>
             </a:path>
           </a:pathLst>
@@ -9976,8 +10431,8 @@
       </dsp:nvSpPr>
       <dsp:spPr>
         <a:xfrm>
-          <a:off x="529696" y="1535693"/>
-          <a:ext cx="405200" cy="270133"/>
+          <a:off x="444461" y="636821"/>
+          <a:ext cx="341154" cy="227436"/>
         </a:xfrm>
         <a:prstGeom prst="roundRect">
           <a:avLst>
@@ -10076,8 +10531,8 @@
         </a:p>
       </dsp:txBody>
       <dsp:txXfrm>
-        <a:off x="529696" y="1535693"/>
-        <a:ext cx="405200" cy="270133"/>
+        <a:off x="444461" y="636821"/>
+        <a:ext cx="341154" cy="227436"/>
       </dsp:txXfrm>
     </dsp:sp>
     <dsp:sp modelId="{D9DBFFB4-8C94-E940-A3D9-A7AA44617C3E}">
@@ -10087,8 +10542,8 @@
       </dsp:nvSpPr>
       <dsp:spPr>
         <a:xfrm>
-          <a:off x="995677" y="1049452"/>
-          <a:ext cx="2633804" cy="108053"/>
+          <a:off x="836788" y="181716"/>
+          <a:ext cx="2771878" cy="91440"/>
         </a:xfrm>
         <a:custGeom>
           <a:avLst/>
@@ -10099,16 +10554,16 @@
           <a:pathLst>
             <a:path>
               <a:moveTo>
-                <a:pt x="2633804" y="0"/>
+                <a:pt x="2771878" y="45720"/>
               </a:moveTo>
               <a:lnTo>
-                <a:pt x="2633804" y="54026"/>
+                <a:pt x="2771878" y="91207"/>
               </a:lnTo>
               <a:lnTo>
-                <a:pt x="0" y="54026"/>
+                <a:pt x="0" y="91207"/>
               </a:lnTo>
               <a:lnTo>
-                <a:pt x="0" y="108053"/>
+                <a:pt x="0" y="136694"/>
               </a:lnTo>
             </a:path>
           </a:pathLst>
@@ -10148,8 +10603,8 @@
       </dsp:nvSpPr>
       <dsp:spPr>
         <a:xfrm>
-          <a:off x="793076" y="1157506"/>
-          <a:ext cx="405200" cy="270133"/>
+          <a:off x="666211" y="318410"/>
+          <a:ext cx="341154" cy="227436"/>
         </a:xfrm>
         <a:prstGeom prst="roundRect">
           <a:avLst>
@@ -10248,8 +10703,8 @@
         </a:p>
       </dsp:txBody>
       <dsp:txXfrm>
-        <a:off x="793076" y="1157506"/>
-        <a:ext cx="405200" cy="270133"/>
+        <a:off x="666211" y="318410"/>
+        <a:ext cx="341154" cy="227436"/>
       </dsp:txXfrm>
     </dsp:sp>
     <dsp:sp modelId="{9CC7233D-5EBE-434D-918B-6C3475B044D5}">
@@ -10259,8 +10714,8 @@
       </dsp:nvSpPr>
       <dsp:spPr>
         <a:xfrm>
-          <a:off x="1522438" y="1049452"/>
-          <a:ext cx="2107043" cy="108053"/>
+          <a:off x="1280289" y="181716"/>
+          <a:ext cx="2328377" cy="91440"/>
         </a:xfrm>
         <a:custGeom>
           <a:avLst/>
@@ -10271,16 +10726,16 @@
           <a:pathLst>
             <a:path>
               <a:moveTo>
-                <a:pt x="2107043" y="0"/>
+                <a:pt x="2328377" y="45720"/>
               </a:moveTo>
               <a:lnTo>
-                <a:pt x="2107043" y="54026"/>
+                <a:pt x="2328377" y="91207"/>
               </a:lnTo>
               <a:lnTo>
-                <a:pt x="0" y="54026"/>
+                <a:pt x="0" y="91207"/>
               </a:lnTo>
               <a:lnTo>
-                <a:pt x="0" y="108053"/>
+                <a:pt x="0" y="136694"/>
               </a:lnTo>
             </a:path>
           </a:pathLst>
@@ -10320,8 +10775,8 @@
       </dsp:nvSpPr>
       <dsp:spPr>
         <a:xfrm>
-          <a:off x="1319837" y="1157506"/>
-          <a:ext cx="405200" cy="270133"/>
+          <a:off x="1109711" y="318410"/>
+          <a:ext cx="341154" cy="227436"/>
         </a:xfrm>
         <a:prstGeom prst="roundRect">
           <a:avLst>
@@ -10420,8 +10875,8 @@
         </a:p>
       </dsp:txBody>
       <dsp:txXfrm>
-        <a:off x="1319837" y="1157506"/>
-        <a:ext cx="405200" cy="270133"/>
+        <a:off x="1109711" y="318410"/>
+        <a:ext cx="341154" cy="227436"/>
       </dsp:txXfrm>
     </dsp:sp>
     <dsp:sp modelId="{0B36DFB8-E481-9846-9713-FD9BC35589F9}">
@@ -10431,8 +10886,8 @@
       </dsp:nvSpPr>
       <dsp:spPr>
         <a:xfrm>
-          <a:off x="1476718" y="1427640"/>
-          <a:ext cx="91440" cy="108053"/>
+          <a:off x="1723789" y="181716"/>
+          <a:ext cx="1884877" cy="91440"/>
         </a:xfrm>
         <a:custGeom>
           <a:avLst/>
@@ -10443,10 +10898,16 @@
           <a:pathLst>
             <a:path>
               <a:moveTo>
-                <a:pt x="45720" y="0"/>
+                <a:pt x="1884877" y="45720"/>
               </a:moveTo>
               <a:lnTo>
-                <a:pt x="45720" y="108053"/>
+                <a:pt x="1884877" y="91207"/>
+              </a:lnTo>
+              <a:lnTo>
+                <a:pt x="0" y="91207"/>
+              </a:lnTo>
+              <a:lnTo>
+                <a:pt x="0" y="136694"/>
               </a:lnTo>
             </a:path>
           </a:pathLst>
@@ -10455,7 +10916,7 @@
         <a:ln w="25400" cap="flat" cmpd="sng" algn="ctr">
           <a:solidFill>
             <a:schemeClr val="dk1">
-              <a:shade val="80000"/>
+              <a:shade val="60000"/>
               <a:hueOff val="0"/>
               <a:satOff val="0"/>
               <a:lumOff val="0"/>
@@ -10486,8 +10947,8 @@
       </dsp:nvSpPr>
       <dsp:spPr>
         <a:xfrm>
-          <a:off x="1319837" y="1535693"/>
-          <a:ext cx="405200" cy="270133"/>
+          <a:off x="1553212" y="318410"/>
+          <a:ext cx="341154" cy="227436"/>
         </a:xfrm>
         <a:prstGeom prst="roundRect">
           <a:avLst>
@@ -10580,25 +11041,25 @@
           </a:pPr>
           <a:r>
             <a:rPr lang="en-US" sz="500" kern="1200" dirty="0" smtClean="0"/>
-            <a:t>Forgot your password?</a:t>
+            <a:t>Password reset</a:t>
           </a:r>
           <a:endParaRPr lang="en-US" sz="500" kern="1200" dirty="0"/>
         </a:p>
       </dsp:txBody>
       <dsp:txXfrm>
-        <a:off x="1319837" y="1535693"/>
-        <a:ext cx="405200" cy="270133"/>
+        <a:off x="1553212" y="318410"/>
+        <a:ext cx="341154" cy="227436"/>
       </dsp:txXfrm>
     </dsp:sp>
-    <dsp:sp modelId="{B3E752D9-0DAF-4643-8967-E6BACF17435F}">
+    <dsp:sp modelId="{0FBD2D58-EF12-A64D-87FA-CFDF18228DF6}">
       <dsp:nvSpPr>
         <dsp:cNvPr id="0" name=""/>
         <dsp:cNvSpPr/>
       </dsp:nvSpPr>
       <dsp:spPr>
         <a:xfrm>
-          <a:off x="2049198" y="1049452"/>
-          <a:ext cx="1580282" cy="108053"/>
+          <a:off x="1058538" y="500126"/>
+          <a:ext cx="665250" cy="91440"/>
         </a:xfrm>
         <a:custGeom>
           <a:avLst/>
@@ -10609,16 +11070,16 @@
           <a:pathLst>
             <a:path>
               <a:moveTo>
-                <a:pt x="1580282" y="0"/>
+                <a:pt x="665250" y="45720"/>
               </a:moveTo>
               <a:lnTo>
-                <a:pt x="1580282" y="54026"/>
+                <a:pt x="665250" y="91207"/>
               </a:lnTo>
               <a:lnTo>
-                <a:pt x="0" y="54026"/>
+                <a:pt x="0" y="91207"/>
               </a:lnTo>
               <a:lnTo>
-                <a:pt x="0" y="108053"/>
+                <a:pt x="0" y="136694"/>
               </a:lnTo>
             </a:path>
           </a:pathLst>
@@ -10627,7 +11088,7 @@
         <a:ln w="25400" cap="flat" cmpd="sng" algn="ctr">
           <a:solidFill>
             <a:schemeClr val="dk1">
-              <a:shade val="60000"/>
+              <a:shade val="80000"/>
               <a:hueOff val="0"/>
               <a:satOff val="0"/>
               <a:lumOff val="0"/>
@@ -10651,15 +11112,15 @@
         <a:fontRef idx="minor"/>
       </dsp:style>
     </dsp:sp>
-    <dsp:sp modelId="{B9972A86-A3F6-6A47-B03A-39E4AB3F09BA}">
+    <dsp:sp modelId="{B61B0D98-773A-8A4F-9F5C-8FBDD5C64421}">
       <dsp:nvSpPr>
         <dsp:cNvPr id="0" name=""/>
         <dsp:cNvSpPr/>
       </dsp:nvSpPr>
       <dsp:spPr>
         <a:xfrm>
-          <a:off x="1846598" y="1157506"/>
-          <a:ext cx="405200" cy="270133"/>
+          <a:off x="887961" y="636821"/>
+          <a:ext cx="341154" cy="227436"/>
         </a:xfrm>
         <a:prstGeom prst="roundRect">
           <a:avLst>
@@ -10752,25 +11213,25 @@
           </a:pPr>
           <a:r>
             <a:rPr lang="en-US" sz="500" kern="1200" dirty="0" smtClean="0"/>
-            <a:t>Logout</a:t>
+            <a:t>Request new password</a:t>
           </a:r>
           <a:endParaRPr lang="en-US" sz="500" kern="1200" dirty="0"/>
         </a:p>
       </dsp:txBody>
       <dsp:txXfrm>
-        <a:off x="1846598" y="1157506"/>
-        <a:ext cx="405200" cy="270133"/>
+        <a:off x="887961" y="636821"/>
+        <a:ext cx="341154" cy="227436"/>
       </dsp:txXfrm>
     </dsp:sp>
-    <dsp:sp modelId="{80B1EB63-517B-3F41-96A4-C449E7CE44F1}">
+    <dsp:sp modelId="{03358BE9-0182-7E4E-A763-7930CEF1BE29}">
       <dsp:nvSpPr>
         <dsp:cNvPr id="0" name=""/>
         <dsp:cNvSpPr/>
       </dsp:nvSpPr>
       <dsp:spPr>
         <a:xfrm>
-          <a:off x="2839340" y="1049452"/>
-          <a:ext cx="790141" cy="108053"/>
+          <a:off x="1502039" y="500126"/>
+          <a:ext cx="221750" cy="91440"/>
         </a:xfrm>
         <a:custGeom>
           <a:avLst/>
@@ -10781,16 +11242,16 @@
           <a:pathLst>
             <a:path>
               <a:moveTo>
-                <a:pt x="790141" y="0"/>
+                <a:pt x="221750" y="45720"/>
               </a:moveTo>
               <a:lnTo>
-                <a:pt x="790141" y="54026"/>
+                <a:pt x="221750" y="91207"/>
               </a:lnTo>
               <a:lnTo>
-                <a:pt x="0" y="54026"/>
+                <a:pt x="0" y="91207"/>
               </a:lnTo>
               <a:lnTo>
-                <a:pt x="0" y="108053"/>
+                <a:pt x="0" y="136694"/>
               </a:lnTo>
             </a:path>
           </a:pathLst>
@@ -10799,7 +11260,7 @@
         <a:ln w="25400" cap="flat" cmpd="sng" algn="ctr">
           <a:solidFill>
             <a:schemeClr val="dk1">
-              <a:shade val="60000"/>
+              <a:shade val="80000"/>
               <a:hueOff val="0"/>
               <a:satOff val="0"/>
               <a:lumOff val="0"/>
@@ -10823,15 +11284,15 @@
         <a:fontRef idx="minor"/>
       </dsp:style>
     </dsp:sp>
-    <dsp:sp modelId="{20AF6D03-8BA3-6D4D-91D6-6BB621334EE0}">
+    <dsp:sp modelId="{73AE1126-45AE-7D4B-AEAB-0A1BD05E96C6}">
       <dsp:nvSpPr>
         <dsp:cNvPr id="0" name=""/>
         <dsp:cNvSpPr/>
       </dsp:nvSpPr>
       <dsp:spPr>
         <a:xfrm>
-          <a:off x="2636740" y="1157506"/>
-          <a:ext cx="405200" cy="270133"/>
+          <a:off x="1331462" y="636821"/>
+          <a:ext cx="341154" cy="227436"/>
         </a:xfrm>
         <a:prstGeom prst="roundRect">
           <a:avLst>
@@ -10924,25 +11385,25 @@
           </a:pPr>
           <a:r>
             <a:rPr lang="en-US" sz="500" kern="1200" dirty="0" smtClean="0"/>
-            <a:t>My account</a:t>
+            <a:t>New password requested</a:t>
           </a:r>
-          <a:endParaRPr lang="en-US" sz="500" kern="1200" dirty="0" smtClean="0"/>
+          <a:endParaRPr lang="en-US" sz="500" kern="1200" dirty="0"/>
         </a:p>
       </dsp:txBody>
       <dsp:txXfrm>
-        <a:off x="2636740" y="1157506"/>
-        <a:ext cx="405200" cy="270133"/>
+        <a:off x="1331462" y="636821"/>
+        <a:ext cx="341154" cy="227436"/>
       </dsp:txXfrm>
     </dsp:sp>
-    <dsp:sp modelId="{ADA2498B-E8FE-E24A-80A0-32101A6C19E4}">
+    <dsp:sp modelId="{D2DB1DBF-8571-DA41-83F6-BBA6615036F3}">
       <dsp:nvSpPr>
         <dsp:cNvPr id="0" name=""/>
         <dsp:cNvSpPr/>
       </dsp:nvSpPr>
       <dsp:spPr>
         <a:xfrm>
-          <a:off x="2049198" y="1427640"/>
-          <a:ext cx="790141" cy="108053"/>
+          <a:off x="1723789" y="500126"/>
+          <a:ext cx="221750" cy="91440"/>
         </a:xfrm>
         <a:custGeom>
           <a:avLst/>
@@ -10953,16 +11414,16 @@
           <a:pathLst>
             <a:path>
               <a:moveTo>
-                <a:pt x="790141" y="0"/>
+                <a:pt x="0" y="45720"/>
               </a:moveTo>
               <a:lnTo>
-                <a:pt x="790141" y="54026"/>
+                <a:pt x="0" y="91207"/>
               </a:lnTo>
               <a:lnTo>
-                <a:pt x="0" y="54026"/>
+                <a:pt x="221750" y="91207"/>
               </a:lnTo>
               <a:lnTo>
-                <a:pt x="0" y="108053"/>
+                <a:pt x="221750" y="136694"/>
               </a:lnTo>
             </a:path>
           </a:pathLst>
@@ -10995,15 +11456,15 @@
         <a:fontRef idx="minor"/>
       </dsp:style>
     </dsp:sp>
-    <dsp:sp modelId="{60EB5E65-BE5E-A245-8575-5652AC14C400}">
+    <dsp:sp modelId="{EE67847A-DFFD-9745-98B7-329C5757B5C4}">
       <dsp:nvSpPr>
         <dsp:cNvPr id="0" name=""/>
         <dsp:cNvSpPr/>
       </dsp:nvSpPr>
       <dsp:spPr>
         <a:xfrm>
-          <a:off x="1846598" y="1535693"/>
-          <a:ext cx="405200" cy="270133"/>
+          <a:off x="1774962" y="636821"/>
+          <a:ext cx="341154" cy="227436"/>
         </a:xfrm>
         <a:prstGeom prst="roundRect">
           <a:avLst>
@@ -11096,25 +11557,25 @@
           </a:pPr>
           <a:r>
             <a:rPr lang="en-US" sz="500" kern="1200" dirty="0" smtClean="0"/>
-            <a:t>Account details</a:t>
+            <a:t>New password</a:t>
           </a:r>
-          <a:endParaRPr lang="en-US" sz="500" kern="1200" dirty="0" smtClean="0"/>
+          <a:endParaRPr lang="en-US" sz="500" kern="1200" dirty="0"/>
         </a:p>
       </dsp:txBody>
       <dsp:txXfrm>
-        <a:off x="1846598" y="1535693"/>
-        <a:ext cx="405200" cy="270133"/>
+        <a:off x="1774962" y="636821"/>
+        <a:ext cx="341154" cy="227436"/>
       </dsp:txXfrm>
     </dsp:sp>
-    <dsp:sp modelId="{DFC1035A-BB9E-D54B-9D3B-A59CC7894DEC}">
+    <dsp:sp modelId="{CD1DBAD6-C94F-5C43-8507-9B507D8DA318}">
       <dsp:nvSpPr>
         <dsp:cNvPr id="0" name=""/>
         <dsp:cNvSpPr/>
       </dsp:nvSpPr>
       <dsp:spPr>
         <a:xfrm>
-          <a:off x="2575959" y="1427640"/>
-          <a:ext cx="263380" cy="108053"/>
+          <a:off x="1723789" y="500126"/>
+          <a:ext cx="665250" cy="91440"/>
         </a:xfrm>
         <a:custGeom>
           <a:avLst/>
@@ -11125,16 +11586,16 @@
           <a:pathLst>
             <a:path>
               <a:moveTo>
-                <a:pt x="263380" y="0"/>
+                <a:pt x="0" y="45720"/>
               </a:moveTo>
               <a:lnTo>
-                <a:pt x="263380" y="54026"/>
+                <a:pt x="0" y="91207"/>
               </a:lnTo>
               <a:lnTo>
-                <a:pt x="0" y="54026"/>
+                <a:pt x="665250" y="91207"/>
               </a:lnTo>
               <a:lnTo>
-                <a:pt x="0" y="108053"/>
+                <a:pt x="665250" y="136694"/>
               </a:lnTo>
             </a:path>
           </a:pathLst>
@@ -11167,15 +11628,15 @@
         <a:fontRef idx="minor"/>
       </dsp:style>
     </dsp:sp>
-    <dsp:sp modelId="{791F7BEF-D996-8F40-947C-A8E13C456870}">
+    <dsp:sp modelId="{AC7565D8-1DCE-B548-989A-B43E0C1DF906}">
       <dsp:nvSpPr>
         <dsp:cNvPr id="0" name=""/>
         <dsp:cNvSpPr/>
       </dsp:nvSpPr>
       <dsp:spPr>
         <a:xfrm>
-          <a:off x="2373359" y="1535693"/>
-          <a:ext cx="405200" cy="270133"/>
+          <a:off x="2218463" y="636821"/>
+          <a:ext cx="341154" cy="227436"/>
         </a:xfrm>
         <a:prstGeom prst="roundRect">
           <a:avLst>
@@ -11268,25 +11729,25 @@
           </a:pPr>
           <a:r>
             <a:rPr lang="en-US" sz="500" kern="1200" dirty="0" smtClean="0"/>
-            <a:t>Change password</a:t>
+            <a:t>New password set</a:t>
           </a:r>
-          <a:endParaRPr lang="en-US" sz="500" kern="1200" dirty="0" smtClean="0"/>
+          <a:endParaRPr lang="en-US" sz="500" kern="1200" dirty="0"/>
         </a:p>
       </dsp:txBody>
       <dsp:txXfrm>
-        <a:off x="2373359" y="1535693"/>
-        <a:ext cx="405200" cy="270133"/>
+        <a:off x="2218463" y="636821"/>
+        <a:ext cx="341154" cy="227436"/>
       </dsp:txXfrm>
     </dsp:sp>
-    <dsp:sp modelId="{BAAAE675-372E-C64C-9DFC-2334B74F5B6F}">
+    <dsp:sp modelId="{B3E752D9-0DAF-4643-8967-E6BACF17435F}">
       <dsp:nvSpPr>
         <dsp:cNvPr id="0" name=""/>
         <dsp:cNvSpPr/>
       </dsp:nvSpPr>
       <dsp:spPr>
         <a:xfrm>
-          <a:off x="2839340" y="1427640"/>
-          <a:ext cx="263380" cy="108053"/>
+          <a:off x="2167290" y="181716"/>
+          <a:ext cx="1441376" cy="91440"/>
         </a:xfrm>
         <a:custGeom>
           <a:avLst/>
@@ -11297,16 +11758,16 @@
           <a:pathLst>
             <a:path>
               <a:moveTo>
-                <a:pt x="0" y="0"/>
+                <a:pt x="1441376" y="45720"/>
               </a:moveTo>
               <a:lnTo>
-                <a:pt x="0" y="54026"/>
+                <a:pt x="1441376" y="91207"/>
               </a:lnTo>
               <a:lnTo>
-                <a:pt x="263380" y="54026"/>
+                <a:pt x="0" y="91207"/>
               </a:lnTo>
               <a:lnTo>
-                <a:pt x="263380" y="108053"/>
+                <a:pt x="0" y="136694"/>
               </a:lnTo>
             </a:path>
           </a:pathLst>
@@ -11315,7 +11776,7 @@
         <a:ln w="25400" cap="flat" cmpd="sng" algn="ctr">
           <a:solidFill>
             <a:schemeClr val="dk1">
-              <a:shade val="80000"/>
+              <a:shade val="60000"/>
               <a:hueOff val="0"/>
               <a:satOff val="0"/>
               <a:lumOff val="0"/>
@@ -11339,15 +11800,15 @@
         <a:fontRef idx="minor"/>
       </dsp:style>
     </dsp:sp>
-    <dsp:sp modelId="{40CEBFD4-83C3-5846-8D33-3AB5A5D95710}">
+    <dsp:sp modelId="{B9972A86-A3F6-6A47-B03A-39E4AB3F09BA}">
       <dsp:nvSpPr>
         <dsp:cNvPr id="0" name=""/>
         <dsp:cNvSpPr/>
       </dsp:nvSpPr>
       <dsp:spPr>
         <a:xfrm>
-          <a:off x="2900120" y="1535693"/>
-          <a:ext cx="405200" cy="270133"/>
+          <a:off x="1996712" y="318410"/>
+          <a:ext cx="341154" cy="227436"/>
         </a:xfrm>
         <a:prstGeom prst="roundRect">
           <a:avLst>
@@ -11440,25 +11901,25 @@
           </a:pPr>
           <a:r>
             <a:rPr lang="en-US" sz="500" kern="1200" dirty="0" smtClean="0"/>
-            <a:t>Address book</a:t>
+            <a:t>Logout</a:t>
           </a:r>
-          <a:endParaRPr lang="en-US" sz="500" kern="1200" dirty="0" smtClean="0"/>
+          <a:endParaRPr lang="en-US" sz="500" kern="1200" dirty="0"/>
         </a:p>
       </dsp:txBody>
       <dsp:txXfrm>
-        <a:off x="2900120" y="1535693"/>
-        <a:ext cx="405200" cy="270133"/>
+        <a:off x="1996712" y="318410"/>
+        <a:ext cx="341154" cy="227436"/>
       </dsp:txXfrm>
     </dsp:sp>
-    <dsp:sp modelId="{4ED9CBD7-1C8C-C54E-9E04-D4219E6BDA6C}">
+    <dsp:sp modelId="{80B1EB63-517B-3F41-96A4-C449E7CE44F1}">
       <dsp:nvSpPr>
         <dsp:cNvPr id="0" name=""/>
         <dsp:cNvSpPr/>
       </dsp:nvSpPr>
       <dsp:spPr>
         <a:xfrm>
-          <a:off x="2575959" y="1805827"/>
-          <a:ext cx="526760" cy="108053"/>
+          <a:off x="3497791" y="181716"/>
+          <a:ext cx="110875" cy="91440"/>
         </a:xfrm>
         <a:custGeom>
           <a:avLst/>
@@ -11469,16 +11930,16 @@
           <a:pathLst>
             <a:path>
               <a:moveTo>
-                <a:pt x="526760" y="0"/>
+                <a:pt x="110875" y="45720"/>
               </a:moveTo>
               <a:lnTo>
-                <a:pt x="526760" y="54026"/>
+                <a:pt x="110875" y="91207"/>
               </a:lnTo>
               <a:lnTo>
-                <a:pt x="0" y="54026"/>
+                <a:pt x="0" y="91207"/>
               </a:lnTo>
               <a:lnTo>
-                <a:pt x="0" y="108053"/>
+                <a:pt x="0" y="136694"/>
               </a:lnTo>
             </a:path>
           </a:pathLst>
@@ -11487,7 +11948,7 @@
         <a:ln w="25400" cap="flat" cmpd="sng" algn="ctr">
           <a:solidFill>
             <a:schemeClr val="dk1">
-              <a:shade val="80000"/>
+              <a:shade val="60000"/>
               <a:hueOff val="0"/>
               <a:satOff val="0"/>
               <a:lumOff val="0"/>
@@ -11511,15 +11972,15 @@
         <a:fontRef idx="minor"/>
       </dsp:style>
     </dsp:sp>
-    <dsp:sp modelId="{1D2E00EC-E833-6047-B478-2DBE7E168AFF}">
+    <dsp:sp modelId="{20AF6D03-8BA3-6D4D-91D6-6BB621334EE0}">
       <dsp:nvSpPr>
         <dsp:cNvPr id="0" name=""/>
         <dsp:cNvSpPr/>
       </dsp:nvSpPr>
       <dsp:spPr>
         <a:xfrm>
-          <a:off x="2373359" y="1913881"/>
-          <a:ext cx="405200" cy="270133"/>
+          <a:off x="3327214" y="318410"/>
+          <a:ext cx="341154" cy="227436"/>
         </a:xfrm>
         <a:prstGeom prst="roundRect">
           <a:avLst>
@@ -11612,25 +12073,24 @@
           </a:pPr>
           <a:r>
             <a:rPr lang="en-US" sz="500" kern="1200" dirty="0" smtClean="0"/>
-            <a:t>New address</a:t>
+            <a:t>My account</a:t>
           </a:r>
-          <a:endParaRPr lang="en-US" sz="500" kern="1200" dirty="0" smtClean="0"/>
         </a:p>
       </dsp:txBody>
       <dsp:txXfrm>
-        <a:off x="2373359" y="1913881"/>
-        <a:ext cx="405200" cy="270133"/>
+        <a:off x="3327214" y="318410"/>
+        <a:ext cx="341154" cy="227436"/>
       </dsp:txXfrm>
     </dsp:sp>
-    <dsp:sp modelId="{A6050186-D63E-864F-A7FB-933DDE98E4D9}">
+    <dsp:sp modelId="{ADA2498B-E8FE-E24A-80A0-32101A6C19E4}">
       <dsp:nvSpPr>
         <dsp:cNvPr id="0" name=""/>
         <dsp:cNvSpPr/>
       </dsp:nvSpPr>
       <dsp:spPr>
         <a:xfrm>
-          <a:off x="3057000" y="1805827"/>
-          <a:ext cx="91440" cy="108053"/>
+          <a:off x="2832540" y="500126"/>
+          <a:ext cx="665250" cy="91440"/>
         </a:xfrm>
         <a:custGeom>
           <a:avLst/>
@@ -11641,10 +12101,16 @@
           <a:pathLst>
             <a:path>
               <a:moveTo>
-                <a:pt x="45720" y="0"/>
+                <a:pt x="665250" y="45720"/>
               </a:moveTo>
               <a:lnTo>
-                <a:pt x="45720" y="108053"/>
+                <a:pt x="665250" y="91207"/>
+              </a:lnTo>
+              <a:lnTo>
+                <a:pt x="0" y="91207"/>
+              </a:lnTo>
+              <a:lnTo>
+                <a:pt x="0" y="136694"/>
               </a:lnTo>
             </a:path>
           </a:pathLst>
@@ -11677,15 +12143,15 @@
         <a:fontRef idx="minor"/>
       </dsp:style>
     </dsp:sp>
-    <dsp:sp modelId="{08861A9B-CF27-C342-8B8F-36348C18EC0B}">
+    <dsp:sp modelId="{60EB5E65-BE5E-A245-8575-5652AC14C400}">
       <dsp:nvSpPr>
         <dsp:cNvPr id="0" name=""/>
         <dsp:cNvSpPr/>
       </dsp:nvSpPr>
       <dsp:spPr>
         <a:xfrm>
-          <a:off x="2900120" y="1913881"/>
-          <a:ext cx="405200" cy="270133"/>
+          <a:off x="2661963" y="636821"/>
+          <a:ext cx="341154" cy="227436"/>
         </a:xfrm>
         <a:prstGeom prst="roundRect">
           <a:avLst>
@@ -11778,25 +12244,24 @@
           </a:pPr>
           <a:r>
             <a:rPr lang="en-US" sz="500" kern="1200" dirty="0" smtClean="0"/>
-            <a:t>Edit address</a:t>
+            <a:t>Account details</a:t>
           </a:r>
-          <a:endParaRPr lang="en-US" sz="500" kern="1200" dirty="0" smtClean="0"/>
         </a:p>
       </dsp:txBody>
       <dsp:txXfrm>
-        <a:off x="2900120" y="1913881"/>
-        <a:ext cx="405200" cy="270133"/>
+        <a:off x="2661963" y="636821"/>
+        <a:ext cx="341154" cy="227436"/>
       </dsp:txXfrm>
     </dsp:sp>
-    <dsp:sp modelId="{54C8F112-08DD-E246-B5F5-9F8A7B221232}">
+    <dsp:sp modelId="{DFC1035A-BB9E-D54B-9D3B-A59CC7894DEC}">
       <dsp:nvSpPr>
         <dsp:cNvPr id="0" name=""/>
         <dsp:cNvSpPr/>
       </dsp:nvSpPr>
       <dsp:spPr>
         <a:xfrm>
-          <a:off x="3102720" y="1805827"/>
-          <a:ext cx="526760" cy="108053"/>
+          <a:off x="3276041" y="500126"/>
+          <a:ext cx="221750" cy="91440"/>
         </a:xfrm>
         <a:custGeom>
           <a:avLst/>
@@ -11807,16 +12272,16 @@
           <a:pathLst>
             <a:path>
               <a:moveTo>
-                <a:pt x="0" y="0"/>
+                <a:pt x="221750" y="45720"/>
               </a:moveTo>
               <a:lnTo>
-                <a:pt x="0" y="54026"/>
+                <a:pt x="221750" y="91207"/>
               </a:lnTo>
               <a:lnTo>
-                <a:pt x="526760" y="54026"/>
+                <a:pt x="0" y="91207"/>
               </a:lnTo>
               <a:lnTo>
-                <a:pt x="526760" y="108053"/>
+                <a:pt x="0" y="136694"/>
               </a:lnTo>
             </a:path>
           </a:pathLst>
@@ -11849,15 +12314,15 @@
         <a:fontRef idx="minor"/>
       </dsp:style>
     </dsp:sp>
-    <dsp:sp modelId="{3F0EF743-C356-8C44-B74D-4A91D1D46D71}">
+    <dsp:sp modelId="{791F7BEF-D996-8F40-947C-A8E13C456870}">
       <dsp:nvSpPr>
         <dsp:cNvPr id="0" name=""/>
         <dsp:cNvSpPr/>
       </dsp:nvSpPr>
       <dsp:spPr>
         <a:xfrm>
-          <a:off x="3426881" y="1913881"/>
-          <a:ext cx="405200" cy="270133"/>
+          <a:off x="3105464" y="636821"/>
+          <a:ext cx="341154" cy="227436"/>
         </a:xfrm>
         <a:prstGeom prst="roundRect">
           <a:avLst>
@@ -11950,25 +12415,24 @@
           </a:pPr>
           <a:r>
             <a:rPr lang="en-US" sz="500" kern="1200" dirty="0" smtClean="0"/>
-            <a:t>Delete address</a:t>
+            <a:t>Change password</a:t>
           </a:r>
-          <a:endParaRPr lang="en-US" sz="500" kern="1200" dirty="0" smtClean="0"/>
         </a:p>
       </dsp:txBody>
       <dsp:txXfrm>
-        <a:off x="3426881" y="1913881"/>
-        <a:ext cx="405200" cy="270133"/>
+        <a:off x="3105464" y="636821"/>
+        <a:ext cx="341154" cy="227436"/>
       </dsp:txXfrm>
     </dsp:sp>
-    <dsp:sp modelId="{034F9D08-26B7-464C-98E8-BCC74B452887}">
+    <dsp:sp modelId="{BAAAE675-372E-C64C-9DFC-2334B74F5B6F}">
       <dsp:nvSpPr>
         <dsp:cNvPr id="0" name=""/>
         <dsp:cNvSpPr/>
       </dsp:nvSpPr>
       <dsp:spPr>
         <a:xfrm>
-          <a:off x="2839340" y="1427640"/>
-          <a:ext cx="790141" cy="108053"/>
+          <a:off x="3497791" y="500126"/>
+          <a:ext cx="221750" cy="91440"/>
         </a:xfrm>
         <a:custGeom>
           <a:avLst/>
@@ -11979,16 +12443,16 @@
           <a:pathLst>
             <a:path>
               <a:moveTo>
-                <a:pt x="0" y="0"/>
+                <a:pt x="0" y="45720"/>
               </a:moveTo>
               <a:lnTo>
-                <a:pt x="0" y="54026"/>
+                <a:pt x="0" y="91207"/>
               </a:lnTo>
               <a:lnTo>
-                <a:pt x="790141" y="54026"/>
+                <a:pt x="221750" y="91207"/>
               </a:lnTo>
               <a:lnTo>
-                <a:pt x="790141" y="108053"/>
+                <a:pt x="221750" y="136694"/>
               </a:lnTo>
             </a:path>
           </a:pathLst>
@@ -12021,15 +12485,15 @@
         <a:fontRef idx="minor"/>
       </dsp:style>
     </dsp:sp>
-    <dsp:sp modelId="{2BCF6A44-CA3B-1D40-8C2A-66704108E553}">
+    <dsp:sp modelId="{40CEBFD4-83C3-5846-8D33-3AB5A5D95710}">
       <dsp:nvSpPr>
         <dsp:cNvPr id="0" name=""/>
         <dsp:cNvSpPr/>
       </dsp:nvSpPr>
       <dsp:spPr>
         <a:xfrm>
-          <a:off x="3426881" y="1535693"/>
-          <a:ext cx="405200" cy="270133"/>
+          <a:off x="3548964" y="636821"/>
+          <a:ext cx="341154" cy="227436"/>
         </a:xfrm>
         <a:prstGeom prst="roundRect">
           <a:avLst>
@@ -12122,25 +12586,24 @@
           </a:pPr>
           <a:r>
             <a:rPr lang="en-US" sz="500" kern="1200" dirty="0" smtClean="0"/>
-            <a:t>Completed orders</a:t>
+            <a:t>Address book</a:t>
           </a:r>
-          <a:endParaRPr lang="en-US" sz="500" kern="1200" dirty="0" smtClean="0"/>
         </a:p>
       </dsp:txBody>
       <dsp:txXfrm>
-        <a:off x="3426881" y="1535693"/>
-        <a:ext cx="405200" cy="270133"/>
+        <a:off x="3548964" y="636821"/>
+        <a:ext cx="341154" cy="227436"/>
       </dsp:txXfrm>
     </dsp:sp>
-    <dsp:sp modelId="{834ED12A-98BA-124A-83D0-5AF8577A70A7}">
+    <dsp:sp modelId="{4ED9CBD7-1C8C-C54E-9E04-D4219E6BDA6C}">
       <dsp:nvSpPr>
         <dsp:cNvPr id="0" name=""/>
         <dsp:cNvSpPr/>
       </dsp:nvSpPr>
       <dsp:spPr>
         <a:xfrm>
-          <a:off x="3629481" y="1049452"/>
-          <a:ext cx="1053521" cy="108053"/>
+          <a:off x="3276041" y="818537"/>
+          <a:ext cx="443500" cy="91440"/>
         </a:xfrm>
         <a:custGeom>
           <a:avLst/>
@@ -12151,16 +12614,16 @@
           <a:pathLst>
             <a:path>
               <a:moveTo>
-                <a:pt x="0" y="0"/>
+                <a:pt x="443500" y="45720"/>
               </a:moveTo>
               <a:lnTo>
-                <a:pt x="0" y="54026"/>
+                <a:pt x="443500" y="91207"/>
               </a:lnTo>
               <a:lnTo>
-                <a:pt x="1053521" y="54026"/>
+                <a:pt x="0" y="91207"/>
               </a:lnTo>
               <a:lnTo>
-                <a:pt x="1053521" y="108053"/>
+                <a:pt x="0" y="136694"/>
               </a:lnTo>
             </a:path>
           </a:pathLst>
@@ -12169,7 +12632,7 @@
         <a:ln w="25400" cap="flat" cmpd="sng" algn="ctr">
           <a:solidFill>
             <a:schemeClr val="dk1">
-              <a:shade val="60000"/>
+              <a:shade val="80000"/>
               <a:hueOff val="0"/>
               <a:satOff val="0"/>
               <a:lumOff val="0"/>
@@ -12193,15 +12656,15 @@
         <a:fontRef idx="minor"/>
       </dsp:style>
     </dsp:sp>
-    <dsp:sp modelId="{51B4BBB9-653E-4141-A21A-A8C05AC8F6E9}">
+    <dsp:sp modelId="{1D2E00EC-E833-6047-B478-2DBE7E168AFF}">
       <dsp:nvSpPr>
         <dsp:cNvPr id="0" name=""/>
         <dsp:cNvSpPr/>
       </dsp:nvSpPr>
       <dsp:spPr>
         <a:xfrm>
-          <a:off x="4480403" y="1157506"/>
-          <a:ext cx="405200" cy="270133"/>
+          <a:off x="3105464" y="955231"/>
+          <a:ext cx="341154" cy="227436"/>
         </a:xfrm>
         <a:prstGeom prst="roundRect">
           <a:avLst>
@@ -12294,25 +12757,24 @@
           </a:pPr>
           <a:r>
             <a:rPr lang="en-US" sz="500" kern="1200" dirty="0" smtClean="0"/>
-            <a:t>Admin</a:t>
+            <a:t>New address</a:t>
           </a:r>
-          <a:endParaRPr lang="en-US" sz="500" kern="1200" dirty="0" smtClean="0"/>
         </a:p>
       </dsp:txBody>
       <dsp:txXfrm>
-        <a:off x="4480403" y="1157506"/>
-        <a:ext cx="405200" cy="270133"/>
+        <a:off x="3105464" y="955231"/>
+        <a:ext cx="341154" cy="227436"/>
       </dsp:txXfrm>
     </dsp:sp>
-    <dsp:sp modelId="{A40373D9-960F-7F4D-98E8-A9FB2DBB29E2}">
+    <dsp:sp modelId="{A6050186-D63E-864F-A7FB-933DDE98E4D9}">
       <dsp:nvSpPr>
         <dsp:cNvPr id="0" name=""/>
         <dsp:cNvSpPr/>
       </dsp:nvSpPr>
       <dsp:spPr>
         <a:xfrm>
-          <a:off x="4156242" y="1427640"/>
-          <a:ext cx="526760" cy="108053"/>
+          <a:off x="3673821" y="818537"/>
+          <a:ext cx="91440" cy="91440"/>
         </a:xfrm>
         <a:custGeom>
           <a:avLst/>
@@ -12323,16 +12785,10 @@
           <a:pathLst>
             <a:path>
               <a:moveTo>
-                <a:pt x="526760" y="0"/>
+                <a:pt x="45720" y="45720"/>
               </a:moveTo>
               <a:lnTo>
-                <a:pt x="526760" y="54026"/>
-              </a:lnTo>
-              <a:lnTo>
-                <a:pt x="0" y="54026"/>
-              </a:lnTo>
-              <a:lnTo>
-                <a:pt x="0" y="108053"/>
+                <a:pt x="45720" y="136694"/>
               </a:lnTo>
             </a:path>
           </a:pathLst>
@@ -12365,15 +12821,15 @@
         <a:fontRef idx="minor"/>
       </dsp:style>
     </dsp:sp>
-    <dsp:sp modelId="{0015D2B2-ADA6-6649-8987-33BF465BA00F}">
+    <dsp:sp modelId="{08861A9B-CF27-C342-8B8F-36348C18EC0B}">
       <dsp:nvSpPr>
         <dsp:cNvPr id="0" name=""/>
         <dsp:cNvSpPr/>
       </dsp:nvSpPr>
       <dsp:spPr>
         <a:xfrm>
-          <a:off x="3953642" y="1535693"/>
-          <a:ext cx="405200" cy="270133"/>
+          <a:off x="3548964" y="955231"/>
+          <a:ext cx="341154" cy="227436"/>
         </a:xfrm>
         <a:prstGeom prst="roundRect">
           <a:avLst>
@@ -12466,25 +12922,24 @@
           </a:pPr>
           <a:r>
             <a:rPr lang="en-US" sz="500" kern="1200" dirty="0" smtClean="0"/>
-            <a:t>Paid orders</a:t>
+            <a:t>Edit address</a:t>
           </a:r>
-          <a:endParaRPr lang="en-US" sz="500" kern="1200" dirty="0" smtClean="0"/>
         </a:p>
       </dsp:txBody>
       <dsp:txXfrm>
-        <a:off x="3953642" y="1535693"/>
-        <a:ext cx="405200" cy="270133"/>
+        <a:off x="3548964" y="955231"/>
+        <a:ext cx="341154" cy="227436"/>
       </dsp:txXfrm>
     </dsp:sp>
-    <dsp:sp modelId="{9BC4EC78-B262-C048-A423-4D9CB8008025}">
+    <dsp:sp modelId="{54C8F112-08DD-E246-B5F5-9F8A7B221232}">
       <dsp:nvSpPr>
         <dsp:cNvPr id="0" name=""/>
         <dsp:cNvSpPr/>
       </dsp:nvSpPr>
       <dsp:spPr>
         <a:xfrm>
-          <a:off x="4637283" y="1427640"/>
-          <a:ext cx="91440" cy="108053"/>
+          <a:off x="3719541" y="818537"/>
+          <a:ext cx="443500" cy="91440"/>
         </a:xfrm>
         <a:custGeom>
           <a:avLst/>
@@ -12495,10 +12950,16 @@
           <a:pathLst>
             <a:path>
               <a:moveTo>
-                <a:pt x="45720" y="0"/>
+                <a:pt x="0" y="45720"/>
               </a:moveTo>
               <a:lnTo>
-                <a:pt x="45720" y="108053"/>
+                <a:pt x="0" y="91207"/>
+              </a:lnTo>
+              <a:lnTo>
+                <a:pt x="443500" y="91207"/>
+              </a:lnTo>
+              <a:lnTo>
+                <a:pt x="443500" y="136694"/>
               </a:lnTo>
             </a:path>
           </a:pathLst>
@@ -12531,15 +12992,15 @@
         <a:fontRef idx="minor"/>
       </dsp:style>
     </dsp:sp>
-    <dsp:sp modelId="{23F9216E-C7F3-D141-BA72-240F3E70368A}">
+    <dsp:sp modelId="{3F0EF743-C356-8C44-B74D-4A91D1D46D71}">
       <dsp:nvSpPr>
         <dsp:cNvPr id="0" name=""/>
         <dsp:cNvSpPr/>
       </dsp:nvSpPr>
       <dsp:spPr>
         <a:xfrm>
-          <a:off x="4480403" y="1535693"/>
-          <a:ext cx="405200" cy="270133"/>
+          <a:off x="3992465" y="955231"/>
+          <a:ext cx="341154" cy="227436"/>
         </a:xfrm>
         <a:prstGeom prst="roundRect">
           <a:avLst>
@@ -12632,25 +13093,24 @@
           </a:pPr>
           <a:r>
             <a:rPr lang="en-US" sz="500" kern="1200" dirty="0" smtClean="0"/>
-            <a:t>Delivered orders</a:t>
+            <a:t>Delete address</a:t>
           </a:r>
-          <a:endParaRPr lang="en-US" sz="500" kern="1200" dirty="0" smtClean="0"/>
         </a:p>
       </dsp:txBody>
       <dsp:txXfrm>
-        <a:off x="4480403" y="1535693"/>
-        <a:ext cx="405200" cy="270133"/>
+        <a:off x="3992465" y="955231"/>
+        <a:ext cx="341154" cy="227436"/>
       </dsp:txXfrm>
     </dsp:sp>
-    <dsp:sp modelId="{0FCD18C0-4738-0C42-96A8-68D42D113DA2}">
+    <dsp:sp modelId="{034F9D08-26B7-464C-98E8-BCC74B452887}">
       <dsp:nvSpPr>
         <dsp:cNvPr id="0" name=""/>
         <dsp:cNvSpPr/>
       </dsp:nvSpPr>
       <dsp:spPr>
         <a:xfrm>
-          <a:off x="4683003" y="1427640"/>
-          <a:ext cx="526760" cy="108053"/>
+          <a:off x="3497791" y="500126"/>
+          <a:ext cx="665250" cy="91440"/>
         </a:xfrm>
         <a:custGeom>
           <a:avLst/>
@@ -12661,16 +13121,16 @@
           <a:pathLst>
             <a:path>
               <a:moveTo>
-                <a:pt x="0" y="0"/>
+                <a:pt x="0" y="45720"/>
               </a:moveTo>
               <a:lnTo>
-                <a:pt x="0" y="54026"/>
+                <a:pt x="0" y="91207"/>
               </a:lnTo>
               <a:lnTo>
-                <a:pt x="526760" y="54026"/>
+                <a:pt x="665250" y="91207"/>
               </a:lnTo>
               <a:lnTo>
-                <a:pt x="526760" y="108053"/>
+                <a:pt x="665250" y="136694"/>
               </a:lnTo>
             </a:path>
           </a:pathLst>
@@ -12703,15 +13163,15 @@
         <a:fontRef idx="minor"/>
       </dsp:style>
     </dsp:sp>
-    <dsp:sp modelId="{0B4D4399-C510-AB4D-85AB-C3558C55314B}">
+    <dsp:sp modelId="{2BCF6A44-CA3B-1D40-8C2A-66704108E553}">
       <dsp:nvSpPr>
         <dsp:cNvPr id="0" name=""/>
         <dsp:cNvSpPr/>
       </dsp:nvSpPr>
       <dsp:spPr>
         <a:xfrm>
-          <a:off x="5007164" y="1535693"/>
-          <a:ext cx="405200" cy="270133"/>
+          <a:off x="3992465" y="636821"/>
+          <a:ext cx="341154" cy="227436"/>
         </a:xfrm>
         <a:prstGeom prst="roundRect">
           <a:avLst>
@@ -12804,25 +13264,24 @@
           </a:pPr>
           <a:r>
             <a:rPr lang="en-US" sz="500" kern="1200" dirty="0" smtClean="0"/>
-            <a:t>Statistics</a:t>
+            <a:t>Completed orders</a:t>
           </a:r>
-          <a:endParaRPr lang="en-US" sz="500" kern="1200" dirty="0" smtClean="0"/>
         </a:p>
       </dsp:txBody>
       <dsp:txXfrm>
-        <a:off x="5007164" y="1535693"/>
-        <a:ext cx="405200" cy="270133"/>
+        <a:off x="3992465" y="636821"/>
+        <a:ext cx="341154" cy="227436"/>
       </dsp:txXfrm>
     </dsp:sp>
-    <dsp:sp modelId="{40A4DB64-0E72-994A-A165-537167CD4950}">
+    <dsp:sp modelId="{834ED12A-98BA-124A-83D0-5AF8577A70A7}">
       <dsp:nvSpPr>
         <dsp:cNvPr id="0" name=""/>
         <dsp:cNvSpPr/>
       </dsp:nvSpPr>
       <dsp:spPr>
         <a:xfrm>
-          <a:off x="3629481" y="1049452"/>
-          <a:ext cx="2107043" cy="108053"/>
+          <a:off x="3608666" y="181716"/>
+          <a:ext cx="1441376" cy="91440"/>
         </a:xfrm>
         <a:custGeom>
           <a:avLst/>
@@ -12833,16 +13292,16 @@
           <a:pathLst>
             <a:path>
               <a:moveTo>
-                <a:pt x="0" y="0"/>
+                <a:pt x="0" y="45720"/>
               </a:moveTo>
               <a:lnTo>
-                <a:pt x="0" y="54026"/>
+                <a:pt x="0" y="91207"/>
               </a:lnTo>
               <a:lnTo>
-                <a:pt x="2107043" y="54026"/>
+                <a:pt x="1441376" y="91207"/>
               </a:lnTo>
               <a:lnTo>
-                <a:pt x="2107043" y="108053"/>
+                <a:pt x="1441376" y="136694"/>
               </a:lnTo>
             </a:path>
           </a:pathLst>
@@ -12875,15 +13334,15 @@
         <a:fontRef idx="minor"/>
       </dsp:style>
     </dsp:sp>
-    <dsp:sp modelId="{DBBEE2C4-E54F-D942-993F-82E16E578EB8}">
+    <dsp:sp modelId="{51B4BBB9-653E-4141-A21A-A8C05AC8F6E9}">
       <dsp:nvSpPr>
         <dsp:cNvPr id="0" name=""/>
         <dsp:cNvSpPr/>
       </dsp:nvSpPr>
       <dsp:spPr>
         <a:xfrm>
-          <a:off x="5533925" y="1157506"/>
-          <a:ext cx="405200" cy="270133"/>
+          <a:off x="4879466" y="318410"/>
+          <a:ext cx="341154" cy="227436"/>
         </a:xfrm>
         <a:prstGeom prst="roundRect">
           <a:avLst>
@@ -12976,25 +13435,24 @@
           </a:pPr>
           <a:r>
             <a:rPr lang="en-US" sz="500" kern="1200" dirty="0" smtClean="0"/>
-            <a:t>Cart</a:t>
+            <a:t>Admin</a:t>
           </a:r>
-          <a:endParaRPr lang="en-US" sz="500" kern="1200" dirty="0" smtClean="0"/>
         </a:p>
       </dsp:txBody>
       <dsp:txXfrm>
-        <a:off x="5533925" y="1157506"/>
-        <a:ext cx="405200" cy="270133"/>
+        <a:off x="4879466" y="318410"/>
+        <a:ext cx="341154" cy="227436"/>
       </dsp:txXfrm>
     </dsp:sp>
-    <dsp:sp modelId="{93270657-4C4A-F444-B4C6-F927919A2A3B}">
+    <dsp:sp modelId="{A40373D9-960F-7F4D-98E8-A9FB2DBB29E2}">
       <dsp:nvSpPr>
         <dsp:cNvPr id="0" name=""/>
         <dsp:cNvSpPr/>
       </dsp:nvSpPr>
       <dsp:spPr>
         <a:xfrm>
-          <a:off x="5690805" y="1427640"/>
-          <a:ext cx="91440" cy="108053"/>
+          <a:off x="4606542" y="500126"/>
+          <a:ext cx="443500" cy="91440"/>
         </a:xfrm>
         <a:custGeom>
           <a:avLst/>
@@ -13005,10 +13463,16 @@
           <a:pathLst>
             <a:path>
               <a:moveTo>
-                <a:pt x="45720" y="0"/>
+                <a:pt x="443500" y="45720"/>
               </a:moveTo>
               <a:lnTo>
-                <a:pt x="45720" y="108053"/>
+                <a:pt x="443500" y="91207"/>
+              </a:lnTo>
+              <a:lnTo>
+                <a:pt x="0" y="91207"/>
+              </a:lnTo>
+              <a:lnTo>
+                <a:pt x="0" y="136694"/>
               </a:lnTo>
             </a:path>
           </a:pathLst>
@@ -13041,15 +13505,15 @@
         <a:fontRef idx="minor"/>
       </dsp:style>
     </dsp:sp>
-    <dsp:sp modelId="{946F4C34-E67F-D64A-9C68-A5169F9C4CFB}">
+    <dsp:sp modelId="{0015D2B2-ADA6-6649-8987-33BF465BA00F}">
       <dsp:nvSpPr>
         <dsp:cNvPr id="0" name=""/>
         <dsp:cNvSpPr/>
       </dsp:nvSpPr>
       <dsp:spPr>
         <a:xfrm>
-          <a:off x="5533925" y="1535693"/>
-          <a:ext cx="405200" cy="270133"/>
+          <a:off x="4435965" y="636821"/>
+          <a:ext cx="341154" cy="227436"/>
         </a:xfrm>
         <a:prstGeom prst="roundRect">
           <a:avLst>
@@ -13142,25 +13606,24 @@
           </a:pPr>
           <a:r>
             <a:rPr lang="en-US" sz="500" kern="1200" dirty="0" smtClean="0"/>
-            <a:t>Checkout</a:t>
+            <a:t>Paid orders</a:t>
           </a:r>
-          <a:endParaRPr lang="en-US" sz="500" kern="1200" dirty="0" smtClean="0"/>
         </a:p>
       </dsp:txBody>
       <dsp:txXfrm>
-        <a:off x="5533925" y="1535693"/>
-        <a:ext cx="405200" cy="270133"/>
+        <a:off x="4435965" y="636821"/>
+        <a:ext cx="341154" cy="227436"/>
       </dsp:txXfrm>
     </dsp:sp>
-    <dsp:sp modelId="{09F45D7F-D313-334F-B626-DFE5C47D187E}">
+    <dsp:sp modelId="{9BC4EC78-B262-C048-A423-4D9CB8008025}">
       <dsp:nvSpPr>
         <dsp:cNvPr id="0" name=""/>
         <dsp:cNvSpPr/>
       </dsp:nvSpPr>
       <dsp:spPr>
         <a:xfrm>
-          <a:off x="3629481" y="1049452"/>
-          <a:ext cx="2633804" cy="108053"/>
+          <a:off x="5004323" y="500126"/>
+          <a:ext cx="91440" cy="91440"/>
         </a:xfrm>
         <a:custGeom>
           <a:avLst/>
@@ -13171,16 +13634,10 @@
           <a:pathLst>
             <a:path>
               <a:moveTo>
-                <a:pt x="0" y="0"/>
+                <a:pt x="45720" y="45720"/>
               </a:moveTo>
               <a:lnTo>
-                <a:pt x="0" y="54026"/>
-              </a:lnTo>
-              <a:lnTo>
-                <a:pt x="2633804" y="54026"/>
-              </a:lnTo>
-              <a:lnTo>
-                <a:pt x="2633804" y="108053"/>
+                <a:pt x="45720" y="136694"/>
               </a:lnTo>
             </a:path>
           </a:pathLst>
@@ -13189,7 +13646,7 @@
         <a:ln w="25400" cap="flat" cmpd="sng" algn="ctr">
           <a:solidFill>
             <a:schemeClr val="dk1">
-              <a:shade val="60000"/>
+              <a:shade val="80000"/>
               <a:hueOff val="0"/>
               <a:satOff val="0"/>
               <a:lumOff val="0"/>
@@ -13213,15 +13670,15 @@
         <a:fontRef idx="minor"/>
       </dsp:style>
     </dsp:sp>
-    <dsp:sp modelId="{7DE98858-2169-3147-8802-4D119636C8CD}">
+    <dsp:sp modelId="{23F9216E-C7F3-D141-BA72-240F3E70368A}">
       <dsp:nvSpPr>
         <dsp:cNvPr id="0" name=""/>
         <dsp:cNvSpPr/>
       </dsp:nvSpPr>
       <dsp:spPr>
         <a:xfrm>
-          <a:off x="6060685" y="1157506"/>
-          <a:ext cx="405200" cy="270133"/>
+          <a:off x="4879466" y="636821"/>
+          <a:ext cx="341154" cy="227436"/>
         </a:xfrm>
         <a:prstGeom prst="roundRect">
           <a:avLst>
@@ -13314,25 +13771,24 @@
           </a:pPr>
           <a:r>
             <a:rPr lang="en-US" sz="500" kern="1200" dirty="0" smtClean="0"/>
-            <a:t>About</a:t>
+            <a:t>Delivered orders</a:t>
           </a:r>
-          <a:endParaRPr lang="en-US" sz="500" kern="1200" dirty="0" smtClean="0"/>
         </a:p>
       </dsp:txBody>
       <dsp:txXfrm>
-        <a:off x="6060685" y="1157506"/>
-        <a:ext cx="405200" cy="270133"/>
+        <a:off x="4879466" y="636821"/>
+        <a:ext cx="341154" cy="227436"/>
       </dsp:txXfrm>
     </dsp:sp>
-    <dsp:sp modelId="{47F226ED-03DC-DB42-8882-368010BF9656}">
+    <dsp:sp modelId="{0FCD18C0-4738-0C42-96A8-68D42D113DA2}">
       <dsp:nvSpPr>
         <dsp:cNvPr id="0" name=""/>
         <dsp:cNvSpPr/>
       </dsp:nvSpPr>
       <dsp:spPr>
         <a:xfrm>
-          <a:off x="3629481" y="1049452"/>
-          <a:ext cx="3160565" cy="108053"/>
+          <a:off x="5050043" y="500126"/>
+          <a:ext cx="443500" cy="91440"/>
         </a:xfrm>
         <a:custGeom>
           <a:avLst/>
@@ -13343,16 +13799,16 @@
           <a:pathLst>
             <a:path>
               <a:moveTo>
-                <a:pt x="0" y="0"/>
+                <a:pt x="0" y="45720"/>
               </a:moveTo>
               <a:lnTo>
-                <a:pt x="0" y="54026"/>
+                <a:pt x="0" y="91207"/>
               </a:lnTo>
               <a:lnTo>
-                <a:pt x="3160565" y="54026"/>
+                <a:pt x="443500" y="91207"/>
               </a:lnTo>
               <a:lnTo>
-                <a:pt x="3160565" y="108053"/>
+                <a:pt x="443500" y="136694"/>
               </a:lnTo>
             </a:path>
           </a:pathLst>
@@ -13361,7 +13817,7 @@
         <a:ln w="25400" cap="flat" cmpd="sng" algn="ctr">
           <a:solidFill>
             <a:schemeClr val="dk1">
-              <a:shade val="60000"/>
+              <a:shade val="80000"/>
               <a:hueOff val="0"/>
               <a:satOff val="0"/>
               <a:lumOff val="0"/>
@@ -13385,15 +13841,15 @@
         <a:fontRef idx="minor"/>
       </dsp:style>
     </dsp:sp>
-    <dsp:sp modelId="{48165126-8B80-4444-99A4-95E3621A03ED}">
+    <dsp:sp modelId="{0B4D4399-C510-AB4D-85AB-C3558C55314B}">
       <dsp:nvSpPr>
         <dsp:cNvPr id="0" name=""/>
         <dsp:cNvSpPr/>
       </dsp:nvSpPr>
       <dsp:spPr>
         <a:xfrm>
-          <a:off x="6587446" y="1157506"/>
-          <a:ext cx="405200" cy="270133"/>
+          <a:off x="5322966" y="636821"/>
+          <a:ext cx="341154" cy="227436"/>
         </a:xfrm>
         <a:prstGeom prst="roundRect">
           <a:avLst>
@@ -13486,14 +13942,691 @@
           </a:pPr>
           <a:r>
             <a:rPr lang="en-US" sz="500" kern="1200" dirty="0" smtClean="0"/>
+            <a:t>Statistics</a:t>
+          </a:r>
+        </a:p>
+      </dsp:txBody>
+      <dsp:txXfrm>
+        <a:off x="5322966" y="636821"/>
+        <a:ext cx="341154" cy="227436"/>
+      </dsp:txXfrm>
+    </dsp:sp>
+    <dsp:sp modelId="{40A4DB64-0E72-994A-A165-537167CD4950}">
+      <dsp:nvSpPr>
+        <dsp:cNvPr id="0" name=""/>
+        <dsp:cNvSpPr/>
+      </dsp:nvSpPr>
+      <dsp:spPr>
+        <a:xfrm>
+          <a:off x="3608666" y="181716"/>
+          <a:ext cx="2328377" cy="91440"/>
+        </a:xfrm>
+        <a:custGeom>
+          <a:avLst/>
+          <a:gdLst/>
+          <a:ahLst/>
+          <a:cxnLst/>
+          <a:rect l="0" t="0" r="0" b="0"/>
+          <a:pathLst>
+            <a:path>
+              <a:moveTo>
+                <a:pt x="0" y="45720"/>
+              </a:moveTo>
+              <a:lnTo>
+                <a:pt x="0" y="91207"/>
+              </a:lnTo>
+              <a:lnTo>
+                <a:pt x="2328377" y="91207"/>
+              </a:lnTo>
+              <a:lnTo>
+                <a:pt x="2328377" y="136694"/>
+              </a:lnTo>
+            </a:path>
+          </a:pathLst>
+        </a:custGeom>
+        <a:noFill/>
+        <a:ln w="25400" cap="flat" cmpd="sng" algn="ctr">
+          <a:solidFill>
+            <a:schemeClr val="dk1">
+              <a:shade val="60000"/>
+              <a:hueOff val="0"/>
+              <a:satOff val="0"/>
+              <a:lumOff val="0"/>
+              <a:alphaOff val="0"/>
+            </a:schemeClr>
+          </a:solidFill>
+          <a:prstDash val="solid"/>
+        </a:ln>
+        <a:effectLst/>
+      </dsp:spPr>
+      <dsp:style>
+        <a:lnRef idx="2">
+          <a:scrgbClr r="0" g="0" b="0"/>
+        </a:lnRef>
+        <a:fillRef idx="0">
+          <a:scrgbClr r="0" g="0" b="0"/>
+        </a:fillRef>
+        <a:effectRef idx="0">
+          <a:scrgbClr r="0" g="0" b="0"/>
+        </a:effectRef>
+        <a:fontRef idx="minor"/>
+      </dsp:style>
+    </dsp:sp>
+    <dsp:sp modelId="{DBBEE2C4-E54F-D942-993F-82E16E578EB8}">
+      <dsp:nvSpPr>
+        <dsp:cNvPr id="0" name=""/>
+        <dsp:cNvSpPr/>
+      </dsp:nvSpPr>
+      <dsp:spPr>
+        <a:xfrm>
+          <a:off x="5766467" y="318410"/>
+          <a:ext cx="341154" cy="227436"/>
+        </a:xfrm>
+        <a:prstGeom prst="roundRect">
+          <a:avLst>
+            <a:gd name="adj" fmla="val 10000"/>
+          </a:avLst>
+        </a:prstGeom>
+        <a:gradFill rotWithShape="0">
+          <a:gsLst>
+            <a:gs pos="0">
+              <a:schemeClr val="lt1">
+                <a:hueOff val="0"/>
+                <a:satOff val="0"/>
+                <a:lumOff val="0"/>
+                <a:alphaOff val="0"/>
+                <a:tint val="50000"/>
+                <a:satMod val="300000"/>
+              </a:schemeClr>
+            </a:gs>
+            <a:gs pos="35000">
+              <a:schemeClr val="lt1">
+                <a:hueOff val="0"/>
+                <a:satOff val="0"/>
+                <a:lumOff val="0"/>
+                <a:alphaOff val="0"/>
+                <a:tint val="37000"/>
+                <a:satMod val="300000"/>
+              </a:schemeClr>
+            </a:gs>
+            <a:gs pos="100000">
+              <a:schemeClr val="lt1">
+                <a:hueOff val="0"/>
+                <a:satOff val="0"/>
+                <a:lumOff val="0"/>
+                <a:alphaOff val="0"/>
+                <a:tint val="15000"/>
+                <a:satMod val="350000"/>
+              </a:schemeClr>
+            </a:gs>
+          </a:gsLst>
+          <a:lin ang="16200000" scaled="1"/>
+        </a:gradFill>
+        <a:ln>
+          <a:noFill/>
+        </a:ln>
+        <a:effectLst>
+          <a:outerShdw blurRad="40000" dist="20000" dir="5400000" rotWithShape="0">
+            <a:srgbClr val="000000">
+              <a:alpha val="38000"/>
+            </a:srgbClr>
+          </a:outerShdw>
+        </a:effectLst>
+        <a:scene3d>
+          <a:camera prst="orthographicFront"/>
+          <a:lightRig rig="flat" dir="t"/>
+        </a:scene3d>
+        <a:sp3d prstMaterial="dkEdge">
+          <a:bevelT w="8200" h="38100"/>
+        </a:sp3d>
+      </dsp:spPr>
+      <dsp:style>
+        <a:lnRef idx="0">
+          <a:scrgbClr r="0" g="0" b="0"/>
+        </a:lnRef>
+        <a:fillRef idx="2">
+          <a:scrgbClr r="0" g="0" b="0"/>
+        </a:fillRef>
+        <a:effectRef idx="1">
+          <a:scrgbClr r="0" g="0" b="0"/>
+        </a:effectRef>
+        <a:fontRef idx="minor">
+          <a:schemeClr val="dk1"/>
+        </a:fontRef>
+      </dsp:style>
+      <dsp:txBody>
+        <a:bodyPr spcFirstLastPara="0" vert="horz" wrap="square" lIns="19050" tIns="19050" rIns="19050" bIns="19050" numCol="1" spcCol="1270" anchor="ctr" anchorCtr="0">
+          <a:noAutofit/>
+        </a:bodyPr>
+        <a:lstStyle/>
+        <a:p>
+          <a:pPr lvl="0" algn="ctr" defTabSz="222250">
+            <a:lnSpc>
+              <a:spcPct val="90000"/>
+            </a:lnSpc>
+            <a:spcBef>
+              <a:spcPct val="0"/>
+            </a:spcBef>
+            <a:spcAft>
+              <a:spcPct val="35000"/>
+            </a:spcAft>
+          </a:pPr>
+          <a:r>
+            <a:rPr lang="en-US" sz="500" kern="1200" dirty="0" smtClean="0"/>
+            <a:t>Cart</a:t>
+          </a:r>
+        </a:p>
+      </dsp:txBody>
+      <dsp:txXfrm>
+        <a:off x="5766467" y="318410"/>
+        <a:ext cx="341154" cy="227436"/>
+      </dsp:txXfrm>
+    </dsp:sp>
+    <dsp:sp modelId="{93270657-4C4A-F444-B4C6-F927919A2A3B}">
+      <dsp:nvSpPr>
+        <dsp:cNvPr id="0" name=""/>
+        <dsp:cNvSpPr/>
+      </dsp:nvSpPr>
+      <dsp:spPr>
+        <a:xfrm>
+          <a:off x="5891324" y="500126"/>
+          <a:ext cx="91440" cy="91440"/>
+        </a:xfrm>
+        <a:custGeom>
+          <a:avLst/>
+          <a:gdLst/>
+          <a:ahLst/>
+          <a:cxnLst/>
+          <a:rect l="0" t="0" r="0" b="0"/>
+          <a:pathLst>
+            <a:path>
+              <a:moveTo>
+                <a:pt x="45720" y="45720"/>
+              </a:moveTo>
+              <a:lnTo>
+                <a:pt x="45720" y="136694"/>
+              </a:lnTo>
+            </a:path>
+          </a:pathLst>
+        </a:custGeom>
+        <a:noFill/>
+        <a:ln w="25400" cap="flat" cmpd="sng" algn="ctr">
+          <a:solidFill>
+            <a:schemeClr val="dk1">
+              <a:shade val="80000"/>
+              <a:hueOff val="0"/>
+              <a:satOff val="0"/>
+              <a:lumOff val="0"/>
+              <a:alphaOff val="0"/>
+            </a:schemeClr>
+          </a:solidFill>
+          <a:prstDash val="solid"/>
+        </a:ln>
+        <a:effectLst/>
+      </dsp:spPr>
+      <dsp:style>
+        <a:lnRef idx="2">
+          <a:scrgbClr r="0" g="0" b="0"/>
+        </a:lnRef>
+        <a:fillRef idx="0">
+          <a:scrgbClr r="0" g="0" b="0"/>
+        </a:fillRef>
+        <a:effectRef idx="0">
+          <a:scrgbClr r="0" g="0" b="0"/>
+        </a:effectRef>
+        <a:fontRef idx="minor"/>
+      </dsp:style>
+    </dsp:sp>
+    <dsp:sp modelId="{946F4C34-E67F-D64A-9C68-A5169F9C4CFB}">
+      <dsp:nvSpPr>
+        <dsp:cNvPr id="0" name=""/>
+        <dsp:cNvSpPr/>
+      </dsp:nvSpPr>
+      <dsp:spPr>
+        <a:xfrm>
+          <a:off x="5766467" y="636821"/>
+          <a:ext cx="341154" cy="227436"/>
+        </a:xfrm>
+        <a:prstGeom prst="roundRect">
+          <a:avLst>
+            <a:gd name="adj" fmla="val 10000"/>
+          </a:avLst>
+        </a:prstGeom>
+        <a:gradFill rotWithShape="0">
+          <a:gsLst>
+            <a:gs pos="0">
+              <a:schemeClr val="lt1">
+                <a:hueOff val="0"/>
+                <a:satOff val="0"/>
+                <a:lumOff val="0"/>
+                <a:alphaOff val="0"/>
+                <a:tint val="50000"/>
+                <a:satMod val="300000"/>
+              </a:schemeClr>
+            </a:gs>
+            <a:gs pos="35000">
+              <a:schemeClr val="lt1">
+                <a:hueOff val="0"/>
+                <a:satOff val="0"/>
+                <a:lumOff val="0"/>
+                <a:alphaOff val="0"/>
+                <a:tint val="37000"/>
+                <a:satMod val="300000"/>
+              </a:schemeClr>
+            </a:gs>
+            <a:gs pos="100000">
+              <a:schemeClr val="lt1">
+                <a:hueOff val="0"/>
+                <a:satOff val="0"/>
+                <a:lumOff val="0"/>
+                <a:alphaOff val="0"/>
+                <a:tint val="15000"/>
+                <a:satMod val="350000"/>
+              </a:schemeClr>
+            </a:gs>
+          </a:gsLst>
+          <a:lin ang="16200000" scaled="1"/>
+        </a:gradFill>
+        <a:ln>
+          <a:noFill/>
+        </a:ln>
+        <a:effectLst>
+          <a:outerShdw blurRad="40000" dist="20000" dir="5400000" rotWithShape="0">
+            <a:srgbClr val="000000">
+              <a:alpha val="38000"/>
+            </a:srgbClr>
+          </a:outerShdw>
+        </a:effectLst>
+        <a:scene3d>
+          <a:camera prst="orthographicFront"/>
+          <a:lightRig rig="flat" dir="t"/>
+        </a:scene3d>
+        <a:sp3d prstMaterial="dkEdge">
+          <a:bevelT w="8200" h="38100"/>
+        </a:sp3d>
+      </dsp:spPr>
+      <dsp:style>
+        <a:lnRef idx="0">
+          <a:scrgbClr r="0" g="0" b="0"/>
+        </a:lnRef>
+        <a:fillRef idx="2">
+          <a:scrgbClr r="0" g="0" b="0"/>
+        </a:fillRef>
+        <a:effectRef idx="1">
+          <a:scrgbClr r="0" g="0" b="0"/>
+        </a:effectRef>
+        <a:fontRef idx="minor">
+          <a:schemeClr val="dk1"/>
+        </a:fontRef>
+      </dsp:style>
+      <dsp:txBody>
+        <a:bodyPr spcFirstLastPara="0" vert="horz" wrap="square" lIns="19050" tIns="19050" rIns="19050" bIns="19050" numCol="1" spcCol="1270" anchor="ctr" anchorCtr="0">
+          <a:noAutofit/>
+        </a:bodyPr>
+        <a:lstStyle/>
+        <a:p>
+          <a:pPr lvl="0" algn="ctr" defTabSz="222250">
+            <a:lnSpc>
+              <a:spcPct val="90000"/>
+            </a:lnSpc>
+            <a:spcBef>
+              <a:spcPct val="0"/>
+            </a:spcBef>
+            <a:spcAft>
+              <a:spcPct val="35000"/>
+            </a:spcAft>
+          </a:pPr>
+          <a:r>
+            <a:rPr lang="en-US" sz="500" kern="1200" dirty="0" smtClean="0"/>
+            <a:t>Checkout</a:t>
+          </a:r>
+        </a:p>
+      </dsp:txBody>
+      <dsp:txXfrm>
+        <a:off x="5766467" y="636821"/>
+        <a:ext cx="341154" cy="227436"/>
+      </dsp:txXfrm>
+    </dsp:sp>
+    <dsp:sp modelId="{09F45D7F-D313-334F-B626-DFE5C47D187E}">
+      <dsp:nvSpPr>
+        <dsp:cNvPr id="0" name=""/>
+        <dsp:cNvSpPr/>
+      </dsp:nvSpPr>
+      <dsp:spPr>
+        <a:xfrm>
+          <a:off x="3608666" y="181716"/>
+          <a:ext cx="2771878" cy="91440"/>
+        </a:xfrm>
+        <a:custGeom>
+          <a:avLst/>
+          <a:gdLst/>
+          <a:ahLst/>
+          <a:cxnLst/>
+          <a:rect l="0" t="0" r="0" b="0"/>
+          <a:pathLst>
+            <a:path>
+              <a:moveTo>
+                <a:pt x="0" y="45720"/>
+              </a:moveTo>
+              <a:lnTo>
+                <a:pt x="0" y="91207"/>
+              </a:lnTo>
+              <a:lnTo>
+                <a:pt x="2771878" y="91207"/>
+              </a:lnTo>
+              <a:lnTo>
+                <a:pt x="2771878" y="136694"/>
+              </a:lnTo>
+            </a:path>
+          </a:pathLst>
+        </a:custGeom>
+        <a:noFill/>
+        <a:ln w="25400" cap="flat" cmpd="sng" algn="ctr">
+          <a:solidFill>
+            <a:schemeClr val="dk1">
+              <a:shade val="60000"/>
+              <a:hueOff val="0"/>
+              <a:satOff val="0"/>
+              <a:lumOff val="0"/>
+              <a:alphaOff val="0"/>
+            </a:schemeClr>
+          </a:solidFill>
+          <a:prstDash val="solid"/>
+        </a:ln>
+        <a:effectLst/>
+      </dsp:spPr>
+      <dsp:style>
+        <a:lnRef idx="2">
+          <a:scrgbClr r="0" g="0" b="0"/>
+        </a:lnRef>
+        <a:fillRef idx="0">
+          <a:scrgbClr r="0" g="0" b="0"/>
+        </a:fillRef>
+        <a:effectRef idx="0">
+          <a:scrgbClr r="0" g="0" b="0"/>
+        </a:effectRef>
+        <a:fontRef idx="minor"/>
+      </dsp:style>
+    </dsp:sp>
+    <dsp:sp modelId="{7DE98858-2169-3147-8802-4D119636C8CD}">
+      <dsp:nvSpPr>
+        <dsp:cNvPr id="0" name=""/>
+        <dsp:cNvSpPr/>
+      </dsp:nvSpPr>
+      <dsp:spPr>
+        <a:xfrm>
+          <a:off x="6209967" y="318410"/>
+          <a:ext cx="341154" cy="227436"/>
+        </a:xfrm>
+        <a:prstGeom prst="roundRect">
+          <a:avLst>
+            <a:gd name="adj" fmla="val 10000"/>
+          </a:avLst>
+        </a:prstGeom>
+        <a:gradFill rotWithShape="0">
+          <a:gsLst>
+            <a:gs pos="0">
+              <a:schemeClr val="lt1">
+                <a:hueOff val="0"/>
+                <a:satOff val="0"/>
+                <a:lumOff val="0"/>
+                <a:alphaOff val="0"/>
+                <a:tint val="50000"/>
+                <a:satMod val="300000"/>
+              </a:schemeClr>
+            </a:gs>
+            <a:gs pos="35000">
+              <a:schemeClr val="lt1">
+                <a:hueOff val="0"/>
+                <a:satOff val="0"/>
+                <a:lumOff val="0"/>
+                <a:alphaOff val="0"/>
+                <a:tint val="37000"/>
+                <a:satMod val="300000"/>
+              </a:schemeClr>
+            </a:gs>
+            <a:gs pos="100000">
+              <a:schemeClr val="lt1">
+                <a:hueOff val="0"/>
+                <a:satOff val="0"/>
+                <a:lumOff val="0"/>
+                <a:alphaOff val="0"/>
+                <a:tint val="15000"/>
+                <a:satMod val="350000"/>
+              </a:schemeClr>
+            </a:gs>
+          </a:gsLst>
+          <a:lin ang="16200000" scaled="1"/>
+        </a:gradFill>
+        <a:ln>
+          <a:noFill/>
+        </a:ln>
+        <a:effectLst>
+          <a:outerShdw blurRad="40000" dist="20000" dir="5400000" rotWithShape="0">
+            <a:srgbClr val="000000">
+              <a:alpha val="38000"/>
+            </a:srgbClr>
+          </a:outerShdw>
+        </a:effectLst>
+        <a:scene3d>
+          <a:camera prst="orthographicFront"/>
+          <a:lightRig rig="flat" dir="t"/>
+        </a:scene3d>
+        <a:sp3d prstMaterial="dkEdge">
+          <a:bevelT w="8200" h="38100"/>
+        </a:sp3d>
+      </dsp:spPr>
+      <dsp:style>
+        <a:lnRef idx="0">
+          <a:scrgbClr r="0" g="0" b="0"/>
+        </a:lnRef>
+        <a:fillRef idx="2">
+          <a:scrgbClr r="0" g="0" b="0"/>
+        </a:fillRef>
+        <a:effectRef idx="1">
+          <a:scrgbClr r="0" g="0" b="0"/>
+        </a:effectRef>
+        <a:fontRef idx="minor">
+          <a:schemeClr val="dk1"/>
+        </a:fontRef>
+      </dsp:style>
+      <dsp:txBody>
+        <a:bodyPr spcFirstLastPara="0" vert="horz" wrap="square" lIns="19050" tIns="19050" rIns="19050" bIns="19050" numCol="1" spcCol="1270" anchor="ctr" anchorCtr="0">
+          <a:noAutofit/>
+        </a:bodyPr>
+        <a:lstStyle/>
+        <a:p>
+          <a:pPr lvl="0" algn="ctr" defTabSz="222250">
+            <a:lnSpc>
+              <a:spcPct val="90000"/>
+            </a:lnSpc>
+            <a:spcBef>
+              <a:spcPct val="0"/>
+            </a:spcBef>
+            <a:spcAft>
+              <a:spcPct val="35000"/>
+            </a:spcAft>
+          </a:pPr>
+          <a:r>
+            <a:rPr lang="en-US" sz="500" kern="1200" dirty="0" smtClean="0"/>
+            <a:t>About</a:t>
+          </a:r>
+        </a:p>
+      </dsp:txBody>
+      <dsp:txXfrm>
+        <a:off x="6209967" y="318410"/>
+        <a:ext cx="341154" cy="227436"/>
+      </dsp:txXfrm>
+    </dsp:sp>
+    <dsp:sp modelId="{47F226ED-03DC-DB42-8882-368010BF9656}">
+      <dsp:nvSpPr>
+        <dsp:cNvPr id="0" name=""/>
+        <dsp:cNvSpPr/>
+      </dsp:nvSpPr>
+      <dsp:spPr>
+        <a:xfrm>
+          <a:off x="3608666" y="181716"/>
+          <a:ext cx="3215378" cy="91440"/>
+        </a:xfrm>
+        <a:custGeom>
+          <a:avLst/>
+          <a:gdLst/>
+          <a:ahLst/>
+          <a:cxnLst/>
+          <a:rect l="0" t="0" r="0" b="0"/>
+          <a:pathLst>
+            <a:path>
+              <a:moveTo>
+                <a:pt x="0" y="45720"/>
+              </a:moveTo>
+              <a:lnTo>
+                <a:pt x="0" y="91207"/>
+              </a:lnTo>
+              <a:lnTo>
+                <a:pt x="3215378" y="91207"/>
+              </a:lnTo>
+              <a:lnTo>
+                <a:pt x="3215378" y="136694"/>
+              </a:lnTo>
+            </a:path>
+          </a:pathLst>
+        </a:custGeom>
+        <a:noFill/>
+        <a:ln w="25400" cap="flat" cmpd="sng" algn="ctr">
+          <a:solidFill>
+            <a:schemeClr val="dk1">
+              <a:shade val="60000"/>
+              <a:hueOff val="0"/>
+              <a:satOff val="0"/>
+              <a:lumOff val="0"/>
+              <a:alphaOff val="0"/>
+            </a:schemeClr>
+          </a:solidFill>
+          <a:prstDash val="solid"/>
+        </a:ln>
+        <a:effectLst/>
+      </dsp:spPr>
+      <dsp:style>
+        <a:lnRef idx="2">
+          <a:scrgbClr r="0" g="0" b="0"/>
+        </a:lnRef>
+        <a:fillRef idx="0">
+          <a:scrgbClr r="0" g="0" b="0"/>
+        </a:fillRef>
+        <a:effectRef idx="0">
+          <a:scrgbClr r="0" g="0" b="0"/>
+        </a:effectRef>
+        <a:fontRef idx="minor"/>
+      </dsp:style>
+    </dsp:sp>
+    <dsp:sp modelId="{48165126-8B80-4444-99A4-95E3621A03ED}">
+      <dsp:nvSpPr>
+        <dsp:cNvPr id="0" name=""/>
+        <dsp:cNvSpPr/>
+      </dsp:nvSpPr>
+      <dsp:spPr>
+        <a:xfrm>
+          <a:off x="6653468" y="318410"/>
+          <a:ext cx="341154" cy="227436"/>
+        </a:xfrm>
+        <a:prstGeom prst="roundRect">
+          <a:avLst>
+            <a:gd name="adj" fmla="val 10000"/>
+          </a:avLst>
+        </a:prstGeom>
+        <a:gradFill rotWithShape="0">
+          <a:gsLst>
+            <a:gs pos="0">
+              <a:schemeClr val="lt1">
+                <a:hueOff val="0"/>
+                <a:satOff val="0"/>
+                <a:lumOff val="0"/>
+                <a:alphaOff val="0"/>
+                <a:tint val="50000"/>
+                <a:satMod val="300000"/>
+              </a:schemeClr>
+            </a:gs>
+            <a:gs pos="35000">
+              <a:schemeClr val="lt1">
+                <a:hueOff val="0"/>
+                <a:satOff val="0"/>
+                <a:lumOff val="0"/>
+                <a:alphaOff val="0"/>
+                <a:tint val="37000"/>
+                <a:satMod val="300000"/>
+              </a:schemeClr>
+            </a:gs>
+            <a:gs pos="100000">
+              <a:schemeClr val="lt1">
+                <a:hueOff val="0"/>
+                <a:satOff val="0"/>
+                <a:lumOff val="0"/>
+                <a:alphaOff val="0"/>
+                <a:tint val="15000"/>
+                <a:satMod val="350000"/>
+              </a:schemeClr>
+            </a:gs>
+          </a:gsLst>
+          <a:lin ang="16200000" scaled="1"/>
+        </a:gradFill>
+        <a:ln>
+          <a:noFill/>
+        </a:ln>
+        <a:effectLst>
+          <a:outerShdw blurRad="40000" dist="20000" dir="5400000" rotWithShape="0">
+            <a:srgbClr val="000000">
+              <a:alpha val="38000"/>
+            </a:srgbClr>
+          </a:outerShdw>
+        </a:effectLst>
+        <a:scene3d>
+          <a:camera prst="orthographicFront"/>
+          <a:lightRig rig="flat" dir="t"/>
+        </a:scene3d>
+        <a:sp3d prstMaterial="dkEdge">
+          <a:bevelT w="8200" h="38100"/>
+        </a:sp3d>
+      </dsp:spPr>
+      <dsp:style>
+        <a:lnRef idx="0">
+          <a:scrgbClr r="0" g="0" b="0"/>
+        </a:lnRef>
+        <a:fillRef idx="2">
+          <a:scrgbClr r="0" g="0" b="0"/>
+        </a:fillRef>
+        <a:effectRef idx="1">
+          <a:scrgbClr r="0" g="0" b="0"/>
+        </a:effectRef>
+        <a:fontRef idx="minor">
+          <a:schemeClr val="dk1"/>
+        </a:fontRef>
+      </dsp:style>
+      <dsp:txBody>
+        <a:bodyPr spcFirstLastPara="0" vert="horz" wrap="square" lIns="19050" tIns="19050" rIns="19050" bIns="19050" numCol="1" spcCol="1270" anchor="ctr" anchorCtr="0">
+          <a:noAutofit/>
+        </a:bodyPr>
+        <a:lstStyle/>
+        <a:p>
+          <a:pPr lvl="0" algn="ctr" defTabSz="222250">
+            <a:lnSpc>
+              <a:spcPct val="90000"/>
+            </a:lnSpc>
+            <a:spcBef>
+              <a:spcPct val="0"/>
+            </a:spcBef>
+            <a:spcAft>
+              <a:spcPct val="35000"/>
+            </a:spcAft>
+          </a:pPr>
+          <a:r>
+            <a:rPr lang="en-US" sz="500" kern="1200" dirty="0" smtClean="0"/>
             <a:t>Credits</a:t>
           </a:r>
-          <a:endParaRPr lang="en-US" sz="500" kern="1200" dirty="0" smtClean="0"/>
         </a:p>
       </dsp:txBody>
       <dsp:txXfrm>
-        <a:off x="6587446" y="1157506"/>
-        <a:ext cx="405200" cy="270133"/>
+        <a:off x="6653468" y="318410"/>
+        <a:ext cx="341154" cy="227436"/>
       </dsp:txXfrm>
     </dsp:sp>
   </dsp:spTree>

</xml_diff>